<commit_message>
removed errors during compilation
</commit_message>
<xml_diff>
--- a/Seismic Drones/CASE-2016/pictures/drone_base.pptx
+++ b/Seismic Drones/CASE-2016/pictures/drone_base.pptx
@@ -106,7 +106,7 @@
   </p:defaultTextStyle>
   <p:extLst>
     <p:ext uri="{EFAFB233-063F-42B5-8137-9DF3F51BA10A}">
-      <p15:sldGuideLst xmlns:p15="http://schemas.microsoft.com/office/powerpoint/2012/main"/>
+      <p15:sldGuideLst xmlns:p15="http://schemas.microsoft.com/office/powerpoint/2012/main" xmlns=""/>
     </p:ext>
   </p:extLst>
 </p:presentation>
@@ -243,7 +243,7 @@
           <a:p>
             <a:fld id="{577AF912-6C46-438F-8FD8-D583EE625B1A}" type="datetimeFigureOut">
               <a:rPr lang="en-US" smtClean="0"/>
-              <a:t>3/5/2016</a:t>
+              <a:t>3/25/16</a:t>
             </a:fld>
             <a:endParaRPr lang="en-US"/>
           </a:p>
@@ -413,7 +413,7 @@
           <a:p>
             <a:fld id="{577AF912-6C46-438F-8FD8-D583EE625B1A}" type="datetimeFigureOut">
               <a:rPr lang="en-US" smtClean="0"/>
-              <a:t>3/5/2016</a:t>
+              <a:t>3/25/16</a:t>
             </a:fld>
             <a:endParaRPr lang="en-US"/>
           </a:p>
@@ -593,7 +593,7 @@
           <a:p>
             <a:fld id="{577AF912-6C46-438F-8FD8-D583EE625B1A}" type="datetimeFigureOut">
               <a:rPr lang="en-US" smtClean="0"/>
-              <a:t>3/5/2016</a:t>
+              <a:t>3/25/16</a:t>
             </a:fld>
             <a:endParaRPr lang="en-US"/>
           </a:p>
@@ -763,7 +763,7 @@
           <a:p>
             <a:fld id="{577AF912-6C46-438F-8FD8-D583EE625B1A}" type="datetimeFigureOut">
               <a:rPr lang="en-US" smtClean="0"/>
-              <a:t>3/5/2016</a:t>
+              <a:t>3/25/16</a:t>
             </a:fld>
             <a:endParaRPr lang="en-US"/>
           </a:p>
@@ -1007,7 +1007,7 @@
           <a:p>
             <a:fld id="{577AF912-6C46-438F-8FD8-D583EE625B1A}" type="datetimeFigureOut">
               <a:rPr lang="en-US" smtClean="0"/>
-              <a:t>3/5/2016</a:t>
+              <a:t>3/25/16</a:t>
             </a:fld>
             <a:endParaRPr lang="en-US"/>
           </a:p>
@@ -1239,7 +1239,7 @@
           <a:p>
             <a:fld id="{577AF912-6C46-438F-8FD8-D583EE625B1A}" type="datetimeFigureOut">
               <a:rPr lang="en-US" smtClean="0"/>
-              <a:t>3/5/2016</a:t>
+              <a:t>3/25/16</a:t>
             </a:fld>
             <a:endParaRPr lang="en-US"/>
           </a:p>
@@ -1606,7 +1606,7 @@
           <a:p>
             <a:fld id="{577AF912-6C46-438F-8FD8-D583EE625B1A}" type="datetimeFigureOut">
               <a:rPr lang="en-US" smtClean="0"/>
-              <a:t>3/5/2016</a:t>
+              <a:t>3/25/16</a:t>
             </a:fld>
             <a:endParaRPr lang="en-US"/>
           </a:p>
@@ -1724,7 +1724,7 @@
           <a:p>
             <a:fld id="{577AF912-6C46-438F-8FD8-D583EE625B1A}" type="datetimeFigureOut">
               <a:rPr lang="en-US" smtClean="0"/>
-              <a:t>3/5/2016</a:t>
+              <a:t>3/25/16</a:t>
             </a:fld>
             <a:endParaRPr lang="en-US"/>
           </a:p>
@@ -1819,7 +1819,7 @@
           <a:p>
             <a:fld id="{577AF912-6C46-438F-8FD8-D583EE625B1A}" type="datetimeFigureOut">
               <a:rPr lang="en-US" smtClean="0"/>
-              <a:t>3/5/2016</a:t>
+              <a:t>3/25/16</a:t>
             </a:fld>
             <a:endParaRPr lang="en-US"/>
           </a:p>
@@ -2096,7 +2096,7 @@
           <a:p>
             <a:fld id="{577AF912-6C46-438F-8FD8-D583EE625B1A}" type="datetimeFigureOut">
               <a:rPr lang="en-US" smtClean="0"/>
-              <a:t>3/5/2016</a:t>
+              <a:t>3/25/16</a:t>
             </a:fld>
             <a:endParaRPr lang="en-US"/>
           </a:p>
@@ -2353,7 +2353,7 @@
           <a:p>
             <a:fld id="{577AF912-6C46-438F-8FD8-D583EE625B1A}" type="datetimeFigureOut">
               <a:rPr lang="en-US" smtClean="0"/>
-              <a:t>3/5/2016</a:t>
+              <a:t>3/25/16</a:t>
             </a:fld>
             <a:endParaRPr lang="en-US"/>
           </a:p>
@@ -2566,7 +2566,7 @@
           <a:p>
             <a:fld id="{577AF912-6C46-438F-8FD8-D583EE625B1A}" type="datetimeFigureOut">
               <a:rPr lang="en-US" smtClean="0"/>
-              <a:t>3/5/2016</a:t>
+              <a:t>3/25/16</a:t>
             </a:fld>
             <a:endParaRPr lang="en-US"/>
           </a:p>
@@ -2979,7 +2979,7 @@
         </p:nvGrpSpPr>
         <p:grpSpPr>
           <a:xfrm>
-            <a:off x="142469" y="95158"/>
+            <a:off x="142469" y="186022"/>
             <a:ext cx="4637588" cy="5575016"/>
             <a:chOff x="142469" y="663724"/>
             <a:chExt cx="4637588" cy="5575016"/>
@@ -3107,7 +3107,6 @@
                 <a:rPr lang="en-US" sz="1656" dirty="0"/>
                 <a:t>Seismic recorder (micro-controller)</a:t>
               </a:r>
-              <a:endParaRPr lang="en-US" sz="1656" dirty="0"/>
             </a:p>
           </p:txBody>
         </p:sp>
@@ -3149,14 +3148,17 @@
           </p:nvCxnSpPr>
           <p:spPr>
             <a:xfrm flipH="1" flipV="1">
-              <a:off x="1153298" y="4926638"/>
-              <a:ext cx="1306500" cy="411481"/>
+              <a:off x="1153298" y="4926639"/>
+              <a:ext cx="502569" cy="498675"/>
             </a:xfrm>
             <a:prstGeom prst="straightConnector1">
               <a:avLst/>
             </a:prstGeom>
-            <a:ln>
-              <a:tailEnd type="triangle"/>
+            <a:ln w="28575" cmpd="sng">
+              <a:solidFill>
+                <a:schemeClr val="accent1"/>
+              </a:solidFill>
+              <a:tailEnd type="stealth" w="med" len="lg"/>
             </a:ln>
           </p:spPr>
           <p:style>
@@ -3177,19 +3179,24 @@
         <p:cxnSp>
           <p:nvCxnSpPr>
             <p:cNvPr id="29" name="Straight Arrow Connector 28"/>
-            <p:cNvCxnSpPr/>
+            <p:cNvCxnSpPr>
+              <a:stCxn id="18" idx="3"/>
+            </p:cNvCxnSpPr>
             <p:nvPr/>
           </p:nvCxnSpPr>
           <p:spPr>
             <a:xfrm>
-              <a:off x="3023285" y="5536116"/>
-              <a:ext cx="1061790" cy="1"/>
+              <a:off x="3462589" y="5536117"/>
+              <a:ext cx="622486" cy="0"/>
             </a:xfrm>
             <a:prstGeom prst="straightConnector1">
               <a:avLst/>
             </a:prstGeom>
-            <a:ln>
-              <a:tailEnd type="triangle"/>
+            <a:ln w="28575" cmpd="sng">
+              <a:solidFill>
+                <a:schemeClr val="accent1"/>
+              </a:solidFill>
+              <a:tailEnd type="stealth" w="med" len="lg"/>
             </a:ln>
           </p:spPr>
           <p:style>
@@ -3221,8 +3228,11 @@
             <a:prstGeom prst="straightConnector1">
               <a:avLst/>
             </a:prstGeom>
-            <a:ln>
-              <a:tailEnd type="triangle"/>
+            <a:ln w="28575" cmpd="sng">
+              <a:solidFill>
+                <a:schemeClr val="accent1"/>
+              </a:solidFill>
+              <a:tailEnd type="stealth" w="med" len="lg"/>
             </a:ln>
           </p:spPr>
           <p:style>
@@ -3254,11 +3264,11 @@
             <a:prstGeom prst="straightConnector1">
               <a:avLst/>
             </a:prstGeom>
-            <a:ln>
+            <a:ln w="28575" cmpd="sng">
               <a:solidFill>
-                <a:schemeClr val="tx1"/>
+                <a:schemeClr val="accent1"/>
               </a:solidFill>
-              <a:tailEnd type="triangle"/>
+              <a:tailEnd type="stealth" w="med" len="lg"/>
             </a:ln>
           </p:spPr>
           <p:style>
@@ -3333,7 +3343,7 @@
     </a:clrScheme>
     <a:fontScheme name="Office Theme">
       <a:majorFont>
-        <a:latin typeface="Calibri Light" panose="020F0302020204030204"/>
+        <a:latin typeface="Calibri Light"/>
         <a:ea typeface=""/>
         <a:cs typeface=""/>
         <a:font script="Jpan" typeface="ＭＳ Ｐゴシック"/>
@@ -3368,7 +3378,7 @@
         <a:font script="Geor" typeface="Sylfaen"/>
       </a:majorFont>
       <a:minorFont>
-        <a:latin typeface="Calibri" panose="020F0502020204030204"/>
+        <a:latin typeface="Calibri"/>
         <a:ea typeface=""/>
         <a:cs typeface=""/>
         <a:font script="Jpan" typeface="ＭＳ Ｐゴシック"/>
@@ -3545,7 +3555,7 @@
   <a:extraClrSchemeLst/>
   <a:extLst>
     <a:ext uri="{05A4C25C-085E-4340-85A3-A5531E510DB2}">
-      <thm15:themeFamily xmlns:thm15="http://schemas.microsoft.com/office/thememl/2012/main" name="Office Theme" id="{62F939B6-93AF-4DB8-9C6B-D6C7DFDC589F}" vid="{4A3C46E8-61CC-4603-A589-7422A47A8E4A}"/>
+      <thm15:themeFamily xmlns:thm15="http://schemas.microsoft.com/office/thememl/2012/main" xmlns="" name="Office Theme" id="{62F939B6-93AF-4DB8-9C6B-D6C7DFDC589F}" vid="{4A3C46E8-61CC-4603-A589-7422A47A8E4A}"/>
     </a:ext>
   </a:extLst>
 </a:theme>

</xml_diff>

<commit_message>
done changes discussed on 03/25/2016
</commit_message>
<xml_diff>
--- a/Seismic Drones/CASE-2016/pictures/drone_base.pptx
+++ b/Seismic Drones/CASE-2016/pictures/drone_base.pptx
@@ -106,7 +106,18 @@
   </p:defaultTextStyle>
   <p:extLst>
     <p:ext uri="{EFAFB233-063F-42B5-8137-9DF3F51BA10A}">
-      <p15:sldGuideLst xmlns:p15="http://schemas.microsoft.com/office/powerpoint/2012/main" xmlns=""/>
+      <p15:sldGuideLst xmlns:p15="http://schemas.microsoft.com/office/powerpoint/2012/main">
+        <p15:guide id="1" orient="horz" pos="1814">
+          <p15:clr>
+            <a:srgbClr val="A4A3A4"/>
+          </p15:clr>
+        </p15:guide>
+        <p15:guide id="2" pos="1555">
+          <p15:clr>
+            <a:srgbClr val="A4A3A4"/>
+          </p15:clr>
+        </p15:guide>
+      </p15:sldGuideLst>
     </p:ext>
   </p:extLst>
 </p:presentation>
@@ -243,7 +254,7 @@
           <a:p>
             <a:fld id="{577AF912-6C46-438F-8FD8-D583EE625B1A}" type="datetimeFigureOut">
               <a:rPr lang="en-US" smtClean="0"/>
-              <a:t>3/25/16</a:t>
+              <a:t>3/26/2016</a:t>
             </a:fld>
             <a:endParaRPr lang="en-US"/>
           </a:p>
@@ -413,7 +424,7 @@
           <a:p>
             <a:fld id="{577AF912-6C46-438F-8FD8-D583EE625B1A}" type="datetimeFigureOut">
               <a:rPr lang="en-US" smtClean="0"/>
-              <a:t>3/25/16</a:t>
+              <a:t>3/26/2016</a:t>
             </a:fld>
             <a:endParaRPr lang="en-US"/>
           </a:p>
@@ -593,7 +604,7 @@
           <a:p>
             <a:fld id="{577AF912-6C46-438F-8FD8-D583EE625B1A}" type="datetimeFigureOut">
               <a:rPr lang="en-US" smtClean="0"/>
-              <a:t>3/25/16</a:t>
+              <a:t>3/26/2016</a:t>
             </a:fld>
             <a:endParaRPr lang="en-US"/>
           </a:p>
@@ -763,7 +774,7 @@
           <a:p>
             <a:fld id="{577AF912-6C46-438F-8FD8-D583EE625B1A}" type="datetimeFigureOut">
               <a:rPr lang="en-US" smtClean="0"/>
-              <a:t>3/25/16</a:t>
+              <a:t>3/26/2016</a:t>
             </a:fld>
             <a:endParaRPr lang="en-US"/>
           </a:p>
@@ -1007,7 +1018,7 @@
           <a:p>
             <a:fld id="{577AF912-6C46-438F-8FD8-D583EE625B1A}" type="datetimeFigureOut">
               <a:rPr lang="en-US" smtClean="0"/>
-              <a:t>3/25/16</a:t>
+              <a:t>3/26/2016</a:t>
             </a:fld>
             <a:endParaRPr lang="en-US"/>
           </a:p>
@@ -1239,7 +1250,7 @@
           <a:p>
             <a:fld id="{577AF912-6C46-438F-8FD8-D583EE625B1A}" type="datetimeFigureOut">
               <a:rPr lang="en-US" smtClean="0"/>
-              <a:t>3/25/16</a:t>
+              <a:t>3/26/2016</a:t>
             </a:fld>
             <a:endParaRPr lang="en-US"/>
           </a:p>
@@ -1606,7 +1617,7 @@
           <a:p>
             <a:fld id="{577AF912-6C46-438F-8FD8-D583EE625B1A}" type="datetimeFigureOut">
               <a:rPr lang="en-US" smtClean="0"/>
-              <a:t>3/25/16</a:t>
+              <a:t>3/26/2016</a:t>
             </a:fld>
             <a:endParaRPr lang="en-US"/>
           </a:p>
@@ -1724,7 +1735,7 @@
           <a:p>
             <a:fld id="{577AF912-6C46-438F-8FD8-D583EE625B1A}" type="datetimeFigureOut">
               <a:rPr lang="en-US" smtClean="0"/>
-              <a:t>3/25/16</a:t>
+              <a:t>3/26/2016</a:t>
             </a:fld>
             <a:endParaRPr lang="en-US"/>
           </a:p>
@@ -1819,7 +1830,7 @@
           <a:p>
             <a:fld id="{577AF912-6C46-438F-8FD8-D583EE625B1A}" type="datetimeFigureOut">
               <a:rPr lang="en-US" smtClean="0"/>
-              <a:t>3/25/16</a:t>
+              <a:t>3/26/2016</a:t>
             </a:fld>
             <a:endParaRPr lang="en-US"/>
           </a:p>
@@ -2096,7 +2107,7 @@
           <a:p>
             <a:fld id="{577AF912-6C46-438F-8FD8-D583EE625B1A}" type="datetimeFigureOut">
               <a:rPr lang="en-US" smtClean="0"/>
-              <a:t>3/25/16</a:t>
+              <a:t>3/26/2016</a:t>
             </a:fld>
             <a:endParaRPr lang="en-US"/>
           </a:p>
@@ -2353,7 +2364,7 @@
           <a:p>
             <a:fld id="{577AF912-6C46-438F-8FD8-D583EE625B1A}" type="datetimeFigureOut">
               <a:rPr lang="en-US" smtClean="0"/>
-              <a:t>3/25/16</a:t>
+              <a:t>3/26/2016</a:t>
             </a:fld>
             <a:endParaRPr lang="en-US"/>
           </a:p>
@@ -2566,7 +2577,7 @@
           <a:p>
             <a:fld id="{577AF912-6C46-438F-8FD8-D583EE625B1A}" type="datetimeFigureOut">
               <a:rPr lang="en-US" smtClean="0"/>
-              <a:t>3/25/16</a:t>
+              <a:t>3/26/2016</a:t>
             </a:fld>
             <a:endParaRPr lang="en-US"/>
           </a:p>
@@ -3156,7 +3167,10 @@
             </a:prstGeom>
             <a:ln w="28575" cmpd="sng">
               <a:solidFill>
-                <a:schemeClr val="accent1"/>
+                <a:schemeClr val="accent4">
+                  <a:lumMod val="60000"/>
+                  <a:lumOff val="40000"/>
+                </a:schemeClr>
               </a:solidFill>
               <a:tailEnd type="stealth" w="med" len="lg"/>
             </a:ln>
@@ -3194,7 +3208,10 @@
             </a:prstGeom>
             <a:ln w="28575" cmpd="sng">
               <a:solidFill>
-                <a:schemeClr val="accent1"/>
+                <a:schemeClr val="accent4">
+                  <a:lumMod val="60000"/>
+                  <a:lumOff val="40000"/>
+                </a:schemeClr>
               </a:solidFill>
               <a:tailEnd type="stealth" w="med" len="lg"/>
             </a:ln>
@@ -3230,7 +3247,10 @@
             </a:prstGeom>
             <a:ln w="28575" cmpd="sng">
               <a:solidFill>
-                <a:schemeClr val="accent1"/>
+                <a:schemeClr val="accent4">
+                  <a:lumMod val="60000"/>
+                  <a:lumOff val="40000"/>
+                </a:schemeClr>
               </a:solidFill>
               <a:tailEnd type="stealth" w="med" len="lg"/>
             </a:ln>
@@ -3266,7 +3286,10 @@
             </a:prstGeom>
             <a:ln w="28575" cmpd="sng">
               <a:solidFill>
-                <a:schemeClr val="accent1"/>
+                <a:schemeClr val="accent4">
+                  <a:lumMod val="60000"/>
+                  <a:lumOff val="40000"/>
+                </a:schemeClr>
               </a:solidFill>
               <a:tailEnd type="stealth" w="med" len="lg"/>
             </a:ln>
@@ -3555,7 +3578,7 @@
   <a:extraClrSchemeLst/>
   <a:extLst>
     <a:ext uri="{05A4C25C-085E-4340-85A3-A5531E510DB2}">
-      <thm15:themeFamily xmlns:thm15="http://schemas.microsoft.com/office/thememl/2012/main" xmlns="" name="Office Theme" id="{62F939B6-93AF-4DB8-9C6B-D6C7DFDC589F}" vid="{4A3C46E8-61CC-4603-A589-7422A47A8E4A}"/>
+      <thm15:themeFamily xmlns:thm15="http://schemas.microsoft.com/office/thememl/2012/main" name="Office Theme" id="{62F939B6-93AF-4DB8-9C6B-D6C7DFDC589F}" vid="{4A3C46E8-61CC-4603-A589-7422A47A8E4A}"/>
     </a:ext>
   </a:extLst>
 </a:theme>

</xml_diff>

<commit_message>
Added the possible changes
</commit_message>
<xml_diff>
--- a/Seismic Drones/CASE-2016/pictures/drone_base.pptx
+++ b/Seismic Drones/CASE-2016/pictures/drone_base.pptx
@@ -2,12 +2,12 @@
 <file path=ppt/presentation.xml><?xml version="1.0" encoding="utf-8"?>
 <p:presentation xmlns:a="http://schemas.openxmlformats.org/drawingml/2006/main" xmlns:r="http://schemas.openxmlformats.org/officeDocument/2006/relationships" xmlns:p="http://schemas.openxmlformats.org/presentationml/2006/main" saveSubsetFonts="1">
   <p:sldMasterIdLst>
-    <p:sldMasterId id="2147483840" r:id="rId1"/>
+    <p:sldMasterId id="2147483888" r:id="rId1"/>
   </p:sldMasterIdLst>
   <p:sldIdLst>
     <p:sldId id="256" r:id="rId2"/>
   </p:sldIdLst>
-  <p:sldSz cx="4937125" cy="5761038"/>
+  <p:sldSz cx="4937125" cy="2835275"/>
   <p:notesSz cx="6858000" cy="9144000"/>
   <p:defaultTextStyle>
     <a:defPPr>
@@ -107,12 +107,12 @@
   <p:extLst>
     <p:ext uri="{EFAFB233-063F-42B5-8137-9DF3F51BA10A}">
       <p15:sldGuideLst xmlns:p15="http://schemas.microsoft.com/office/powerpoint/2012/main">
-        <p15:guide id="1" orient="horz" pos="1814">
+        <p15:guide id="1" orient="horz" pos="893" userDrawn="1">
           <p15:clr>
             <a:srgbClr val="A4A3A4"/>
           </p15:clr>
         </p15:guide>
-        <p15:guide id="2" pos="1555">
+        <p15:guide id="2" pos="1555" userDrawn="1">
           <p15:clr>
             <a:srgbClr val="A4A3A4"/>
           </p15:clr>
@@ -152,15 +152,15 @@
         </p:nvSpPr>
         <p:spPr>
           <a:xfrm>
-            <a:off x="370285" y="942837"/>
-            <a:ext cx="4196556" cy="2005695"/>
+            <a:off x="617141" y="464014"/>
+            <a:ext cx="3702844" cy="987096"/>
           </a:xfrm>
         </p:spPr>
         <p:txBody>
           <a:bodyPr anchor="b"/>
           <a:lstStyle>
             <a:lvl1pPr algn="ctr">
-              <a:defRPr sz="3239"/>
+              <a:defRPr sz="2429"/>
             </a:lvl1pPr>
           </a:lstStyle>
           <a:p>
@@ -184,8 +184,8 @@
         </p:nvSpPr>
         <p:spPr>
           <a:xfrm>
-            <a:off x="617141" y="3025879"/>
-            <a:ext cx="3702844" cy="1390917"/>
+            <a:off x="617141" y="1489176"/>
+            <a:ext cx="3702844" cy="684535"/>
           </a:xfrm>
         </p:spPr>
         <p:txBody>
@@ -193,39 +193,39 @@
           <a:lstStyle>
             <a:lvl1pPr marL="0" indent="0" algn="ctr">
               <a:buNone/>
-              <a:defRPr sz="1296"/>
+              <a:defRPr sz="972"/>
             </a:lvl1pPr>
-            <a:lvl2pPr marL="246842" indent="0" algn="ctr">
-              <a:buNone/>
-              <a:defRPr sz="1080"/>
+            <a:lvl2pPr marL="185120" indent="0" algn="ctr">
+              <a:buNone/>
+              <a:defRPr sz="810"/>
             </a:lvl2pPr>
-            <a:lvl3pPr marL="493685" indent="0" algn="ctr">
-              <a:buNone/>
-              <a:defRPr sz="972"/>
+            <a:lvl3pPr marL="370241" indent="0" algn="ctr">
+              <a:buNone/>
+              <a:defRPr sz="729"/>
             </a:lvl3pPr>
-            <a:lvl4pPr marL="740527" indent="0" algn="ctr">
-              <a:buNone/>
-              <a:defRPr sz="864"/>
+            <a:lvl4pPr marL="555361" indent="0" algn="ctr">
+              <a:buNone/>
+              <a:defRPr sz="648"/>
             </a:lvl4pPr>
-            <a:lvl5pPr marL="987369" indent="0" algn="ctr">
-              <a:buNone/>
-              <a:defRPr sz="864"/>
+            <a:lvl5pPr marL="740481" indent="0" algn="ctr">
+              <a:buNone/>
+              <a:defRPr sz="648"/>
             </a:lvl5pPr>
-            <a:lvl6pPr marL="1234211" indent="0" algn="ctr">
-              <a:buNone/>
-              <a:defRPr sz="864"/>
+            <a:lvl6pPr marL="925601" indent="0" algn="ctr">
+              <a:buNone/>
+              <a:defRPr sz="648"/>
             </a:lvl6pPr>
-            <a:lvl7pPr marL="1481054" indent="0" algn="ctr">
-              <a:buNone/>
-              <a:defRPr sz="864"/>
+            <a:lvl7pPr marL="1110722" indent="0" algn="ctr">
+              <a:buNone/>
+              <a:defRPr sz="648"/>
             </a:lvl7pPr>
-            <a:lvl8pPr marL="1727896" indent="0" algn="ctr">
-              <a:buNone/>
-              <a:defRPr sz="864"/>
+            <a:lvl8pPr marL="1295842" indent="0" algn="ctr">
+              <a:buNone/>
+              <a:defRPr sz="648"/>
             </a:lvl8pPr>
-            <a:lvl9pPr marL="1974738" indent="0" algn="ctr">
-              <a:buNone/>
-              <a:defRPr sz="864"/>
+            <a:lvl9pPr marL="1480962" indent="0" algn="ctr">
+              <a:buNone/>
+              <a:defRPr sz="648"/>
             </a:lvl9pPr>
           </a:lstStyle>
           <a:p>
@@ -254,7 +254,7 @@
           <a:p>
             <a:fld id="{577AF912-6C46-438F-8FD8-D583EE625B1A}" type="datetimeFigureOut">
               <a:rPr lang="en-US" smtClean="0"/>
-              <a:t>3/26/2016</a:t>
+              <a:t>6/27/2016</a:t>
             </a:fld>
             <a:endParaRPr lang="en-US"/>
           </a:p>
@@ -305,7 +305,7 @@
     </p:spTree>
     <p:extLst>
       <p:ext uri="{BB962C8B-B14F-4D97-AF65-F5344CB8AC3E}">
-        <p14:creationId xmlns:p14="http://schemas.microsoft.com/office/powerpoint/2010/main" val="3704102765"/>
+        <p14:creationId xmlns:p14="http://schemas.microsoft.com/office/powerpoint/2010/main" val="3399561117"/>
       </p:ext>
     </p:extLst>
   </p:cSld>
@@ -424,7 +424,7 @@
           <a:p>
             <a:fld id="{577AF912-6C46-438F-8FD8-D583EE625B1A}" type="datetimeFigureOut">
               <a:rPr lang="en-US" smtClean="0"/>
-              <a:t>3/26/2016</a:t>
+              <a:t>6/27/2016</a:t>
             </a:fld>
             <a:endParaRPr lang="en-US"/>
           </a:p>
@@ -475,7 +475,7 @@
     </p:spTree>
     <p:extLst>
       <p:ext uri="{BB962C8B-B14F-4D97-AF65-F5344CB8AC3E}">
-        <p14:creationId xmlns:p14="http://schemas.microsoft.com/office/powerpoint/2010/main" val="4084492920"/>
+        <p14:creationId xmlns:p14="http://schemas.microsoft.com/office/powerpoint/2010/main" val="375264202"/>
       </p:ext>
     </p:extLst>
   </p:cSld>
@@ -514,8 +514,8 @@
         </p:nvSpPr>
         <p:spPr>
           <a:xfrm>
-            <a:off x="3533130" y="306722"/>
-            <a:ext cx="1064568" cy="4882213"/>
+            <a:off x="3533130" y="150952"/>
+            <a:ext cx="1064568" cy="2402765"/>
           </a:xfrm>
         </p:spPr>
         <p:txBody>
@@ -542,8 +542,8 @@
         </p:nvSpPr>
         <p:spPr>
           <a:xfrm>
-            <a:off x="339427" y="306722"/>
-            <a:ext cx="3131989" cy="4882213"/>
+            <a:off x="339427" y="150952"/>
+            <a:ext cx="3131989" cy="2402765"/>
           </a:xfrm>
         </p:spPr>
         <p:txBody>
@@ -604,7 +604,7 @@
           <a:p>
             <a:fld id="{577AF912-6C46-438F-8FD8-D583EE625B1A}" type="datetimeFigureOut">
               <a:rPr lang="en-US" smtClean="0"/>
-              <a:t>3/26/2016</a:t>
+              <a:t>6/27/2016</a:t>
             </a:fld>
             <a:endParaRPr lang="en-US"/>
           </a:p>
@@ -655,7 +655,7 @@
     </p:spTree>
     <p:extLst>
       <p:ext uri="{BB962C8B-B14F-4D97-AF65-F5344CB8AC3E}">
-        <p14:creationId xmlns:p14="http://schemas.microsoft.com/office/powerpoint/2010/main" val="2042138154"/>
+        <p14:creationId xmlns:p14="http://schemas.microsoft.com/office/powerpoint/2010/main" val="1453250948"/>
       </p:ext>
     </p:extLst>
   </p:cSld>
@@ -774,7 +774,7 @@
           <a:p>
             <a:fld id="{577AF912-6C46-438F-8FD8-D583EE625B1A}" type="datetimeFigureOut">
               <a:rPr lang="en-US" smtClean="0"/>
-              <a:t>3/26/2016</a:t>
+              <a:t>6/27/2016</a:t>
             </a:fld>
             <a:endParaRPr lang="en-US"/>
           </a:p>
@@ -825,7 +825,7 @@
     </p:spTree>
     <p:extLst>
       <p:ext uri="{BB962C8B-B14F-4D97-AF65-F5344CB8AC3E}">
-        <p14:creationId xmlns:p14="http://schemas.microsoft.com/office/powerpoint/2010/main" val="3008996663"/>
+        <p14:creationId xmlns:p14="http://schemas.microsoft.com/office/powerpoint/2010/main" val="3573186035"/>
       </p:ext>
     </p:extLst>
   </p:cSld>
@@ -864,15 +864,15 @@
         </p:nvSpPr>
         <p:spPr>
           <a:xfrm>
-            <a:off x="336856" y="1436261"/>
-            <a:ext cx="4258270" cy="2396431"/>
+            <a:off x="336856" y="706850"/>
+            <a:ext cx="4258270" cy="1179395"/>
           </a:xfrm>
         </p:spPr>
         <p:txBody>
           <a:bodyPr anchor="b"/>
           <a:lstStyle>
             <a:lvl1pPr>
-              <a:defRPr sz="3239"/>
+              <a:defRPr sz="2429"/>
             </a:lvl1pPr>
           </a:lstStyle>
           <a:p>
@@ -896,8 +896,8 @@
         </p:nvSpPr>
         <p:spPr>
           <a:xfrm>
-            <a:off x="336856" y="3855363"/>
-            <a:ext cx="4258270" cy="1260227"/>
+            <a:off x="336856" y="1897403"/>
+            <a:ext cx="4258270" cy="620216"/>
           </a:xfrm>
         </p:spPr>
         <p:txBody>
@@ -905,15 +905,17 @@
           <a:lstStyle>
             <a:lvl1pPr marL="0" indent="0">
               <a:buNone/>
-              <a:defRPr sz="1296">
+              <a:defRPr sz="972">
                 <a:solidFill>
-                  <a:schemeClr val="tx1"/>
+                  <a:schemeClr val="tx1">
+                    <a:tint val="75000"/>
+                  </a:schemeClr>
                 </a:solidFill>
               </a:defRPr>
             </a:lvl1pPr>
-            <a:lvl2pPr marL="246842" indent="0">
-              <a:buNone/>
-              <a:defRPr sz="1080">
+            <a:lvl2pPr marL="185120" indent="0">
+              <a:buNone/>
+              <a:defRPr sz="810">
                 <a:solidFill>
                   <a:schemeClr val="tx1">
                     <a:tint val="75000"/>
@@ -921,9 +923,9 @@
                 </a:solidFill>
               </a:defRPr>
             </a:lvl2pPr>
-            <a:lvl3pPr marL="493685" indent="0">
-              <a:buNone/>
-              <a:defRPr sz="972">
+            <a:lvl3pPr marL="370241" indent="0">
+              <a:buNone/>
+              <a:defRPr sz="729">
                 <a:solidFill>
                   <a:schemeClr val="tx1">
                     <a:tint val="75000"/>
@@ -931,9 +933,9 @@
                 </a:solidFill>
               </a:defRPr>
             </a:lvl3pPr>
-            <a:lvl4pPr marL="740527" indent="0">
-              <a:buNone/>
-              <a:defRPr sz="864">
+            <a:lvl4pPr marL="555361" indent="0">
+              <a:buNone/>
+              <a:defRPr sz="648">
                 <a:solidFill>
                   <a:schemeClr val="tx1">
                     <a:tint val="75000"/>
@@ -941,9 +943,9 @@
                 </a:solidFill>
               </a:defRPr>
             </a:lvl4pPr>
-            <a:lvl5pPr marL="987369" indent="0">
-              <a:buNone/>
-              <a:defRPr sz="864">
+            <a:lvl5pPr marL="740481" indent="0">
+              <a:buNone/>
+              <a:defRPr sz="648">
                 <a:solidFill>
                   <a:schemeClr val="tx1">
                     <a:tint val="75000"/>
@@ -951,9 +953,9 @@
                 </a:solidFill>
               </a:defRPr>
             </a:lvl5pPr>
-            <a:lvl6pPr marL="1234211" indent="0">
-              <a:buNone/>
-              <a:defRPr sz="864">
+            <a:lvl6pPr marL="925601" indent="0">
+              <a:buNone/>
+              <a:defRPr sz="648">
                 <a:solidFill>
                   <a:schemeClr val="tx1">
                     <a:tint val="75000"/>
@@ -961,9 +963,9 @@
                 </a:solidFill>
               </a:defRPr>
             </a:lvl6pPr>
-            <a:lvl7pPr marL="1481054" indent="0">
-              <a:buNone/>
-              <a:defRPr sz="864">
+            <a:lvl7pPr marL="1110722" indent="0">
+              <a:buNone/>
+              <a:defRPr sz="648">
                 <a:solidFill>
                   <a:schemeClr val="tx1">
                     <a:tint val="75000"/>
@@ -971,9 +973,9 @@
                 </a:solidFill>
               </a:defRPr>
             </a:lvl7pPr>
-            <a:lvl8pPr marL="1727896" indent="0">
-              <a:buNone/>
-              <a:defRPr sz="864">
+            <a:lvl8pPr marL="1295842" indent="0">
+              <a:buNone/>
+              <a:defRPr sz="648">
                 <a:solidFill>
                   <a:schemeClr val="tx1">
                     <a:tint val="75000"/>
@@ -981,9 +983,9 @@
                 </a:solidFill>
               </a:defRPr>
             </a:lvl8pPr>
-            <a:lvl9pPr marL="1974738" indent="0">
-              <a:buNone/>
-              <a:defRPr sz="864">
+            <a:lvl9pPr marL="1480962" indent="0">
+              <a:buNone/>
+              <a:defRPr sz="648">
                 <a:solidFill>
                   <a:schemeClr val="tx1">
                     <a:tint val="75000"/>
@@ -1018,7 +1020,7 @@
           <a:p>
             <a:fld id="{577AF912-6C46-438F-8FD8-D583EE625B1A}" type="datetimeFigureOut">
               <a:rPr lang="en-US" smtClean="0"/>
-              <a:t>3/26/2016</a:t>
+              <a:t>6/27/2016</a:t>
             </a:fld>
             <a:endParaRPr lang="en-US"/>
           </a:p>
@@ -1069,7 +1071,7 @@
     </p:spTree>
     <p:extLst>
       <p:ext uri="{BB962C8B-B14F-4D97-AF65-F5344CB8AC3E}">
-        <p14:creationId xmlns:p14="http://schemas.microsoft.com/office/powerpoint/2010/main" val="462152850"/>
+        <p14:creationId xmlns:p14="http://schemas.microsoft.com/office/powerpoint/2010/main" val="3155512763"/>
       </p:ext>
     </p:extLst>
   </p:cSld>
@@ -1131,8 +1133,8 @@
         </p:nvSpPr>
         <p:spPr>
           <a:xfrm>
-            <a:off x="339427" y="1533609"/>
-            <a:ext cx="2098278" cy="3655326"/>
+            <a:off x="339427" y="754761"/>
+            <a:ext cx="2098278" cy="1798956"/>
           </a:xfrm>
         </p:spPr>
         <p:txBody>
@@ -1188,8 +1190,8 @@
         </p:nvSpPr>
         <p:spPr>
           <a:xfrm>
-            <a:off x="2499420" y="1533609"/>
-            <a:ext cx="2098278" cy="3655326"/>
+            <a:off x="2499420" y="754761"/>
+            <a:ext cx="2098278" cy="1798956"/>
           </a:xfrm>
         </p:spPr>
         <p:txBody>
@@ -1250,7 +1252,7 @@
           <a:p>
             <a:fld id="{577AF912-6C46-438F-8FD8-D583EE625B1A}" type="datetimeFigureOut">
               <a:rPr lang="en-US" smtClean="0"/>
-              <a:t>3/26/2016</a:t>
+              <a:t>6/27/2016</a:t>
             </a:fld>
             <a:endParaRPr lang="en-US"/>
           </a:p>
@@ -1301,7 +1303,7 @@
     </p:spTree>
     <p:extLst>
       <p:ext uri="{BB962C8B-B14F-4D97-AF65-F5344CB8AC3E}">
-        <p14:creationId xmlns:p14="http://schemas.microsoft.com/office/powerpoint/2010/main" val="4086741010"/>
+        <p14:creationId xmlns:p14="http://schemas.microsoft.com/office/powerpoint/2010/main" val="4236407427"/>
       </p:ext>
     </p:extLst>
   </p:cSld>
@@ -1340,8 +1342,8 @@
         </p:nvSpPr>
         <p:spPr>
           <a:xfrm>
-            <a:off x="340071" y="306723"/>
-            <a:ext cx="4258270" cy="1113534"/>
+            <a:off x="340071" y="150952"/>
+            <a:ext cx="4258270" cy="548022"/>
           </a:xfrm>
         </p:spPr>
         <p:txBody>
@@ -1368,8 +1370,8 @@
         </p:nvSpPr>
         <p:spPr>
           <a:xfrm>
-            <a:off x="340071" y="1412255"/>
-            <a:ext cx="2088635" cy="692124"/>
+            <a:off x="340071" y="695036"/>
+            <a:ext cx="2088635" cy="340627"/>
           </a:xfrm>
         </p:spPr>
         <p:txBody>
@@ -1377,39 +1379,39 @@
           <a:lstStyle>
             <a:lvl1pPr marL="0" indent="0">
               <a:buNone/>
-              <a:defRPr sz="1296" b="1"/>
+              <a:defRPr sz="972" b="1"/>
             </a:lvl1pPr>
-            <a:lvl2pPr marL="246842" indent="0">
-              <a:buNone/>
-              <a:defRPr sz="1080" b="1"/>
+            <a:lvl2pPr marL="185120" indent="0">
+              <a:buNone/>
+              <a:defRPr sz="810" b="1"/>
             </a:lvl2pPr>
-            <a:lvl3pPr marL="493685" indent="0">
-              <a:buNone/>
-              <a:defRPr sz="972" b="1"/>
+            <a:lvl3pPr marL="370241" indent="0">
+              <a:buNone/>
+              <a:defRPr sz="729" b="1"/>
             </a:lvl3pPr>
-            <a:lvl4pPr marL="740527" indent="0">
-              <a:buNone/>
-              <a:defRPr sz="864" b="1"/>
+            <a:lvl4pPr marL="555361" indent="0">
+              <a:buNone/>
+              <a:defRPr sz="648" b="1"/>
             </a:lvl4pPr>
-            <a:lvl5pPr marL="987369" indent="0">
-              <a:buNone/>
-              <a:defRPr sz="864" b="1"/>
+            <a:lvl5pPr marL="740481" indent="0">
+              <a:buNone/>
+              <a:defRPr sz="648" b="1"/>
             </a:lvl5pPr>
-            <a:lvl6pPr marL="1234211" indent="0">
-              <a:buNone/>
-              <a:defRPr sz="864" b="1"/>
+            <a:lvl6pPr marL="925601" indent="0">
+              <a:buNone/>
+              <a:defRPr sz="648" b="1"/>
             </a:lvl6pPr>
-            <a:lvl7pPr marL="1481054" indent="0">
-              <a:buNone/>
-              <a:defRPr sz="864" b="1"/>
+            <a:lvl7pPr marL="1110722" indent="0">
+              <a:buNone/>
+              <a:defRPr sz="648" b="1"/>
             </a:lvl7pPr>
-            <a:lvl8pPr marL="1727896" indent="0">
-              <a:buNone/>
-              <a:defRPr sz="864" b="1"/>
+            <a:lvl8pPr marL="1295842" indent="0">
+              <a:buNone/>
+              <a:defRPr sz="648" b="1"/>
             </a:lvl8pPr>
-            <a:lvl9pPr marL="1974738" indent="0">
-              <a:buNone/>
-              <a:defRPr sz="864" b="1"/>
+            <a:lvl9pPr marL="1480962" indent="0">
+              <a:buNone/>
+              <a:defRPr sz="648" b="1"/>
             </a:lvl9pPr>
           </a:lstStyle>
           <a:p>
@@ -1433,8 +1435,8 @@
         </p:nvSpPr>
         <p:spPr>
           <a:xfrm>
-            <a:off x="340071" y="2104379"/>
-            <a:ext cx="2088635" cy="3095225"/>
+            <a:off x="340071" y="1035663"/>
+            <a:ext cx="2088635" cy="1523304"/>
           </a:xfrm>
         </p:spPr>
         <p:txBody>
@@ -1490,8 +1492,8 @@
         </p:nvSpPr>
         <p:spPr>
           <a:xfrm>
-            <a:off x="2499420" y="1412255"/>
-            <a:ext cx="2098921" cy="692124"/>
+            <a:off x="2499420" y="695036"/>
+            <a:ext cx="2098921" cy="340627"/>
           </a:xfrm>
         </p:spPr>
         <p:txBody>
@@ -1499,39 +1501,39 @@
           <a:lstStyle>
             <a:lvl1pPr marL="0" indent="0">
               <a:buNone/>
-              <a:defRPr sz="1296" b="1"/>
+              <a:defRPr sz="972" b="1"/>
             </a:lvl1pPr>
-            <a:lvl2pPr marL="246842" indent="0">
-              <a:buNone/>
-              <a:defRPr sz="1080" b="1"/>
+            <a:lvl2pPr marL="185120" indent="0">
+              <a:buNone/>
+              <a:defRPr sz="810" b="1"/>
             </a:lvl2pPr>
-            <a:lvl3pPr marL="493685" indent="0">
-              <a:buNone/>
-              <a:defRPr sz="972" b="1"/>
+            <a:lvl3pPr marL="370241" indent="0">
+              <a:buNone/>
+              <a:defRPr sz="729" b="1"/>
             </a:lvl3pPr>
-            <a:lvl4pPr marL="740527" indent="0">
-              <a:buNone/>
-              <a:defRPr sz="864" b="1"/>
+            <a:lvl4pPr marL="555361" indent="0">
+              <a:buNone/>
+              <a:defRPr sz="648" b="1"/>
             </a:lvl4pPr>
-            <a:lvl5pPr marL="987369" indent="0">
-              <a:buNone/>
-              <a:defRPr sz="864" b="1"/>
+            <a:lvl5pPr marL="740481" indent="0">
+              <a:buNone/>
+              <a:defRPr sz="648" b="1"/>
             </a:lvl5pPr>
-            <a:lvl6pPr marL="1234211" indent="0">
-              <a:buNone/>
-              <a:defRPr sz="864" b="1"/>
+            <a:lvl6pPr marL="925601" indent="0">
+              <a:buNone/>
+              <a:defRPr sz="648" b="1"/>
             </a:lvl6pPr>
-            <a:lvl7pPr marL="1481054" indent="0">
-              <a:buNone/>
-              <a:defRPr sz="864" b="1"/>
+            <a:lvl7pPr marL="1110722" indent="0">
+              <a:buNone/>
+              <a:defRPr sz="648" b="1"/>
             </a:lvl7pPr>
-            <a:lvl8pPr marL="1727896" indent="0">
-              <a:buNone/>
-              <a:defRPr sz="864" b="1"/>
+            <a:lvl8pPr marL="1295842" indent="0">
+              <a:buNone/>
+              <a:defRPr sz="648" b="1"/>
             </a:lvl8pPr>
-            <a:lvl9pPr marL="1974738" indent="0">
-              <a:buNone/>
-              <a:defRPr sz="864" b="1"/>
+            <a:lvl9pPr marL="1480962" indent="0">
+              <a:buNone/>
+              <a:defRPr sz="648" b="1"/>
             </a:lvl9pPr>
           </a:lstStyle>
           <a:p>
@@ -1555,8 +1557,8 @@
         </p:nvSpPr>
         <p:spPr>
           <a:xfrm>
-            <a:off x="2499420" y="2104379"/>
-            <a:ext cx="2098921" cy="3095225"/>
+            <a:off x="2499420" y="1035663"/>
+            <a:ext cx="2098921" cy="1523304"/>
           </a:xfrm>
         </p:spPr>
         <p:txBody>
@@ -1617,7 +1619,7 @@
           <a:p>
             <a:fld id="{577AF912-6C46-438F-8FD8-D583EE625B1A}" type="datetimeFigureOut">
               <a:rPr lang="en-US" smtClean="0"/>
-              <a:t>3/26/2016</a:t>
+              <a:t>6/27/2016</a:t>
             </a:fld>
             <a:endParaRPr lang="en-US"/>
           </a:p>
@@ -1668,7 +1670,7 @@
     </p:spTree>
     <p:extLst>
       <p:ext uri="{BB962C8B-B14F-4D97-AF65-F5344CB8AC3E}">
-        <p14:creationId xmlns:p14="http://schemas.microsoft.com/office/powerpoint/2010/main" val="3738662247"/>
+        <p14:creationId xmlns:p14="http://schemas.microsoft.com/office/powerpoint/2010/main" val="2879304930"/>
       </p:ext>
     </p:extLst>
   </p:cSld>
@@ -1735,7 +1737,7 @@
           <a:p>
             <a:fld id="{577AF912-6C46-438F-8FD8-D583EE625B1A}" type="datetimeFigureOut">
               <a:rPr lang="en-US" smtClean="0"/>
-              <a:t>3/26/2016</a:t>
+              <a:t>6/27/2016</a:t>
             </a:fld>
             <a:endParaRPr lang="en-US"/>
           </a:p>
@@ -1786,7 +1788,7 @@
     </p:spTree>
     <p:extLst>
       <p:ext uri="{BB962C8B-B14F-4D97-AF65-F5344CB8AC3E}">
-        <p14:creationId xmlns:p14="http://schemas.microsoft.com/office/powerpoint/2010/main" val="3448974519"/>
+        <p14:creationId xmlns:p14="http://schemas.microsoft.com/office/powerpoint/2010/main" val="2800267951"/>
       </p:ext>
     </p:extLst>
   </p:cSld>
@@ -1830,7 +1832,7 @@
           <a:p>
             <a:fld id="{577AF912-6C46-438F-8FD8-D583EE625B1A}" type="datetimeFigureOut">
               <a:rPr lang="en-US" smtClean="0"/>
-              <a:t>3/26/2016</a:t>
+              <a:t>6/27/2016</a:t>
             </a:fld>
             <a:endParaRPr lang="en-US"/>
           </a:p>
@@ -1881,7 +1883,7 @@
     </p:spTree>
     <p:extLst>
       <p:ext uri="{BB962C8B-B14F-4D97-AF65-F5344CB8AC3E}">
-        <p14:creationId xmlns:p14="http://schemas.microsoft.com/office/powerpoint/2010/main" val="3322218314"/>
+        <p14:creationId xmlns:p14="http://schemas.microsoft.com/office/powerpoint/2010/main" val="4078501556"/>
       </p:ext>
     </p:extLst>
   </p:cSld>
@@ -1920,15 +1922,15 @@
         </p:nvSpPr>
         <p:spPr>
           <a:xfrm>
-            <a:off x="340071" y="384069"/>
-            <a:ext cx="1592351" cy="1344242"/>
+            <a:off x="340071" y="189018"/>
+            <a:ext cx="1592351" cy="661564"/>
           </a:xfrm>
         </p:spPr>
         <p:txBody>
           <a:bodyPr anchor="b"/>
           <a:lstStyle>
             <a:lvl1pPr>
-              <a:defRPr sz="1728"/>
+              <a:defRPr sz="1296"/>
             </a:lvl1pPr>
           </a:lstStyle>
           <a:p>
@@ -1952,39 +1954,39 @@
         </p:nvSpPr>
         <p:spPr>
           <a:xfrm>
-            <a:off x="2098921" y="829484"/>
-            <a:ext cx="2499420" cy="4094071"/>
+            <a:off x="2098921" y="408227"/>
+            <a:ext cx="2499420" cy="2014883"/>
           </a:xfrm>
         </p:spPr>
         <p:txBody>
           <a:bodyPr/>
           <a:lstStyle>
             <a:lvl1pPr>
-              <a:defRPr sz="1728"/>
+              <a:defRPr sz="1296"/>
             </a:lvl1pPr>
             <a:lvl2pPr>
-              <a:defRPr sz="1512"/>
+              <a:defRPr sz="1134"/>
             </a:lvl2pPr>
             <a:lvl3pPr>
-              <a:defRPr sz="1296"/>
+              <a:defRPr sz="972"/>
             </a:lvl3pPr>
             <a:lvl4pPr>
-              <a:defRPr sz="1080"/>
+              <a:defRPr sz="810"/>
             </a:lvl4pPr>
             <a:lvl5pPr>
-              <a:defRPr sz="1080"/>
+              <a:defRPr sz="810"/>
             </a:lvl5pPr>
             <a:lvl6pPr>
-              <a:defRPr sz="1080"/>
+              <a:defRPr sz="810"/>
             </a:lvl6pPr>
             <a:lvl7pPr>
-              <a:defRPr sz="1080"/>
+              <a:defRPr sz="810"/>
             </a:lvl7pPr>
             <a:lvl8pPr>
-              <a:defRPr sz="1080"/>
+              <a:defRPr sz="810"/>
             </a:lvl8pPr>
             <a:lvl9pPr>
-              <a:defRPr sz="1080"/>
+              <a:defRPr sz="810"/>
             </a:lvl9pPr>
           </a:lstStyle>
           <a:p>
@@ -2037,8 +2039,8 @@
         </p:nvSpPr>
         <p:spPr>
           <a:xfrm>
-            <a:off x="340071" y="1728311"/>
-            <a:ext cx="1592351" cy="3201911"/>
+            <a:off x="340071" y="850583"/>
+            <a:ext cx="1592351" cy="1575809"/>
           </a:xfrm>
         </p:spPr>
         <p:txBody>
@@ -2046,39 +2048,39 @@
           <a:lstStyle>
             <a:lvl1pPr marL="0" indent="0">
               <a:buNone/>
-              <a:defRPr sz="864"/>
+              <a:defRPr sz="648"/>
             </a:lvl1pPr>
-            <a:lvl2pPr marL="246842" indent="0">
-              <a:buNone/>
-              <a:defRPr sz="756"/>
+            <a:lvl2pPr marL="185120" indent="0">
+              <a:buNone/>
+              <a:defRPr sz="567"/>
             </a:lvl2pPr>
-            <a:lvl3pPr marL="493685" indent="0">
-              <a:buNone/>
-              <a:defRPr sz="648"/>
+            <a:lvl3pPr marL="370241" indent="0">
+              <a:buNone/>
+              <a:defRPr sz="486"/>
             </a:lvl3pPr>
-            <a:lvl4pPr marL="740527" indent="0">
-              <a:buNone/>
-              <a:defRPr sz="540"/>
+            <a:lvl4pPr marL="555361" indent="0">
+              <a:buNone/>
+              <a:defRPr sz="405"/>
             </a:lvl4pPr>
-            <a:lvl5pPr marL="987369" indent="0">
-              <a:buNone/>
-              <a:defRPr sz="540"/>
+            <a:lvl5pPr marL="740481" indent="0">
+              <a:buNone/>
+              <a:defRPr sz="405"/>
             </a:lvl5pPr>
-            <a:lvl6pPr marL="1234211" indent="0">
-              <a:buNone/>
-              <a:defRPr sz="540"/>
+            <a:lvl6pPr marL="925601" indent="0">
+              <a:buNone/>
+              <a:defRPr sz="405"/>
             </a:lvl6pPr>
-            <a:lvl7pPr marL="1481054" indent="0">
-              <a:buNone/>
-              <a:defRPr sz="540"/>
+            <a:lvl7pPr marL="1110722" indent="0">
+              <a:buNone/>
+              <a:defRPr sz="405"/>
             </a:lvl7pPr>
-            <a:lvl8pPr marL="1727896" indent="0">
-              <a:buNone/>
-              <a:defRPr sz="540"/>
+            <a:lvl8pPr marL="1295842" indent="0">
+              <a:buNone/>
+              <a:defRPr sz="405"/>
             </a:lvl8pPr>
-            <a:lvl9pPr marL="1974738" indent="0">
-              <a:buNone/>
-              <a:defRPr sz="540"/>
+            <a:lvl9pPr marL="1480962" indent="0">
+              <a:buNone/>
+              <a:defRPr sz="405"/>
             </a:lvl9pPr>
           </a:lstStyle>
           <a:p>
@@ -2107,7 +2109,7 @@
           <a:p>
             <a:fld id="{577AF912-6C46-438F-8FD8-D583EE625B1A}" type="datetimeFigureOut">
               <a:rPr lang="en-US" smtClean="0"/>
-              <a:t>3/26/2016</a:t>
+              <a:t>6/27/2016</a:t>
             </a:fld>
             <a:endParaRPr lang="en-US"/>
           </a:p>
@@ -2158,7 +2160,7 @@
     </p:spTree>
     <p:extLst>
       <p:ext uri="{BB962C8B-B14F-4D97-AF65-F5344CB8AC3E}">
-        <p14:creationId xmlns:p14="http://schemas.microsoft.com/office/powerpoint/2010/main" val="3738038466"/>
+        <p14:creationId xmlns:p14="http://schemas.microsoft.com/office/powerpoint/2010/main" val="3658287034"/>
       </p:ext>
     </p:extLst>
   </p:cSld>
@@ -2197,15 +2199,15 @@
         </p:nvSpPr>
         <p:spPr>
           <a:xfrm>
-            <a:off x="340071" y="384069"/>
-            <a:ext cx="1592351" cy="1344242"/>
+            <a:off x="340071" y="189018"/>
+            <a:ext cx="1592351" cy="661564"/>
           </a:xfrm>
         </p:spPr>
         <p:txBody>
           <a:bodyPr anchor="b"/>
           <a:lstStyle>
             <a:lvl1pPr>
-              <a:defRPr sz="1728"/>
+              <a:defRPr sz="1296"/>
             </a:lvl1pPr>
           </a:lstStyle>
           <a:p>
@@ -2229,8 +2231,8 @@
         </p:nvSpPr>
         <p:spPr>
           <a:xfrm>
-            <a:off x="2098921" y="829484"/>
-            <a:ext cx="2499420" cy="4094071"/>
+            <a:off x="2098921" y="408227"/>
+            <a:ext cx="2499420" cy="2014883"/>
           </a:xfrm>
         </p:spPr>
         <p:txBody>
@@ -2238,39 +2240,39 @@
           <a:lstStyle>
             <a:lvl1pPr marL="0" indent="0">
               <a:buNone/>
-              <a:defRPr sz="1728"/>
+              <a:defRPr sz="1296"/>
             </a:lvl1pPr>
-            <a:lvl2pPr marL="246842" indent="0">
-              <a:buNone/>
-              <a:defRPr sz="1512"/>
+            <a:lvl2pPr marL="185120" indent="0">
+              <a:buNone/>
+              <a:defRPr sz="1134"/>
             </a:lvl2pPr>
-            <a:lvl3pPr marL="493685" indent="0">
-              <a:buNone/>
-              <a:defRPr sz="1296"/>
+            <a:lvl3pPr marL="370241" indent="0">
+              <a:buNone/>
+              <a:defRPr sz="972"/>
             </a:lvl3pPr>
-            <a:lvl4pPr marL="740527" indent="0">
-              <a:buNone/>
-              <a:defRPr sz="1080"/>
+            <a:lvl4pPr marL="555361" indent="0">
+              <a:buNone/>
+              <a:defRPr sz="810"/>
             </a:lvl4pPr>
-            <a:lvl5pPr marL="987369" indent="0">
-              <a:buNone/>
-              <a:defRPr sz="1080"/>
+            <a:lvl5pPr marL="740481" indent="0">
+              <a:buNone/>
+              <a:defRPr sz="810"/>
             </a:lvl5pPr>
-            <a:lvl6pPr marL="1234211" indent="0">
-              <a:buNone/>
-              <a:defRPr sz="1080"/>
+            <a:lvl6pPr marL="925601" indent="0">
+              <a:buNone/>
+              <a:defRPr sz="810"/>
             </a:lvl6pPr>
-            <a:lvl7pPr marL="1481054" indent="0">
-              <a:buNone/>
-              <a:defRPr sz="1080"/>
+            <a:lvl7pPr marL="1110722" indent="0">
+              <a:buNone/>
+              <a:defRPr sz="810"/>
             </a:lvl7pPr>
-            <a:lvl8pPr marL="1727896" indent="0">
-              <a:buNone/>
-              <a:defRPr sz="1080"/>
+            <a:lvl8pPr marL="1295842" indent="0">
+              <a:buNone/>
+              <a:defRPr sz="810"/>
             </a:lvl8pPr>
-            <a:lvl9pPr marL="1974738" indent="0">
-              <a:buNone/>
-              <a:defRPr sz="1080"/>
+            <a:lvl9pPr marL="1480962" indent="0">
+              <a:buNone/>
+              <a:defRPr sz="810"/>
             </a:lvl9pPr>
           </a:lstStyle>
           <a:p>
@@ -2294,8 +2296,8 @@
         </p:nvSpPr>
         <p:spPr>
           <a:xfrm>
-            <a:off x="340071" y="1728311"/>
-            <a:ext cx="1592351" cy="3201911"/>
+            <a:off x="340071" y="850583"/>
+            <a:ext cx="1592351" cy="1575809"/>
           </a:xfrm>
         </p:spPr>
         <p:txBody>
@@ -2303,39 +2305,39 @@
           <a:lstStyle>
             <a:lvl1pPr marL="0" indent="0">
               <a:buNone/>
-              <a:defRPr sz="864"/>
+              <a:defRPr sz="648"/>
             </a:lvl1pPr>
-            <a:lvl2pPr marL="246842" indent="0">
-              <a:buNone/>
-              <a:defRPr sz="756"/>
+            <a:lvl2pPr marL="185120" indent="0">
+              <a:buNone/>
+              <a:defRPr sz="567"/>
             </a:lvl2pPr>
-            <a:lvl3pPr marL="493685" indent="0">
-              <a:buNone/>
-              <a:defRPr sz="648"/>
+            <a:lvl3pPr marL="370241" indent="0">
+              <a:buNone/>
+              <a:defRPr sz="486"/>
             </a:lvl3pPr>
-            <a:lvl4pPr marL="740527" indent="0">
-              <a:buNone/>
-              <a:defRPr sz="540"/>
+            <a:lvl4pPr marL="555361" indent="0">
+              <a:buNone/>
+              <a:defRPr sz="405"/>
             </a:lvl4pPr>
-            <a:lvl5pPr marL="987369" indent="0">
-              <a:buNone/>
-              <a:defRPr sz="540"/>
+            <a:lvl5pPr marL="740481" indent="0">
+              <a:buNone/>
+              <a:defRPr sz="405"/>
             </a:lvl5pPr>
-            <a:lvl6pPr marL="1234211" indent="0">
-              <a:buNone/>
-              <a:defRPr sz="540"/>
+            <a:lvl6pPr marL="925601" indent="0">
+              <a:buNone/>
+              <a:defRPr sz="405"/>
             </a:lvl6pPr>
-            <a:lvl7pPr marL="1481054" indent="0">
-              <a:buNone/>
-              <a:defRPr sz="540"/>
+            <a:lvl7pPr marL="1110722" indent="0">
+              <a:buNone/>
+              <a:defRPr sz="405"/>
             </a:lvl7pPr>
-            <a:lvl8pPr marL="1727896" indent="0">
-              <a:buNone/>
-              <a:defRPr sz="540"/>
+            <a:lvl8pPr marL="1295842" indent="0">
+              <a:buNone/>
+              <a:defRPr sz="405"/>
             </a:lvl8pPr>
-            <a:lvl9pPr marL="1974738" indent="0">
-              <a:buNone/>
-              <a:defRPr sz="540"/>
+            <a:lvl9pPr marL="1480962" indent="0">
+              <a:buNone/>
+              <a:defRPr sz="405"/>
             </a:lvl9pPr>
           </a:lstStyle>
           <a:p>
@@ -2364,7 +2366,7 @@
           <a:p>
             <a:fld id="{577AF912-6C46-438F-8FD8-D583EE625B1A}" type="datetimeFigureOut">
               <a:rPr lang="en-US" smtClean="0"/>
-              <a:t>3/26/2016</a:t>
+              <a:t>6/27/2016</a:t>
             </a:fld>
             <a:endParaRPr lang="en-US"/>
           </a:p>
@@ -2415,7 +2417,7 @@
     </p:spTree>
     <p:extLst>
       <p:ext uri="{BB962C8B-B14F-4D97-AF65-F5344CB8AC3E}">
-        <p14:creationId xmlns:p14="http://schemas.microsoft.com/office/powerpoint/2010/main" val="1964506477"/>
+        <p14:creationId xmlns:p14="http://schemas.microsoft.com/office/powerpoint/2010/main" val="596138112"/>
       </p:ext>
     </p:extLst>
   </p:cSld>
@@ -2459,8 +2461,8 @@
         </p:nvSpPr>
         <p:spPr>
           <a:xfrm>
-            <a:off x="339428" y="306723"/>
-            <a:ext cx="4258270" cy="1113534"/>
+            <a:off x="339428" y="150952"/>
+            <a:ext cx="4258270" cy="548022"/>
           </a:xfrm>
           <a:prstGeom prst="rect">
             <a:avLst/>
@@ -2492,8 +2494,8 @@
         </p:nvSpPr>
         <p:spPr>
           <a:xfrm>
-            <a:off x="339428" y="1533609"/>
-            <a:ext cx="4258270" cy="3655326"/>
+            <a:off x="339428" y="754761"/>
+            <a:ext cx="4258270" cy="1798956"/>
           </a:xfrm>
           <a:prstGeom prst="rect">
             <a:avLst/>
@@ -2554,8 +2556,8 @@
         </p:nvSpPr>
         <p:spPr>
           <a:xfrm>
-            <a:off x="339427" y="5339630"/>
-            <a:ext cx="1110853" cy="306722"/>
+            <a:off x="339427" y="2627880"/>
+            <a:ext cx="1110853" cy="150952"/>
           </a:xfrm>
           <a:prstGeom prst="rect">
             <a:avLst/>
@@ -2565,7 +2567,7 @@
           <a:bodyPr vert="horz" lIns="91440" tIns="45720" rIns="91440" bIns="45720" rtlCol="0" anchor="ctr"/>
           <a:lstStyle>
             <a:lvl1pPr algn="l">
-              <a:defRPr sz="648">
+              <a:defRPr sz="486">
                 <a:solidFill>
                   <a:schemeClr val="tx1">
                     <a:tint val="75000"/>
@@ -2577,7 +2579,7 @@
           <a:p>
             <a:fld id="{577AF912-6C46-438F-8FD8-D583EE625B1A}" type="datetimeFigureOut">
               <a:rPr lang="en-US" smtClean="0"/>
-              <a:t>3/26/2016</a:t>
+              <a:t>6/27/2016</a:t>
             </a:fld>
             <a:endParaRPr lang="en-US"/>
           </a:p>
@@ -2595,8 +2597,8 @@
         </p:nvSpPr>
         <p:spPr>
           <a:xfrm>
-            <a:off x="1635423" y="5339630"/>
-            <a:ext cx="1666280" cy="306722"/>
+            <a:off x="1635423" y="2627880"/>
+            <a:ext cx="1666280" cy="150952"/>
           </a:xfrm>
           <a:prstGeom prst="rect">
             <a:avLst/>
@@ -2606,7 +2608,7 @@
           <a:bodyPr vert="horz" lIns="91440" tIns="45720" rIns="91440" bIns="45720" rtlCol="0" anchor="ctr"/>
           <a:lstStyle>
             <a:lvl1pPr algn="ctr">
-              <a:defRPr sz="648">
+              <a:defRPr sz="486">
                 <a:solidFill>
                   <a:schemeClr val="tx1">
                     <a:tint val="75000"/>
@@ -2632,8 +2634,8 @@
         </p:nvSpPr>
         <p:spPr>
           <a:xfrm>
-            <a:off x="3486845" y="5339630"/>
-            <a:ext cx="1110853" cy="306722"/>
+            <a:off x="3486845" y="2627880"/>
+            <a:ext cx="1110853" cy="150952"/>
           </a:xfrm>
           <a:prstGeom prst="rect">
             <a:avLst/>
@@ -2643,7 +2645,7 @@
           <a:bodyPr vert="horz" lIns="91440" tIns="45720" rIns="91440" bIns="45720" rtlCol="0" anchor="ctr"/>
           <a:lstStyle>
             <a:lvl1pPr algn="r">
-              <a:defRPr sz="648">
+              <a:defRPr sz="486">
                 <a:solidFill>
                   <a:schemeClr val="tx1">
                     <a:tint val="75000"/>
@@ -2664,27 +2666,27 @@
     </p:spTree>
     <p:extLst>
       <p:ext uri="{BB962C8B-B14F-4D97-AF65-F5344CB8AC3E}">
-        <p14:creationId xmlns:p14="http://schemas.microsoft.com/office/powerpoint/2010/main" val="1038290728"/>
+        <p14:creationId xmlns:p14="http://schemas.microsoft.com/office/powerpoint/2010/main" val="1054657378"/>
       </p:ext>
     </p:extLst>
   </p:cSld>
   <p:clrMap bg1="lt1" tx1="dk1" bg2="lt2" tx2="dk2" accent1="accent1" accent2="accent2" accent3="accent3" accent4="accent4" accent5="accent5" accent6="accent6" hlink="hlink" folHlink="folHlink"/>
   <p:sldLayoutIdLst>
-    <p:sldLayoutId id="2147483841" r:id="rId1"/>
-    <p:sldLayoutId id="2147483842" r:id="rId2"/>
-    <p:sldLayoutId id="2147483843" r:id="rId3"/>
-    <p:sldLayoutId id="2147483844" r:id="rId4"/>
-    <p:sldLayoutId id="2147483845" r:id="rId5"/>
-    <p:sldLayoutId id="2147483846" r:id="rId6"/>
-    <p:sldLayoutId id="2147483847" r:id="rId7"/>
-    <p:sldLayoutId id="2147483848" r:id="rId8"/>
-    <p:sldLayoutId id="2147483849" r:id="rId9"/>
-    <p:sldLayoutId id="2147483850" r:id="rId10"/>
-    <p:sldLayoutId id="2147483851" r:id="rId11"/>
+    <p:sldLayoutId id="2147483889" r:id="rId1"/>
+    <p:sldLayoutId id="2147483890" r:id="rId2"/>
+    <p:sldLayoutId id="2147483891" r:id="rId3"/>
+    <p:sldLayoutId id="2147483892" r:id="rId4"/>
+    <p:sldLayoutId id="2147483893" r:id="rId5"/>
+    <p:sldLayoutId id="2147483894" r:id="rId6"/>
+    <p:sldLayoutId id="2147483895" r:id="rId7"/>
+    <p:sldLayoutId id="2147483896" r:id="rId8"/>
+    <p:sldLayoutId id="2147483897" r:id="rId9"/>
+    <p:sldLayoutId id="2147483898" r:id="rId10"/>
+    <p:sldLayoutId id="2147483899" r:id="rId11"/>
   </p:sldLayoutIdLst>
   <p:txStyles>
     <p:titleStyle>
-      <a:lvl1pPr algn="l" defTabSz="493685" rtl="0" eaLnBrk="1" latinLnBrk="0" hangingPunct="1">
+      <a:lvl1pPr algn="l" defTabSz="370241" rtl="0" eaLnBrk="1" latinLnBrk="0" hangingPunct="1">
         <a:lnSpc>
           <a:spcPct val="90000"/>
         </a:lnSpc>
@@ -2692,7 +2694,7 @@
           <a:spcPct val="0"/>
         </a:spcBef>
         <a:buNone/>
-        <a:defRPr sz="2376" kern="1200">
+        <a:defRPr sz="1782" kern="1200">
           <a:solidFill>
             <a:schemeClr val="tx1"/>
           </a:solidFill>
@@ -2703,16 +2705,16 @@
       </a:lvl1pPr>
     </p:titleStyle>
     <p:bodyStyle>
-      <a:lvl1pPr marL="123421" indent="-123421" algn="l" defTabSz="493685" rtl="0" eaLnBrk="1" latinLnBrk="0" hangingPunct="1">
+      <a:lvl1pPr marL="92560" indent="-92560" algn="l" defTabSz="370241" rtl="0" eaLnBrk="1" latinLnBrk="0" hangingPunct="1">
         <a:lnSpc>
           <a:spcPct val="90000"/>
         </a:lnSpc>
         <a:spcBef>
-          <a:spcPts val="540"/>
+          <a:spcPts val="405"/>
         </a:spcBef>
         <a:buFont typeface="Arial" panose="020B0604020202020204" pitchFamily="34" charset="0"/>
         <a:buChar char="•"/>
-        <a:defRPr sz="1512" kern="1200">
+        <a:defRPr sz="1134" kern="1200">
           <a:solidFill>
             <a:schemeClr val="tx1"/>
           </a:solidFill>
@@ -2721,48 +2723,12 @@
           <a:cs typeface="+mn-cs"/>
         </a:defRPr>
       </a:lvl1pPr>
-      <a:lvl2pPr marL="370263" indent="-123421" algn="l" defTabSz="493685" rtl="0" eaLnBrk="1" latinLnBrk="0" hangingPunct="1">
+      <a:lvl2pPr marL="277680" indent="-92560" algn="l" defTabSz="370241" rtl="0" eaLnBrk="1" latinLnBrk="0" hangingPunct="1">
         <a:lnSpc>
           <a:spcPct val="90000"/>
         </a:lnSpc>
         <a:spcBef>
-          <a:spcPts val="270"/>
-        </a:spcBef>
-        <a:buFont typeface="Arial" panose="020B0604020202020204" pitchFamily="34" charset="0"/>
-        <a:buChar char="•"/>
-        <a:defRPr sz="1296" kern="1200">
-          <a:solidFill>
-            <a:schemeClr val="tx1"/>
-          </a:solidFill>
-          <a:latin typeface="+mn-lt"/>
-          <a:ea typeface="+mn-ea"/>
-          <a:cs typeface="+mn-cs"/>
-        </a:defRPr>
-      </a:lvl2pPr>
-      <a:lvl3pPr marL="617106" indent="-123421" algn="l" defTabSz="493685" rtl="0" eaLnBrk="1" latinLnBrk="0" hangingPunct="1">
-        <a:lnSpc>
-          <a:spcPct val="90000"/>
-        </a:lnSpc>
-        <a:spcBef>
-          <a:spcPts val="270"/>
-        </a:spcBef>
-        <a:buFont typeface="Arial" panose="020B0604020202020204" pitchFamily="34" charset="0"/>
-        <a:buChar char="•"/>
-        <a:defRPr sz="1080" kern="1200">
-          <a:solidFill>
-            <a:schemeClr val="tx1"/>
-          </a:solidFill>
-          <a:latin typeface="+mn-lt"/>
-          <a:ea typeface="+mn-ea"/>
-          <a:cs typeface="+mn-cs"/>
-        </a:defRPr>
-      </a:lvl3pPr>
-      <a:lvl4pPr marL="863948" indent="-123421" algn="l" defTabSz="493685" rtl="0" eaLnBrk="1" latinLnBrk="0" hangingPunct="1">
-        <a:lnSpc>
-          <a:spcPct val="90000"/>
-        </a:lnSpc>
-        <a:spcBef>
-          <a:spcPts val="270"/>
+          <a:spcPts val="202"/>
         </a:spcBef>
         <a:buFont typeface="Arial" panose="020B0604020202020204" pitchFamily="34" charset="0"/>
         <a:buChar char="•"/>
@@ -2774,17 +2740,53 @@
           <a:ea typeface="+mn-ea"/>
           <a:cs typeface="+mn-cs"/>
         </a:defRPr>
-      </a:lvl4pPr>
-      <a:lvl5pPr marL="1110790" indent="-123421" algn="l" defTabSz="493685" rtl="0" eaLnBrk="1" latinLnBrk="0" hangingPunct="1">
+      </a:lvl2pPr>
+      <a:lvl3pPr marL="462801" indent="-92560" algn="l" defTabSz="370241" rtl="0" eaLnBrk="1" latinLnBrk="0" hangingPunct="1">
         <a:lnSpc>
           <a:spcPct val="90000"/>
         </a:lnSpc>
         <a:spcBef>
-          <a:spcPts val="270"/>
+          <a:spcPts val="202"/>
         </a:spcBef>
         <a:buFont typeface="Arial" panose="020B0604020202020204" pitchFamily="34" charset="0"/>
         <a:buChar char="•"/>
-        <a:defRPr sz="972" kern="1200">
+        <a:defRPr sz="810" kern="1200">
+          <a:solidFill>
+            <a:schemeClr val="tx1"/>
+          </a:solidFill>
+          <a:latin typeface="+mn-lt"/>
+          <a:ea typeface="+mn-ea"/>
+          <a:cs typeface="+mn-cs"/>
+        </a:defRPr>
+      </a:lvl3pPr>
+      <a:lvl4pPr marL="647921" indent="-92560" algn="l" defTabSz="370241" rtl="0" eaLnBrk="1" latinLnBrk="0" hangingPunct="1">
+        <a:lnSpc>
+          <a:spcPct val="90000"/>
+        </a:lnSpc>
+        <a:spcBef>
+          <a:spcPts val="202"/>
+        </a:spcBef>
+        <a:buFont typeface="Arial" panose="020B0604020202020204" pitchFamily="34" charset="0"/>
+        <a:buChar char="•"/>
+        <a:defRPr sz="729" kern="1200">
+          <a:solidFill>
+            <a:schemeClr val="tx1"/>
+          </a:solidFill>
+          <a:latin typeface="+mn-lt"/>
+          <a:ea typeface="+mn-ea"/>
+          <a:cs typeface="+mn-cs"/>
+        </a:defRPr>
+      </a:lvl4pPr>
+      <a:lvl5pPr marL="833041" indent="-92560" algn="l" defTabSz="370241" rtl="0" eaLnBrk="1" latinLnBrk="0" hangingPunct="1">
+        <a:lnSpc>
+          <a:spcPct val="90000"/>
+        </a:lnSpc>
+        <a:spcBef>
+          <a:spcPts val="202"/>
+        </a:spcBef>
+        <a:buFont typeface="Arial" panose="020B0604020202020204" pitchFamily="34" charset="0"/>
+        <a:buChar char="•"/>
+        <a:defRPr sz="729" kern="1200">
           <a:solidFill>
             <a:schemeClr val="tx1"/>
           </a:solidFill>
@@ -2793,16 +2795,16 @@
           <a:cs typeface="+mn-cs"/>
         </a:defRPr>
       </a:lvl5pPr>
-      <a:lvl6pPr marL="1357633" indent="-123421" algn="l" defTabSz="493685" rtl="0" eaLnBrk="1" latinLnBrk="0" hangingPunct="1">
+      <a:lvl6pPr marL="1018162" indent="-92560" algn="l" defTabSz="370241" rtl="0" eaLnBrk="1" latinLnBrk="0" hangingPunct="1">
         <a:lnSpc>
           <a:spcPct val="90000"/>
         </a:lnSpc>
         <a:spcBef>
-          <a:spcPts val="270"/>
+          <a:spcPts val="202"/>
         </a:spcBef>
         <a:buFont typeface="Arial" panose="020B0604020202020204" pitchFamily="34" charset="0"/>
         <a:buChar char="•"/>
-        <a:defRPr sz="972" kern="1200">
+        <a:defRPr sz="729" kern="1200">
           <a:solidFill>
             <a:schemeClr val="tx1"/>
           </a:solidFill>
@@ -2811,16 +2813,16 @@
           <a:cs typeface="+mn-cs"/>
         </a:defRPr>
       </a:lvl6pPr>
-      <a:lvl7pPr marL="1604475" indent="-123421" algn="l" defTabSz="493685" rtl="0" eaLnBrk="1" latinLnBrk="0" hangingPunct="1">
+      <a:lvl7pPr marL="1203282" indent="-92560" algn="l" defTabSz="370241" rtl="0" eaLnBrk="1" latinLnBrk="0" hangingPunct="1">
         <a:lnSpc>
           <a:spcPct val="90000"/>
         </a:lnSpc>
         <a:spcBef>
-          <a:spcPts val="270"/>
+          <a:spcPts val="202"/>
         </a:spcBef>
         <a:buFont typeface="Arial" panose="020B0604020202020204" pitchFamily="34" charset="0"/>
         <a:buChar char="•"/>
-        <a:defRPr sz="972" kern="1200">
+        <a:defRPr sz="729" kern="1200">
           <a:solidFill>
             <a:schemeClr val="tx1"/>
           </a:solidFill>
@@ -2829,16 +2831,16 @@
           <a:cs typeface="+mn-cs"/>
         </a:defRPr>
       </a:lvl7pPr>
-      <a:lvl8pPr marL="1851317" indent="-123421" algn="l" defTabSz="493685" rtl="0" eaLnBrk="1" latinLnBrk="0" hangingPunct="1">
+      <a:lvl8pPr marL="1388402" indent="-92560" algn="l" defTabSz="370241" rtl="0" eaLnBrk="1" latinLnBrk="0" hangingPunct="1">
         <a:lnSpc>
           <a:spcPct val="90000"/>
         </a:lnSpc>
         <a:spcBef>
-          <a:spcPts val="270"/>
+          <a:spcPts val="202"/>
         </a:spcBef>
         <a:buFont typeface="Arial" panose="020B0604020202020204" pitchFamily="34" charset="0"/>
         <a:buChar char="•"/>
-        <a:defRPr sz="972" kern="1200">
+        <a:defRPr sz="729" kern="1200">
           <a:solidFill>
             <a:schemeClr val="tx1"/>
           </a:solidFill>
@@ -2847,16 +2849,16 @@
           <a:cs typeface="+mn-cs"/>
         </a:defRPr>
       </a:lvl8pPr>
-      <a:lvl9pPr marL="2098159" indent="-123421" algn="l" defTabSz="493685" rtl="0" eaLnBrk="1" latinLnBrk="0" hangingPunct="1">
+      <a:lvl9pPr marL="1573522" indent="-92560" algn="l" defTabSz="370241" rtl="0" eaLnBrk="1" latinLnBrk="0" hangingPunct="1">
         <a:lnSpc>
           <a:spcPct val="90000"/>
         </a:lnSpc>
         <a:spcBef>
-          <a:spcPts val="270"/>
+          <a:spcPts val="202"/>
         </a:spcBef>
         <a:buFont typeface="Arial" panose="020B0604020202020204" pitchFamily="34" charset="0"/>
         <a:buChar char="•"/>
-        <a:defRPr sz="972" kern="1200">
+        <a:defRPr sz="729" kern="1200">
           <a:solidFill>
             <a:schemeClr val="tx1"/>
           </a:solidFill>
@@ -2870,8 +2872,8 @@
       <a:defPPr>
         <a:defRPr lang="en-US"/>
       </a:defPPr>
-      <a:lvl1pPr marL="0" algn="l" defTabSz="493685" rtl="0" eaLnBrk="1" latinLnBrk="0" hangingPunct="1">
-        <a:defRPr sz="972" kern="1200">
+      <a:lvl1pPr marL="0" algn="l" defTabSz="370241" rtl="0" eaLnBrk="1" latinLnBrk="0" hangingPunct="1">
+        <a:defRPr sz="729" kern="1200">
           <a:solidFill>
             <a:schemeClr val="tx1"/>
           </a:solidFill>
@@ -2880,8 +2882,8 @@
           <a:cs typeface="+mn-cs"/>
         </a:defRPr>
       </a:lvl1pPr>
-      <a:lvl2pPr marL="246842" algn="l" defTabSz="493685" rtl="0" eaLnBrk="1" latinLnBrk="0" hangingPunct="1">
-        <a:defRPr sz="972" kern="1200">
+      <a:lvl2pPr marL="185120" algn="l" defTabSz="370241" rtl="0" eaLnBrk="1" latinLnBrk="0" hangingPunct="1">
+        <a:defRPr sz="729" kern="1200">
           <a:solidFill>
             <a:schemeClr val="tx1"/>
           </a:solidFill>
@@ -2890,8 +2892,8 @@
           <a:cs typeface="+mn-cs"/>
         </a:defRPr>
       </a:lvl2pPr>
-      <a:lvl3pPr marL="493685" algn="l" defTabSz="493685" rtl="0" eaLnBrk="1" latinLnBrk="0" hangingPunct="1">
-        <a:defRPr sz="972" kern="1200">
+      <a:lvl3pPr marL="370241" algn="l" defTabSz="370241" rtl="0" eaLnBrk="1" latinLnBrk="0" hangingPunct="1">
+        <a:defRPr sz="729" kern="1200">
           <a:solidFill>
             <a:schemeClr val="tx1"/>
           </a:solidFill>
@@ -2900,8 +2902,8 @@
           <a:cs typeface="+mn-cs"/>
         </a:defRPr>
       </a:lvl3pPr>
-      <a:lvl4pPr marL="740527" algn="l" defTabSz="493685" rtl="0" eaLnBrk="1" latinLnBrk="0" hangingPunct="1">
-        <a:defRPr sz="972" kern="1200">
+      <a:lvl4pPr marL="555361" algn="l" defTabSz="370241" rtl="0" eaLnBrk="1" latinLnBrk="0" hangingPunct="1">
+        <a:defRPr sz="729" kern="1200">
           <a:solidFill>
             <a:schemeClr val="tx1"/>
           </a:solidFill>
@@ -2910,8 +2912,8 @@
           <a:cs typeface="+mn-cs"/>
         </a:defRPr>
       </a:lvl4pPr>
-      <a:lvl5pPr marL="987369" algn="l" defTabSz="493685" rtl="0" eaLnBrk="1" latinLnBrk="0" hangingPunct="1">
-        <a:defRPr sz="972" kern="1200">
+      <a:lvl5pPr marL="740481" algn="l" defTabSz="370241" rtl="0" eaLnBrk="1" latinLnBrk="0" hangingPunct="1">
+        <a:defRPr sz="729" kern="1200">
           <a:solidFill>
             <a:schemeClr val="tx1"/>
           </a:solidFill>
@@ -2920,8 +2922,8 @@
           <a:cs typeface="+mn-cs"/>
         </a:defRPr>
       </a:lvl5pPr>
-      <a:lvl6pPr marL="1234211" algn="l" defTabSz="493685" rtl="0" eaLnBrk="1" latinLnBrk="0" hangingPunct="1">
-        <a:defRPr sz="972" kern="1200">
+      <a:lvl6pPr marL="925601" algn="l" defTabSz="370241" rtl="0" eaLnBrk="1" latinLnBrk="0" hangingPunct="1">
+        <a:defRPr sz="729" kern="1200">
           <a:solidFill>
             <a:schemeClr val="tx1"/>
           </a:solidFill>
@@ -2930,8 +2932,8 @@
           <a:cs typeface="+mn-cs"/>
         </a:defRPr>
       </a:lvl6pPr>
-      <a:lvl7pPr marL="1481054" algn="l" defTabSz="493685" rtl="0" eaLnBrk="1" latinLnBrk="0" hangingPunct="1">
-        <a:defRPr sz="972" kern="1200">
+      <a:lvl7pPr marL="1110722" algn="l" defTabSz="370241" rtl="0" eaLnBrk="1" latinLnBrk="0" hangingPunct="1">
+        <a:defRPr sz="729" kern="1200">
           <a:solidFill>
             <a:schemeClr val="tx1"/>
           </a:solidFill>
@@ -2940,8 +2942,8 @@
           <a:cs typeface="+mn-cs"/>
         </a:defRPr>
       </a:lvl7pPr>
-      <a:lvl8pPr marL="1727896" algn="l" defTabSz="493685" rtl="0" eaLnBrk="1" latinLnBrk="0" hangingPunct="1">
-        <a:defRPr sz="972" kern="1200">
+      <a:lvl8pPr marL="1295842" algn="l" defTabSz="370241" rtl="0" eaLnBrk="1" latinLnBrk="0" hangingPunct="1">
+        <a:defRPr sz="729" kern="1200">
           <a:solidFill>
             <a:schemeClr val="tx1"/>
           </a:solidFill>
@@ -2950,8 +2952,8 @@
           <a:cs typeface="+mn-cs"/>
         </a:defRPr>
       </a:lvl8pPr>
-      <a:lvl9pPr marL="1974738" algn="l" defTabSz="493685" rtl="0" eaLnBrk="1" latinLnBrk="0" hangingPunct="1">
-        <a:defRPr sz="972" kern="1200">
+      <a:lvl9pPr marL="1480962" algn="l" defTabSz="370241" rtl="0" eaLnBrk="1" latinLnBrk="0" hangingPunct="1">
+        <a:defRPr sz="729" kern="1200">
           <a:solidFill>
             <a:schemeClr val="tx1"/>
           </a:solidFill>
@@ -2984,332 +2986,1050 @@
       </p:grpSpPr>
       <p:grpSp>
         <p:nvGrpSpPr>
-          <p:cNvPr id="5" name="Group 4"/>
+          <p:cNvPr id="44" name="Group 43"/>
           <p:cNvGrpSpPr/>
           <p:nvPr/>
         </p:nvGrpSpPr>
         <p:grpSpPr>
           <a:xfrm>
-            <a:off x="142469" y="186022"/>
-            <a:ext cx="4637588" cy="5575016"/>
-            <a:chOff x="142469" y="663724"/>
-            <a:chExt cx="4637588" cy="5575016"/>
+            <a:off x="-91418" y="0"/>
+            <a:ext cx="4982401" cy="2825877"/>
+            <a:chOff x="-104460" y="12049"/>
+            <a:chExt cx="4982401" cy="2825877"/>
           </a:xfrm>
         </p:grpSpPr>
-        <p:pic>
-          <p:nvPicPr>
-            <p:cNvPr id="3" name="Picture 2"/>
-            <p:cNvPicPr>
-              <a:picLocks noChangeAspect="1"/>
-            </p:cNvPicPr>
+        <p:grpSp>
+          <p:nvGrpSpPr>
+            <p:cNvPr id="37" name="Group 36"/>
+            <p:cNvGrpSpPr/>
             <p:nvPr/>
-          </p:nvPicPr>
-          <p:blipFill rotWithShape="1">
-            <a:blip r:embed="rId2" cstate="print">
-              <a:extLst>
-                <a:ext uri="{28A0092B-C50C-407E-A947-70E740481C1C}">
-                  <a14:useLocalDpi xmlns:a14="http://schemas.microsoft.com/office/drawing/2010/main" val="0"/>
-                </a:ext>
-              </a:extLst>
-            </a:blip>
-            <a:srcRect l="7342" t="4635" r="14737" b="18389"/>
-            <a:stretch/>
-          </p:blipFill>
-          <p:spPr>
+          </p:nvGrpSpPr>
+          <p:grpSpPr>
             <a:xfrm>
-              <a:off x="150699" y="663724"/>
-              <a:ext cx="4613177" cy="3416962"/>
+              <a:off x="-104460" y="12049"/>
+              <a:ext cx="4982401" cy="2825877"/>
+              <a:chOff x="-104460" y="12049"/>
+              <a:chExt cx="4982401" cy="2825877"/>
             </a:xfrm>
-            <a:prstGeom prst="rect">
-              <a:avLst/>
-            </a:prstGeom>
-          </p:spPr>
-        </p:pic>
-        <p:pic>
-          <p:nvPicPr>
-            <p:cNvPr id="2" name="Picture 1"/>
-            <p:cNvPicPr>
-              <a:picLocks noChangeAspect="1"/>
-            </p:cNvPicPr>
+          </p:grpSpPr>
+          <p:grpSp>
+            <p:nvGrpSpPr>
+              <p:cNvPr id="5" name="Group 4"/>
+              <p:cNvGrpSpPr>
+                <a:grpSpLocks noChangeAspect="1"/>
+              </p:cNvGrpSpPr>
+              <p:nvPr/>
+            </p:nvGrpSpPr>
+            <p:grpSpPr>
+              <a:xfrm>
+                <a:off x="2559149" y="12049"/>
+                <a:ext cx="2318792" cy="2825877"/>
+                <a:chOff x="142469" y="600880"/>
+                <a:chExt cx="4637588" cy="5651754"/>
+              </a:xfrm>
+            </p:grpSpPr>
+            <p:pic>
+              <p:nvPicPr>
+                <p:cNvPr id="3" name="Picture 2"/>
+                <p:cNvPicPr>
+                  <a:picLocks noChangeAspect="1"/>
+                </p:cNvPicPr>
+                <p:nvPr/>
+              </p:nvPicPr>
+              <p:blipFill rotWithShape="1">
+                <a:blip r:embed="rId2" cstate="print">
+                  <a:extLst>
+                    <a:ext uri="{28A0092B-C50C-407E-A947-70E740481C1C}">
+                      <a14:useLocalDpi xmlns:a14="http://schemas.microsoft.com/office/drawing/2010/main" val="0"/>
+                    </a:ext>
+                  </a:extLst>
+                </a:blip>
+                <a:srcRect l="7342" t="4635" r="14737" b="18389"/>
+                <a:stretch/>
+              </p:blipFill>
+              <p:spPr>
+                <a:xfrm>
+                  <a:off x="150699" y="663724"/>
+                  <a:ext cx="4613177" cy="3416962"/>
+                </a:xfrm>
+                <a:prstGeom prst="rect">
+                  <a:avLst/>
+                </a:prstGeom>
+              </p:spPr>
+            </p:pic>
+            <p:pic>
+              <p:nvPicPr>
+                <p:cNvPr id="2" name="Picture 1"/>
+                <p:cNvPicPr>
+                  <a:picLocks noChangeAspect="1"/>
+                </p:cNvPicPr>
+                <p:nvPr/>
+              </p:nvPicPr>
+              <p:blipFill rotWithShape="1">
+                <a:blip r:embed="rId3" cstate="print">
+                  <a:extLst>
+                    <a:ext uri="{28A0092B-C50C-407E-A947-70E740481C1C}">
+                      <a14:useLocalDpi xmlns:a14="http://schemas.microsoft.com/office/drawing/2010/main" val="0"/>
+                    </a:ext>
+                  </a:extLst>
+                </a:blip>
+                <a:srcRect t="31999" b="7488"/>
+                <a:stretch/>
+              </p:blipFill>
+              <p:spPr>
+                <a:xfrm>
+                  <a:off x="142469" y="4134573"/>
+                  <a:ext cx="4637588" cy="2104167"/>
+                </a:xfrm>
+                <a:prstGeom prst="rect">
+                  <a:avLst/>
+                </a:prstGeom>
+              </p:spPr>
+            </p:pic>
+            <p:sp>
+              <p:nvSpPr>
+                <p:cNvPr id="18" name="TextBox 17"/>
+                <p:cNvSpPr txBox="1"/>
+                <p:nvPr/>
+              </p:nvSpPr>
+              <p:spPr>
+                <a:xfrm>
+                  <a:off x="1583828" y="5236972"/>
+                  <a:ext cx="1878762" cy="1015662"/>
+                </a:xfrm>
+                <a:prstGeom prst="rect">
+                  <a:avLst/>
+                </a:prstGeom>
+                <a:noFill/>
+              </p:spPr>
+              <p:txBody>
+                <a:bodyPr wrap="square" rtlCol="0">
+                  <a:spAutoFit/>
+                </a:bodyPr>
+                <a:lstStyle/>
+                <a:p>
+                  <a:pPr algn="ctr"/>
+                  <a:r>
+                    <a:rPr lang="en-US" sz="900" dirty="0"/>
+                    <a:t>Geophone Sensors</a:t>
+                  </a:r>
+                </a:p>
+                <a:p>
+                  <a:pPr algn="ctr"/>
+                  <a:r>
+                    <a:rPr lang="en-US" sz="900" dirty="0"/>
+                    <a:t>with spikes</a:t>
+                  </a:r>
+                </a:p>
+              </p:txBody>
+            </p:sp>
+            <p:sp>
+              <p:nvSpPr>
+                <p:cNvPr id="24" name="TextBox 23"/>
+                <p:cNvSpPr txBox="1"/>
+                <p:nvPr/>
+              </p:nvSpPr>
+              <p:spPr>
+                <a:xfrm>
+                  <a:off x="1260214" y="600880"/>
+                  <a:ext cx="2237360" cy="800220"/>
+                </a:xfrm>
+                <a:prstGeom prst="rect">
+                  <a:avLst/>
+                </a:prstGeom>
+                <a:noFill/>
+              </p:spPr>
+              <p:txBody>
+                <a:bodyPr wrap="square" rtlCol="0">
+                  <a:spAutoFit/>
+                </a:bodyPr>
+                <a:lstStyle/>
+                <a:p>
+                  <a:pPr algn="ctr"/>
+                  <a:r>
+                    <a:rPr lang="en-US" sz="1000" dirty="0"/>
+                    <a:t>Seismic recorder (micro-controller)</a:t>
+                  </a:r>
+                </a:p>
+              </p:txBody>
+            </p:sp>
+            <p:sp>
+              <p:nvSpPr>
+                <p:cNvPr id="25" name="TextBox 24"/>
+                <p:cNvSpPr txBox="1"/>
+                <p:nvPr/>
+              </p:nvSpPr>
+              <p:spPr>
+                <a:xfrm>
+                  <a:off x="1701198" y="3492320"/>
+                  <a:ext cx="1845178" cy="492442"/>
+                </a:xfrm>
+                <a:prstGeom prst="rect">
+                  <a:avLst/>
+                </a:prstGeom>
+                <a:noFill/>
+              </p:spPr>
+              <p:txBody>
+                <a:bodyPr wrap="square" rtlCol="0">
+                  <a:spAutoFit/>
+                </a:bodyPr>
+                <a:lstStyle/>
+                <a:p>
+                  <a:pPr algn="ctr"/>
+                  <a:r>
+                    <a:rPr lang="en-US" sz="1000" dirty="0"/>
+                    <a:t>Battery</a:t>
+                  </a:r>
+                </a:p>
+              </p:txBody>
+            </p:sp>
+            <p:cxnSp>
+              <p:nvCxnSpPr>
+                <p:cNvPr id="21" name="Straight Arrow Connector 20"/>
+                <p:cNvCxnSpPr/>
+                <p:nvPr/>
+              </p:nvCxnSpPr>
+              <p:spPr>
+                <a:xfrm flipH="1" flipV="1">
+                  <a:off x="1153298" y="4926640"/>
+                  <a:ext cx="789959" cy="609484"/>
+                </a:xfrm>
+                <a:prstGeom prst="straightConnector1">
+                  <a:avLst/>
+                </a:prstGeom>
+                <a:ln w="28575" cmpd="sng">
+                  <a:solidFill>
+                    <a:schemeClr val="accent4">
+                      <a:lumMod val="60000"/>
+                      <a:lumOff val="40000"/>
+                    </a:schemeClr>
+                  </a:solidFill>
+                  <a:tailEnd type="stealth" w="med" len="lg"/>
+                </a:ln>
+              </p:spPr>
+              <p:style>
+                <a:lnRef idx="1">
+                  <a:schemeClr val="dk1"/>
+                </a:lnRef>
+                <a:fillRef idx="0">
+                  <a:schemeClr val="dk1"/>
+                </a:fillRef>
+                <a:effectRef idx="0">
+                  <a:schemeClr val="dk1"/>
+                </a:effectRef>
+                <a:fontRef idx="minor">
+                  <a:schemeClr val="tx1"/>
+                </a:fontRef>
+              </p:style>
+            </p:cxnSp>
+            <p:cxnSp>
+              <p:nvCxnSpPr>
+                <p:cNvPr id="29" name="Straight Arrow Connector 28"/>
+                <p:cNvCxnSpPr/>
+                <p:nvPr/>
+              </p:nvCxnSpPr>
+              <p:spPr>
+                <a:xfrm flipV="1">
+                  <a:off x="3122154" y="5536124"/>
+                  <a:ext cx="962923" cy="196598"/>
+                </a:xfrm>
+                <a:prstGeom prst="straightConnector1">
+                  <a:avLst/>
+                </a:prstGeom>
+                <a:ln w="28575" cmpd="sng">
+                  <a:solidFill>
+                    <a:schemeClr val="accent4">
+                      <a:lumMod val="60000"/>
+                      <a:lumOff val="40000"/>
+                    </a:schemeClr>
+                  </a:solidFill>
+                  <a:tailEnd type="stealth" w="med" len="lg"/>
+                </a:ln>
+              </p:spPr>
+              <p:style>
+                <a:lnRef idx="1">
+                  <a:schemeClr val="dk1"/>
+                </a:lnRef>
+                <a:fillRef idx="0">
+                  <a:schemeClr val="dk1"/>
+                </a:fillRef>
+                <a:effectRef idx="0">
+                  <a:schemeClr val="dk1"/>
+                </a:effectRef>
+                <a:fontRef idx="minor">
+                  <a:schemeClr val="tx1"/>
+                </a:fontRef>
+              </p:style>
+            </p:cxnSp>
+            <p:cxnSp>
+              <p:nvCxnSpPr>
+                <p:cNvPr id="34" name="Straight Arrow Connector 33"/>
+                <p:cNvCxnSpPr/>
+                <p:nvPr/>
+              </p:nvCxnSpPr>
+              <p:spPr>
+                <a:xfrm flipV="1">
+                  <a:off x="2623787" y="2811502"/>
+                  <a:ext cx="39620" cy="750912"/>
+                </a:xfrm>
+                <a:prstGeom prst="straightConnector1">
+                  <a:avLst/>
+                </a:prstGeom>
+                <a:ln w="28575" cmpd="sng">
+                  <a:solidFill>
+                    <a:schemeClr val="accent4">
+                      <a:lumMod val="60000"/>
+                      <a:lumOff val="40000"/>
+                    </a:schemeClr>
+                  </a:solidFill>
+                  <a:tailEnd type="stealth" w="med" len="lg"/>
+                </a:ln>
+              </p:spPr>
+              <p:style>
+                <a:lnRef idx="1">
+                  <a:schemeClr val="dk1"/>
+                </a:lnRef>
+                <a:fillRef idx="0">
+                  <a:schemeClr val="dk1"/>
+                </a:fillRef>
+                <a:effectRef idx="0">
+                  <a:schemeClr val="dk1"/>
+                </a:effectRef>
+                <a:fontRef idx="minor">
+                  <a:schemeClr val="tx1"/>
+                </a:fontRef>
+              </p:style>
+            </p:cxnSp>
+            <p:cxnSp>
+              <p:nvCxnSpPr>
+                <p:cNvPr id="32" name="Straight Arrow Connector 31"/>
+                <p:cNvCxnSpPr/>
+                <p:nvPr/>
+              </p:nvCxnSpPr>
+              <p:spPr>
+                <a:xfrm flipH="1">
+                  <a:off x="2300505" y="1338255"/>
+                  <a:ext cx="156782" cy="472910"/>
+                </a:xfrm>
+                <a:prstGeom prst="straightConnector1">
+                  <a:avLst/>
+                </a:prstGeom>
+                <a:ln w="28575" cmpd="sng">
+                  <a:solidFill>
+                    <a:schemeClr val="accent4">
+                      <a:lumMod val="60000"/>
+                      <a:lumOff val="40000"/>
+                    </a:schemeClr>
+                  </a:solidFill>
+                  <a:tailEnd type="stealth" w="med" len="lg"/>
+                </a:ln>
+              </p:spPr>
+              <p:style>
+                <a:lnRef idx="1">
+                  <a:schemeClr val="accent1"/>
+                </a:lnRef>
+                <a:fillRef idx="0">
+                  <a:schemeClr val="accent1"/>
+                </a:fillRef>
+                <a:effectRef idx="0">
+                  <a:schemeClr val="accent1"/>
+                </a:effectRef>
+                <a:fontRef idx="minor">
+                  <a:schemeClr val="tx1"/>
+                </a:fontRef>
+              </p:style>
+            </p:cxnSp>
+          </p:grpSp>
+          <p:pic>
+            <p:nvPicPr>
+              <p:cNvPr id="11" name="Picture 10"/>
+              <p:cNvPicPr>
+                <a:picLocks noChangeAspect="1"/>
+              </p:cNvPicPr>
+              <p:nvPr/>
+            </p:nvPicPr>
+            <p:blipFill rotWithShape="1">
+              <a:blip r:embed="rId4" cstate="print">
+                <a:extLst>
+                  <a:ext uri="{28A0092B-C50C-407E-A947-70E740481C1C}">
+                    <a14:useLocalDpi xmlns:a14="http://schemas.microsoft.com/office/drawing/2010/main" val="0"/>
+                  </a:ext>
+                </a:extLst>
+              </a:blip>
+              <a:srcRect t="16153" b="13536"/>
+              <a:stretch/>
+            </p:blipFill>
+            <p:spPr>
+              <a:xfrm rot="5400000">
+                <a:off x="432890" y="-350293"/>
+                <a:ext cx="1708481" cy="2483581"/>
+              </a:xfrm>
+              <a:prstGeom prst="rect">
+                <a:avLst/>
+              </a:prstGeom>
+            </p:spPr>
+          </p:pic>
+          <p:pic>
+            <p:nvPicPr>
+              <p:cNvPr id="12" name="Picture 11"/>
+              <p:cNvPicPr>
+                <a:picLocks noChangeAspect="1"/>
+              </p:cNvPicPr>
+              <p:nvPr/>
+            </p:nvPicPr>
+            <p:blipFill rotWithShape="1">
+              <a:blip r:embed="rId5" cstate="print">
+                <a:extLst>
+                  <a:ext uri="{28A0092B-C50C-407E-A947-70E740481C1C}">
+                    <a14:useLocalDpi xmlns:a14="http://schemas.microsoft.com/office/drawing/2010/main" val="0"/>
+                  </a:ext>
+                </a:extLst>
+              </a:blip>
+              <a:srcRect l="1224" t="8485" r="3568" b="20819"/>
+              <a:stretch/>
+            </p:blipFill>
+            <p:spPr>
+              <a:xfrm>
+                <a:off x="45340" y="1764832"/>
+                <a:ext cx="2483581" cy="1059934"/>
+              </a:xfrm>
+              <a:prstGeom prst="rect">
+                <a:avLst/>
+              </a:prstGeom>
+            </p:spPr>
+          </p:pic>
+          <p:sp>
+            <p:nvSpPr>
+              <p:cNvPr id="20" name="TextBox 19"/>
+              <p:cNvSpPr txBox="1"/>
+              <p:nvPr/>
+            </p:nvSpPr>
+            <p:spPr>
+              <a:xfrm>
+                <a:off x="1110974" y="32215"/>
+                <a:ext cx="1118679" cy="246221"/>
+              </a:xfrm>
+              <a:prstGeom prst="rect">
+                <a:avLst/>
+              </a:prstGeom>
+              <a:noFill/>
+            </p:spPr>
+            <p:txBody>
+              <a:bodyPr wrap="square" rtlCol="0">
+                <a:spAutoFit/>
+              </a:bodyPr>
+              <a:lstStyle/>
+              <a:p>
+                <a:pPr algn="ctr"/>
+                <a:r>
+                  <a:rPr lang="en-US" sz="1000" dirty="0"/>
+                  <a:t>Micro-controller</a:t>
+                </a:r>
+              </a:p>
+            </p:txBody>
+          </p:sp>
+          <p:sp>
+            <p:nvSpPr>
+              <p:cNvPr id="22" name="TextBox 21"/>
+              <p:cNvSpPr txBox="1"/>
+              <p:nvPr/>
+            </p:nvSpPr>
+            <p:spPr>
+              <a:xfrm>
+                <a:off x="168451" y="17323"/>
+                <a:ext cx="1118679" cy="246221"/>
+              </a:xfrm>
+              <a:prstGeom prst="rect">
+                <a:avLst/>
+              </a:prstGeom>
+              <a:noFill/>
+            </p:spPr>
+            <p:txBody>
+              <a:bodyPr wrap="square" rtlCol="0">
+                <a:spAutoFit/>
+              </a:bodyPr>
+              <a:lstStyle/>
+              <a:p>
+                <a:pPr algn="ctr"/>
+                <a:r>
+                  <a:rPr lang="en-US" sz="1000" dirty="0"/>
+                  <a:t>Amplifier</a:t>
+                </a:r>
+              </a:p>
+            </p:txBody>
+          </p:sp>
+          <p:sp>
+            <p:nvSpPr>
+              <p:cNvPr id="23" name="TextBox 22"/>
+              <p:cNvSpPr txBox="1"/>
+              <p:nvPr/>
+            </p:nvSpPr>
+            <p:spPr>
+              <a:xfrm>
+                <a:off x="551634" y="1411244"/>
+                <a:ext cx="1118679" cy="246221"/>
+              </a:xfrm>
+              <a:prstGeom prst="rect">
+                <a:avLst/>
+              </a:prstGeom>
+              <a:noFill/>
+            </p:spPr>
+            <p:txBody>
+              <a:bodyPr wrap="square" rtlCol="0">
+                <a:spAutoFit/>
+              </a:bodyPr>
+              <a:lstStyle/>
+              <a:p>
+                <a:pPr algn="ctr"/>
+                <a:r>
+                  <a:rPr lang="en-US" sz="1000" dirty="0"/>
+                  <a:t>Battery</a:t>
+                </a:r>
+              </a:p>
+            </p:txBody>
+          </p:sp>
+          <p:cxnSp>
+            <p:nvCxnSpPr>
+              <p:cNvPr id="26" name="Straight Arrow Connector 25"/>
+              <p:cNvCxnSpPr/>
+              <p:nvPr/>
+            </p:nvCxnSpPr>
+            <p:spPr>
+              <a:xfrm flipH="1">
+                <a:off x="1719196" y="212104"/>
+                <a:ext cx="1" cy="514508"/>
+              </a:xfrm>
+              <a:prstGeom prst="straightConnector1">
+                <a:avLst/>
+              </a:prstGeom>
+              <a:ln w="28575" cmpd="sng">
+                <a:solidFill>
+                  <a:schemeClr val="accent4">
+                    <a:lumMod val="60000"/>
+                    <a:lumOff val="40000"/>
+                  </a:schemeClr>
+                </a:solidFill>
+                <a:tailEnd type="stealth" w="med" len="lg"/>
+              </a:ln>
+            </p:spPr>
+            <p:style>
+              <a:lnRef idx="1">
+                <a:schemeClr val="accent1"/>
+              </a:lnRef>
+              <a:fillRef idx="0">
+                <a:schemeClr val="accent1"/>
+              </a:fillRef>
+              <a:effectRef idx="0">
+                <a:schemeClr val="accent1"/>
+              </a:effectRef>
+              <a:fontRef idx="minor">
+                <a:schemeClr val="tx1"/>
+              </a:fontRef>
+            </p:style>
+          </p:cxnSp>
+          <p:cxnSp>
+            <p:nvCxnSpPr>
+              <p:cNvPr id="27" name="Straight Arrow Connector 26"/>
+              <p:cNvCxnSpPr/>
+              <p:nvPr/>
+            </p:nvCxnSpPr>
+            <p:spPr>
+              <a:xfrm>
+                <a:off x="776205" y="210242"/>
+                <a:ext cx="1158" cy="377344"/>
+              </a:xfrm>
+              <a:prstGeom prst="straightConnector1">
+                <a:avLst/>
+              </a:prstGeom>
+              <a:ln w="28575" cmpd="sng">
+                <a:solidFill>
+                  <a:schemeClr val="accent4">
+                    <a:lumMod val="60000"/>
+                    <a:lumOff val="40000"/>
+                  </a:schemeClr>
+                </a:solidFill>
+                <a:tailEnd type="stealth" w="med" len="lg"/>
+              </a:ln>
+            </p:spPr>
+            <p:style>
+              <a:lnRef idx="1">
+                <a:schemeClr val="accent1"/>
+              </a:lnRef>
+              <a:fillRef idx="0">
+                <a:schemeClr val="accent1"/>
+              </a:fillRef>
+              <a:effectRef idx="0">
+                <a:schemeClr val="accent1"/>
+              </a:effectRef>
+              <a:fontRef idx="minor">
+                <a:schemeClr val="tx1"/>
+              </a:fontRef>
+            </p:style>
+          </p:cxnSp>
+          <p:cxnSp>
+            <p:nvCxnSpPr>
+              <p:cNvPr id="28" name="Straight Arrow Connector 27"/>
+              <p:cNvCxnSpPr>
+                <a:stCxn id="23" idx="0"/>
+              </p:cNvCxnSpPr>
+              <p:nvPr/>
+            </p:nvCxnSpPr>
+            <p:spPr>
+              <a:xfrm flipH="1" flipV="1">
+                <a:off x="727791" y="1087202"/>
+                <a:ext cx="383183" cy="324042"/>
+              </a:xfrm>
+              <a:prstGeom prst="straightConnector1">
+                <a:avLst/>
+              </a:prstGeom>
+              <a:ln w="28575" cmpd="sng">
+                <a:solidFill>
+                  <a:schemeClr val="accent4">
+                    <a:lumMod val="60000"/>
+                    <a:lumOff val="40000"/>
+                  </a:schemeClr>
+                </a:solidFill>
+                <a:tailEnd type="stealth" w="med" len="lg"/>
+              </a:ln>
+            </p:spPr>
+            <p:style>
+              <a:lnRef idx="1">
+                <a:schemeClr val="accent1"/>
+              </a:lnRef>
+              <a:fillRef idx="0">
+                <a:schemeClr val="accent1"/>
+              </a:fillRef>
+              <a:effectRef idx="0">
+                <a:schemeClr val="accent1"/>
+              </a:effectRef>
+              <a:fontRef idx="minor">
+                <a:schemeClr val="tx1"/>
+              </a:fontRef>
+            </p:style>
+          </p:cxnSp>
+          <p:sp>
+            <p:nvSpPr>
+              <p:cNvPr id="31" name="TextBox 30"/>
+              <p:cNvSpPr txBox="1"/>
+              <p:nvPr/>
+            </p:nvSpPr>
+            <p:spPr>
+              <a:xfrm>
+                <a:off x="-104460" y="1745738"/>
+                <a:ext cx="939380" cy="507831"/>
+              </a:xfrm>
+              <a:prstGeom prst="rect">
+                <a:avLst/>
+              </a:prstGeom>
+              <a:noFill/>
+            </p:spPr>
+            <p:txBody>
+              <a:bodyPr wrap="square" rtlCol="0">
+                <a:spAutoFit/>
+              </a:bodyPr>
+              <a:lstStyle/>
+              <a:p>
+                <a:pPr algn="ctr"/>
+                <a:r>
+                  <a:rPr lang="en-US" sz="900" dirty="0"/>
+                  <a:t>Geophone Sensors</a:t>
+                </a:r>
+              </a:p>
+              <a:p>
+                <a:pPr algn="ctr"/>
+                <a:r>
+                  <a:rPr lang="en-US" sz="900" dirty="0"/>
+                  <a:t>with spikes</a:t>
+                </a:r>
+              </a:p>
+            </p:txBody>
+          </p:sp>
+          <p:cxnSp>
+            <p:nvCxnSpPr>
+              <p:cNvPr id="33" name="Straight Arrow Connector 32"/>
+              <p:cNvCxnSpPr/>
+              <p:nvPr/>
+            </p:nvCxnSpPr>
+            <p:spPr>
+              <a:xfrm>
+                <a:off x="551634" y="2220010"/>
+                <a:ext cx="559339" cy="308810"/>
+              </a:xfrm>
+              <a:prstGeom prst="straightConnector1">
+                <a:avLst/>
+              </a:prstGeom>
+              <a:ln w="28575" cmpd="sng">
+                <a:solidFill>
+                  <a:schemeClr val="accent4">
+                    <a:lumMod val="60000"/>
+                    <a:lumOff val="40000"/>
+                  </a:schemeClr>
+                </a:solidFill>
+                <a:tailEnd type="stealth" w="med" len="lg"/>
+              </a:ln>
+            </p:spPr>
+            <p:style>
+              <a:lnRef idx="1">
+                <a:schemeClr val="accent1"/>
+              </a:lnRef>
+              <a:fillRef idx="0">
+                <a:schemeClr val="accent1"/>
+              </a:fillRef>
+              <a:effectRef idx="0">
+                <a:schemeClr val="accent1"/>
+              </a:effectRef>
+              <a:fontRef idx="minor">
+                <a:schemeClr val="tx1"/>
+              </a:fontRef>
+            </p:style>
+          </p:cxnSp>
+          <p:sp>
+            <p:nvSpPr>
+              <p:cNvPr id="36" name="Oval 35"/>
+              <p:cNvSpPr/>
+              <p:nvPr/>
+            </p:nvSpPr>
+            <p:spPr>
+              <a:xfrm>
+                <a:off x="1140750" y="1919485"/>
+                <a:ext cx="355541" cy="905282"/>
+              </a:xfrm>
+              <a:prstGeom prst="ellipse">
+                <a:avLst/>
+              </a:prstGeom>
+              <a:noFill/>
+              <a:ln w="28575">
+                <a:solidFill>
+                  <a:schemeClr val="accent4">
+                    <a:lumMod val="60000"/>
+                    <a:lumOff val="40000"/>
+                  </a:schemeClr>
+                </a:solidFill>
+              </a:ln>
+            </p:spPr>
+            <p:style>
+              <a:lnRef idx="2">
+                <a:schemeClr val="accent1">
+                  <a:shade val="50000"/>
+                </a:schemeClr>
+              </a:lnRef>
+              <a:fillRef idx="1">
+                <a:schemeClr val="accent1"/>
+              </a:fillRef>
+              <a:effectRef idx="0">
+                <a:schemeClr val="accent1"/>
+              </a:effectRef>
+              <a:fontRef idx="minor">
+                <a:schemeClr val="lt1"/>
+              </a:fontRef>
+            </p:style>
+            <p:txBody>
+              <a:bodyPr rot="0" spcFirstLastPara="0" vertOverflow="overflow" horzOverflow="overflow" vert="horz" wrap="square" lIns="91440" tIns="45720" rIns="91440" bIns="45720" numCol="1" spcCol="0" rtlCol="0" fromWordArt="0" anchor="ctr" anchorCtr="0" forceAA="0" compatLnSpc="1">
+                <a:prstTxWarp prst="textNoShape">
+                  <a:avLst/>
+                </a:prstTxWarp>
+                <a:noAutofit/>
+              </a:bodyPr>
+              <a:lstStyle/>
+              <a:p>
+                <a:pPr algn="ctr"/>
+                <a:endParaRPr lang="en-US"/>
+              </a:p>
+            </p:txBody>
+          </p:sp>
+        </p:grpSp>
+        <p:grpSp>
+          <p:nvGrpSpPr>
+            <p:cNvPr id="38" name="Group 37"/>
+            <p:cNvGrpSpPr/>
             <p:nvPr/>
-          </p:nvPicPr>
-          <p:blipFill rotWithShape="1">
-            <a:blip r:embed="rId3" cstate="print">
-              <a:extLst>
-                <a:ext uri="{28A0092B-C50C-407E-A947-70E740481C1C}">
-                  <a14:useLocalDpi xmlns:a14="http://schemas.microsoft.com/office/drawing/2010/main" val="0"/>
-                </a:ext>
-              </a:extLst>
-            </a:blip>
-            <a:srcRect t="31999" b="7488"/>
-            <a:stretch/>
-          </p:blipFill>
-          <p:spPr>
+          </p:nvGrpSpPr>
+          <p:grpSpPr>
             <a:xfrm>
-              <a:off x="142469" y="4134573"/>
-              <a:ext cx="4637588" cy="2104167"/>
+              <a:off x="21291" y="49529"/>
+              <a:ext cx="284032" cy="259718"/>
+              <a:chOff x="-493295" y="291775"/>
+              <a:chExt cx="788893" cy="751101"/>
             </a:xfrm>
-            <a:prstGeom prst="rect">
-              <a:avLst/>
-            </a:prstGeom>
-          </p:spPr>
-        </p:pic>
-        <p:sp>
-          <p:nvSpPr>
-            <p:cNvPr id="18" name="TextBox 17"/>
-            <p:cNvSpPr txBox="1"/>
-            <p:nvPr/>
-          </p:nvSpPr>
-          <p:spPr>
-            <a:xfrm>
-              <a:off x="1583828" y="5236972"/>
-              <a:ext cx="1878761" cy="598289"/>
-            </a:xfrm>
-            <a:prstGeom prst="rect">
-              <a:avLst/>
-            </a:prstGeom>
-            <a:noFill/>
-          </p:spPr>
-          <p:txBody>
-            <a:bodyPr wrap="square" rtlCol="0">
-              <a:spAutoFit/>
-            </a:bodyPr>
-            <a:lstStyle/>
-            <a:p>
-              <a:pPr algn="ctr"/>
-              <a:r>
-                <a:rPr lang="en-US" sz="1656" dirty="0"/>
-                <a:t>Geophone Sensors</a:t>
-              </a:r>
-            </a:p>
-            <a:p>
-              <a:pPr algn="ctr"/>
-              <a:r>
-                <a:rPr lang="en-US" sz="1656" dirty="0"/>
-                <a:t>with spikes</a:t>
-              </a:r>
-            </a:p>
-          </p:txBody>
-        </p:sp>
-        <p:sp>
-          <p:nvSpPr>
-            <p:cNvPr id="24" name="TextBox 23"/>
-            <p:cNvSpPr txBox="1"/>
-            <p:nvPr/>
-          </p:nvSpPr>
-          <p:spPr>
-            <a:xfrm>
-              <a:off x="1534698" y="804140"/>
-              <a:ext cx="1845177" cy="601960"/>
-            </a:xfrm>
-            <a:prstGeom prst="rect">
-              <a:avLst/>
-            </a:prstGeom>
-            <a:noFill/>
-          </p:spPr>
-          <p:txBody>
-            <a:bodyPr wrap="square" rtlCol="0">
-              <a:spAutoFit/>
-            </a:bodyPr>
-            <a:lstStyle/>
-            <a:p>
-              <a:pPr algn="ctr"/>
-              <a:r>
-                <a:rPr lang="en-US" sz="1656" dirty="0"/>
-                <a:t>Seismic recorder (micro-controller)</a:t>
-              </a:r>
-            </a:p>
-          </p:txBody>
-        </p:sp>
-        <p:sp>
-          <p:nvSpPr>
-            <p:cNvPr id="25" name="TextBox 24"/>
-            <p:cNvSpPr txBox="1"/>
-            <p:nvPr/>
-          </p:nvSpPr>
-          <p:spPr>
-            <a:xfrm>
-              <a:off x="1583828" y="3086656"/>
-              <a:ext cx="1845177" cy="347146"/>
-            </a:xfrm>
-            <a:prstGeom prst="rect">
-              <a:avLst/>
-            </a:prstGeom>
-            <a:noFill/>
-          </p:spPr>
-          <p:txBody>
-            <a:bodyPr wrap="square" rtlCol="0">
-              <a:spAutoFit/>
-            </a:bodyPr>
-            <a:lstStyle/>
-            <a:p>
-              <a:pPr algn="ctr"/>
-              <a:r>
-                <a:rPr lang="en-US" sz="1656" dirty="0"/>
-                <a:t>Battery</a:t>
-              </a:r>
-            </a:p>
-          </p:txBody>
-        </p:sp>
-        <p:cxnSp>
-          <p:nvCxnSpPr>
-            <p:cNvPr id="21" name="Straight Arrow Connector 20"/>
-            <p:cNvCxnSpPr/>
-            <p:nvPr/>
-          </p:nvCxnSpPr>
-          <p:spPr>
-            <a:xfrm flipH="1" flipV="1">
-              <a:off x="1153298" y="4926639"/>
-              <a:ext cx="502569" cy="498675"/>
-            </a:xfrm>
-            <a:prstGeom prst="straightConnector1">
-              <a:avLst/>
-            </a:prstGeom>
-            <a:ln w="28575" cmpd="sng">
+          </p:grpSpPr>
+          <p:sp>
+            <p:nvSpPr>
+              <p:cNvPr id="39" name="Rectangle 38"/>
+              <p:cNvSpPr/>
+              <p:nvPr/>
+            </p:nvSpPr>
+            <p:spPr>
+              <a:xfrm>
+                <a:off x="-394447" y="334990"/>
+                <a:ext cx="609600" cy="707886"/>
+              </a:xfrm>
+              <a:prstGeom prst="rect">
+                <a:avLst/>
+              </a:prstGeom>
               <a:solidFill>
-                <a:schemeClr val="accent4">
-                  <a:lumMod val="60000"/>
-                  <a:lumOff val="40000"/>
+                <a:schemeClr val="accent1">
+                  <a:alpha val="60000"/>
                 </a:schemeClr>
               </a:solidFill>
-              <a:tailEnd type="stealth" w="med" len="lg"/>
-            </a:ln>
-          </p:spPr>
-          <p:style>
-            <a:lnRef idx="1">
-              <a:schemeClr val="dk1"/>
-            </a:lnRef>
-            <a:fillRef idx="0">
-              <a:schemeClr val="dk1"/>
-            </a:fillRef>
-            <a:effectRef idx="0">
-              <a:schemeClr val="dk1"/>
-            </a:effectRef>
-            <a:fontRef idx="minor">
-              <a:schemeClr val="tx1"/>
-            </a:fontRef>
-          </p:style>
-        </p:cxnSp>
-        <p:cxnSp>
-          <p:nvCxnSpPr>
-            <p:cNvPr id="29" name="Straight Arrow Connector 28"/>
-            <p:cNvCxnSpPr>
-              <a:stCxn id="18" idx="3"/>
-            </p:cNvCxnSpPr>
+            </p:spPr>
+            <p:style>
+              <a:lnRef idx="2">
+                <a:schemeClr val="accent1">
+                  <a:shade val="50000"/>
+                </a:schemeClr>
+              </a:lnRef>
+              <a:fillRef idx="1">
+                <a:schemeClr val="accent1"/>
+              </a:fillRef>
+              <a:effectRef idx="0">
+                <a:schemeClr val="accent1"/>
+              </a:effectRef>
+              <a:fontRef idx="minor">
+                <a:schemeClr val="lt1"/>
+              </a:fontRef>
+            </p:style>
+            <p:txBody>
+              <a:bodyPr rtlCol="0" anchor="ctr"/>
+              <a:lstStyle/>
+              <a:p>
+                <a:pPr algn="ctr"/>
+                <a:endParaRPr lang="en-US"/>
+              </a:p>
+            </p:txBody>
+          </p:sp>
+          <p:sp>
+            <p:nvSpPr>
+              <p:cNvPr id="40" name="TextBox 39"/>
+              <p:cNvSpPr txBox="1"/>
+              <p:nvPr/>
+            </p:nvSpPr>
+            <p:spPr>
+              <a:xfrm>
+                <a:off x="-493295" y="291775"/>
+                <a:ext cx="788893" cy="734321"/>
+              </a:xfrm>
+              <a:prstGeom prst="rect">
+                <a:avLst/>
+              </a:prstGeom>
+              <a:noFill/>
+            </p:spPr>
+            <p:txBody>
+              <a:bodyPr wrap="square" rtlCol="0">
+                <a:spAutoFit/>
+              </a:bodyPr>
+              <a:lstStyle/>
+              <a:p>
+                <a:r>
+                  <a:rPr lang="en-US" sz="1000" dirty="0">
+                    <a:solidFill>
+                      <a:schemeClr val="bg1"/>
+                    </a:solidFill>
+                  </a:rPr>
+                  <a:t>a.</a:t>
+                </a:r>
+              </a:p>
+            </p:txBody>
+          </p:sp>
+        </p:grpSp>
+        <p:grpSp>
+          <p:nvGrpSpPr>
+            <p:cNvPr id="41" name="Group 40"/>
+            <p:cNvGrpSpPr/>
             <p:nvPr/>
-          </p:nvCxnSpPr>
-          <p:spPr>
+          </p:nvGrpSpPr>
+          <p:grpSpPr>
             <a:xfrm>
-              <a:off x="3462589" y="5536117"/>
-              <a:ext cx="622486" cy="0"/>
+              <a:off x="2547057" y="64472"/>
+              <a:ext cx="284032" cy="259718"/>
+              <a:chOff x="-493295" y="291775"/>
+              <a:chExt cx="788893" cy="751101"/>
             </a:xfrm>
-            <a:prstGeom prst="straightConnector1">
-              <a:avLst/>
-            </a:prstGeom>
-            <a:ln w="28575" cmpd="sng">
+          </p:grpSpPr>
+          <p:sp>
+            <p:nvSpPr>
+              <p:cNvPr id="42" name="Rectangle 41"/>
+              <p:cNvSpPr/>
+              <p:nvPr/>
+            </p:nvSpPr>
+            <p:spPr>
+              <a:xfrm>
+                <a:off x="-394447" y="334990"/>
+                <a:ext cx="609600" cy="707886"/>
+              </a:xfrm>
+              <a:prstGeom prst="rect">
+                <a:avLst/>
+              </a:prstGeom>
               <a:solidFill>
-                <a:schemeClr val="accent4">
-                  <a:lumMod val="60000"/>
-                  <a:lumOff val="40000"/>
+                <a:schemeClr val="accent1">
+                  <a:alpha val="60000"/>
                 </a:schemeClr>
               </a:solidFill>
-              <a:tailEnd type="stealth" w="med" len="lg"/>
-            </a:ln>
-          </p:spPr>
-          <p:style>
-            <a:lnRef idx="1">
-              <a:schemeClr val="dk1"/>
-            </a:lnRef>
-            <a:fillRef idx="0">
-              <a:schemeClr val="dk1"/>
-            </a:fillRef>
-            <a:effectRef idx="0">
-              <a:schemeClr val="dk1"/>
-            </a:effectRef>
-            <a:fontRef idx="minor">
+            </p:spPr>
+            <p:style>
+              <a:lnRef idx="2">
+                <a:schemeClr val="accent1">
+                  <a:shade val="50000"/>
+                </a:schemeClr>
+              </a:lnRef>
+              <a:fillRef idx="1">
+                <a:schemeClr val="accent1"/>
+              </a:fillRef>
+              <a:effectRef idx="0">
+                <a:schemeClr val="accent1"/>
+              </a:effectRef>
+              <a:fontRef idx="minor">
+                <a:schemeClr val="lt1"/>
+              </a:fontRef>
+            </p:style>
+            <p:txBody>
+              <a:bodyPr rtlCol="0" anchor="ctr"/>
+              <a:lstStyle/>
+              <a:p>
+                <a:pPr algn="ctr"/>
+                <a:endParaRPr lang="en-US"/>
+              </a:p>
+            </p:txBody>
+          </p:sp>
+          <p:sp>
+            <p:nvSpPr>
+              <p:cNvPr id="43" name="TextBox 42"/>
+              <p:cNvSpPr txBox="1"/>
+              <p:nvPr/>
+            </p:nvSpPr>
+            <p:spPr>
+              <a:xfrm>
+                <a:off x="-493295" y="291775"/>
+                <a:ext cx="788893" cy="734321"/>
+              </a:xfrm>
+              <a:prstGeom prst="rect">
+                <a:avLst/>
+              </a:prstGeom>
+              <a:noFill/>
+            </p:spPr>
+            <p:txBody>
+              <a:bodyPr wrap="square" rtlCol="0">
+                <a:spAutoFit/>
+              </a:bodyPr>
+              <a:lstStyle/>
+              <a:p>
+                <a:r>
+                  <a:rPr lang="en-US" sz="1000" dirty="0">
+                    <a:solidFill>
+                      <a:schemeClr val="bg1"/>
+                    </a:solidFill>
+                  </a:rPr>
+                  <a:t>b.</a:t>
+                </a:r>
+              </a:p>
+            </p:txBody>
+          </p:sp>
+        </p:grpSp>
+      </p:grpSp>
+      <p:cxnSp>
+        <p:nvCxnSpPr>
+          <p:cNvPr id="6" name="Straight Connector 5"/>
+          <p:cNvCxnSpPr/>
+          <p:nvPr/>
+        </p:nvCxnSpPr>
+        <p:spPr>
+          <a:xfrm>
+            <a:off x="2556510" y="0"/>
+            <a:ext cx="0" cy="2835275"/>
+          </a:xfrm>
+          <a:prstGeom prst="line">
+            <a:avLst/>
+          </a:prstGeom>
+          <a:ln>
+            <a:solidFill>
               <a:schemeClr val="tx1"/>
-            </a:fontRef>
-          </p:style>
-        </p:cxnSp>
-        <p:cxnSp>
-          <p:nvCxnSpPr>
-            <p:cNvPr id="34" name="Straight Arrow Connector 33"/>
-            <p:cNvCxnSpPr/>
-            <p:nvPr/>
-          </p:nvCxnSpPr>
-          <p:spPr>
-            <a:xfrm flipV="1">
-              <a:off x="2509144" y="2780010"/>
-              <a:ext cx="180638" cy="418822"/>
-            </a:xfrm>
-            <a:prstGeom prst="straightConnector1">
-              <a:avLst/>
-            </a:prstGeom>
-            <a:ln w="28575" cmpd="sng">
-              <a:solidFill>
-                <a:schemeClr val="accent4">
-                  <a:lumMod val="60000"/>
-                  <a:lumOff val="40000"/>
-                </a:schemeClr>
-              </a:solidFill>
-              <a:tailEnd type="stealth" w="med" len="lg"/>
-            </a:ln>
-          </p:spPr>
-          <p:style>
-            <a:lnRef idx="1">
-              <a:schemeClr val="dk1"/>
-            </a:lnRef>
-            <a:fillRef idx="0">
-              <a:schemeClr val="dk1"/>
-            </a:fillRef>
-            <a:effectRef idx="0">
-              <a:schemeClr val="dk1"/>
-            </a:effectRef>
-            <a:fontRef idx="minor">
+            </a:solidFill>
+          </a:ln>
+        </p:spPr>
+        <p:style>
+          <a:lnRef idx="1">
+            <a:schemeClr val="accent1"/>
+          </a:lnRef>
+          <a:fillRef idx="0">
+            <a:schemeClr val="accent1"/>
+          </a:fillRef>
+          <a:effectRef idx="0">
+            <a:schemeClr val="accent1"/>
+          </a:effectRef>
+          <a:fontRef idx="minor">
+            <a:schemeClr val="tx1"/>
+          </a:fontRef>
+        </p:style>
+      </p:cxnSp>
+      <p:cxnSp>
+        <p:nvCxnSpPr>
+          <p:cNvPr id="8" name="Straight Connector 7"/>
+          <p:cNvCxnSpPr/>
+          <p:nvPr/>
+        </p:nvCxnSpPr>
+        <p:spPr>
+          <a:xfrm>
+            <a:off x="0" y="1745119"/>
+            <a:ext cx="2560099" cy="0"/>
+          </a:xfrm>
+          <a:prstGeom prst="line">
+            <a:avLst/>
+          </a:prstGeom>
+          <a:ln>
+            <a:solidFill>
               <a:schemeClr val="tx1"/>
-            </a:fontRef>
-          </p:style>
-        </p:cxnSp>
-        <p:cxnSp>
-          <p:nvCxnSpPr>
-            <p:cNvPr id="32" name="Straight Arrow Connector 31"/>
-            <p:cNvCxnSpPr/>
-            <p:nvPr/>
-          </p:nvCxnSpPr>
-          <p:spPr>
-            <a:xfrm flipH="1">
-              <a:off x="2300505" y="1338255"/>
-              <a:ext cx="156782" cy="472910"/>
-            </a:xfrm>
-            <a:prstGeom prst="straightConnector1">
-              <a:avLst/>
-            </a:prstGeom>
-            <a:ln w="28575" cmpd="sng">
-              <a:solidFill>
-                <a:schemeClr val="accent4">
-                  <a:lumMod val="60000"/>
-                  <a:lumOff val="40000"/>
-                </a:schemeClr>
-              </a:solidFill>
-              <a:tailEnd type="stealth" w="med" len="lg"/>
-            </a:ln>
-          </p:spPr>
-          <p:style>
-            <a:lnRef idx="1">
-              <a:schemeClr val="accent1"/>
-            </a:lnRef>
-            <a:fillRef idx="0">
-              <a:schemeClr val="accent1"/>
-            </a:fillRef>
-            <a:effectRef idx="0">
-              <a:schemeClr val="accent1"/>
-            </a:effectRef>
-            <a:fontRef idx="minor">
+            </a:solidFill>
+          </a:ln>
+        </p:spPr>
+        <p:style>
+          <a:lnRef idx="1">
+            <a:schemeClr val="accent1"/>
+          </a:lnRef>
+          <a:fillRef idx="0">
+            <a:schemeClr val="accent1"/>
+          </a:fillRef>
+          <a:effectRef idx="0">
+            <a:schemeClr val="accent1"/>
+          </a:effectRef>
+          <a:fontRef idx="minor">
+            <a:schemeClr val="tx1"/>
+          </a:fontRef>
+        </p:style>
+      </p:cxnSp>
+      <p:cxnSp>
+        <p:nvCxnSpPr>
+          <p:cNvPr id="10" name="Straight Connector 9"/>
+          <p:cNvCxnSpPr/>
+          <p:nvPr/>
+        </p:nvCxnSpPr>
+        <p:spPr>
+          <a:xfrm flipH="1">
+            <a:off x="2556510" y="1752783"/>
+            <a:ext cx="2380615" cy="0"/>
+          </a:xfrm>
+          <a:prstGeom prst="line">
+            <a:avLst/>
+          </a:prstGeom>
+          <a:ln>
+            <a:solidFill>
               <a:schemeClr val="tx1"/>
-            </a:fontRef>
-          </p:style>
-        </p:cxnSp>
-      </p:grpSp>
+            </a:solidFill>
+          </a:ln>
+        </p:spPr>
+        <p:style>
+          <a:lnRef idx="1">
+            <a:schemeClr val="accent1"/>
+          </a:lnRef>
+          <a:fillRef idx="0">
+            <a:schemeClr val="accent1"/>
+          </a:fillRef>
+          <a:effectRef idx="0">
+            <a:schemeClr val="accent1"/>
+          </a:effectRef>
+          <a:fontRef idx="minor">
+            <a:schemeClr val="tx1"/>
+          </a:fontRef>
+        </p:style>
+      </p:cxnSp>
     </p:spTree>
     <p:extLst>
       <p:ext uri="{BB962C8B-B14F-4D97-AF65-F5344CB8AC3E}">
@@ -3366,7 +4086,7 @@
     </a:clrScheme>
     <a:fontScheme name="Office Theme">
       <a:majorFont>
-        <a:latin typeface="Calibri Light"/>
+        <a:latin typeface="Calibri Light" panose="020F0302020204030204"/>
         <a:ea typeface=""/>
         <a:cs typeface=""/>
         <a:font script="Jpan" typeface="ＭＳ Ｐゴシック"/>
@@ -3401,7 +4121,7 @@
         <a:font script="Geor" typeface="Sylfaen"/>
       </a:majorFont>
       <a:minorFont>
-        <a:latin typeface="Calibri"/>
+        <a:latin typeface="Calibri" panose="020F0502020204030204"/>
         <a:ea typeface=""/>
         <a:cs typeface=""/>
         <a:font script="Jpan" typeface="ＭＳ Ｐゴシック"/>

</xml_diff>

<commit_message>
Made it 6 pages!
</commit_message>
<xml_diff>
--- a/Seismic Drones/CASE-2016/pictures/drone_base.pptx
+++ b/Seismic Drones/CASE-2016/pictures/drone_base.pptx
@@ -254,7 +254,7 @@
           <a:p>
             <a:fld id="{577AF912-6C46-438F-8FD8-D583EE625B1A}" type="datetimeFigureOut">
               <a:rPr lang="en-US" smtClean="0"/>
-              <a:t>6/27/2016</a:t>
+              <a:t>6/29/2016</a:t>
             </a:fld>
             <a:endParaRPr lang="en-US"/>
           </a:p>
@@ -424,7 +424,7 @@
           <a:p>
             <a:fld id="{577AF912-6C46-438F-8FD8-D583EE625B1A}" type="datetimeFigureOut">
               <a:rPr lang="en-US" smtClean="0"/>
-              <a:t>6/27/2016</a:t>
+              <a:t>6/29/2016</a:t>
             </a:fld>
             <a:endParaRPr lang="en-US"/>
           </a:p>
@@ -604,7 +604,7 @@
           <a:p>
             <a:fld id="{577AF912-6C46-438F-8FD8-D583EE625B1A}" type="datetimeFigureOut">
               <a:rPr lang="en-US" smtClean="0"/>
-              <a:t>6/27/2016</a:t>
+              <a:t>6/29/2016</a:t>
             </a:fld>
             <a:endParaRPr lang="en-US"/>
           </a:p>
@@ -774,7 +774,7 @@
           <a:p>
             <a:fld id="{577AF912-6C46-438F-8FD8-D583EE625B1A}" type="datetimeFigureOut">
               <a:rPr lang="en-US" smtClean="0"/>
-              <a:t>6/27/2016</a:t>
+              <a:t>6/29/2016</a:t>
             </a:fld>
             <a:endParaRPr lang="en-US"/>
           </a:p>
@@ -1020,7 +1020,7 @@
           <a:p>
             <a:fld id="{577AF912-6C46-438F-8FD8-D583EE625B1A}" type="datetimeFigureOut">
               <a:rPr lang="en-US" smtClean="0"/>
-              <a:t>6/27/2016</a:t>
+              <a:t>6/29/2016</a:t>
             </a:fld>
             <a:endParaRPr lang="en-US"/>
           </a:p>
@@ -1252,7 +1252,7 @@
           <a:p>
             <a:fld id="{577AF912-6C46-438F-8FD8-D583EE625B1A}" type="datetimeFigureOut">
               <a:rPr lang="en-US" smtClean="0"/>
-              <a:t>6/27/2016</a:t>
+              <a:t>6/29/2016</a:t>
             </a:fld>
             <a:endParaRPr lang="en-US"/>
           </a:p>
@@ -1619,7 +1619,7 @@
           <a:p>
             <a:fld id="{577AF912-6C46-438F-8FD8-D583EE625B1A}" type="datetimeFigureOut">
               <a:rPr lang="en-US" smtClean="0"/>
-              <a:t>6/27/2016</a:t>
+              <a:t>6/29/2016</a:t>
             </a:fld>
             <a:endParaRPr lang="en-US"/>
           </a:p>
@@ -1737,7 +1737,7 @@
           <a:p>
             <a:fld id="{577AF912-6C46-438F-8FD8-D583EE625B1A}" type="datetimeFigureOut">
               <a:rPr lang="en-US" smtClean="0"/>
-              <a:t>6/27/2016</a:t>
+              <a:t>6/29/2016</a:t>
             </a:fld>
             <a:endParaRPr lang="en-US"/>
           </a:p>
@@ -1832,7 +1832,7 @@
           <a:p>
             <a:fld id="{577AF912-6C46-438F-8FD8-D583EE625B1A}" type="datetimeFigureOut">
               <a:rPr lang="en-US" smtClean="0"/>
-              <a:t>6/27/2016</a:t>
+              <a:t>6/29/2016</a:t>
             </a:fld>
             <a:endParaRPr lang="en-US"/>
           </a:p>
@@ -2109,7 +2109,7 @@
           <a:p>
             <a:fld id="{577AF912-6C46-438F-8FD8-D583EE625B1A}" type="datetimeFigureOut">
               <a:rPr lang="en-US" smtClean="0"/>
-              <a:t>6/27/2016</a:t>
+              <a:t>6/29/2016</a:t>
             </a:fld>
             <a:endParaRPr lang="en-US"/>
           </a:p>
@@ -2366,7 +2366,7 @@
           <a:p>
             <a:fld id="{577AF912-6C46-438F-8FD8-D583EE625B1A}" type="datetimeFigureOut">
               <a:rPr lang="en-US" smtClean="0"/>
-              <a:t>6/27/2016</a:t>
+              <a:t>6/29/2016</a:t>
             </a:fld>
             <a:endParaRPr lang="en-US"/>
           </a:p>
@@ -2579,7 +2579,7 @@
           <a:p>
             <a:fld id="{577AF912-6C46-438F-8FD8-D583EE625B1A}" type="datetimeFigureOut">
               <a:rPr lang="en-US" smtClean="0"/>
-              <a:t>6/27/2016</a:t>
+              <a:t>6/29/2016</a:t>
             </a:fld>
             <a:endParaRPr lang="en-US"/>
           </a:p>
@@ -2986,719 +2986,857 @@
       </p:grpSpPr>
       <p:grpSp>
         <p:nvGrpSpPr>
-          <p:cNvPr id="44" name="Group 43"/>
+          <p:cNvPr id="67" name="Group 66"/>
           <p:cNvGrpSpPr/>
           <p:nvPr/>
         </p:nvGrpSpPr>
         <p:grpSpPr>
           <a:xfrm>
             <a:off x="-91418" y="0"/>
-            <a:ext cx="4982401" cy="2825877"/>
-            <a:chOff x="-104460" y="12049"/>
-            <a:chExt cx="4982401" cy="2825877"/>
+            <a:ext cx="4977164" cy="2825877"/>
+            <a:chOff x="-91418" y="0"/>
+            <a:chExt cx="4977164" cy="2825877"/>
           </a:xfrm>
         </p:grpSpPr>
+        <p:pic>
+          <p:nvPicPr>
+            <p:cNvPr id="3" name="Picture 2"/>
+            <p:cNvPicPr>
+              <a:picLocks noChangeAspect="1"/>
+            </p:cNvPicPr>
+            <p:nvPr/>
+          </p:nvPicPr>
+          <p:blipFill rotWithShape="1">
+            <a:blip r:embed="rId2" cstate="print">
+              <a:extLst>
+                <a:ext uri="{28A0092B-C50C-407E-A947-70E740481C1C}">
+                  <a14:useLocalDpi xmlns:a14="http://schemas.microsoft.com/office/drawing/2010/main" val="0"/>
+                </a:ext>
+              </a:extLst>
+            </a:blip>
+            <a:srcRect l="9376" t="4635" r="14737" b="19019"/>
+            <a:stretch/>
+          </p:blipFill>
+          <p:spPr>
+            <a:xfrm>
+              <a:off x="2639373" y="35945"/>
+              <a:ext cx="2246373" cy="1694508"/>
+            </a:xfrm>
+            <a:prstGeom prst="rect">
+              <a:avLst/>
+            </a:prstGeom>
+          </p:spPr>
+        </p:pic>
+        <p:pic>
+          <p:nvPicPr>
+            <p:cNvPr id="2" name="Picture 1"/>
+            <p:cNvPicPr>
+              <a:picLocks noChangeAspect="1"/>
+            </p:cNvPicPr>
+            <p:nvPr/>
+          </p:nvPicPr>
+          <p:blipFill rotWithShape="1">
+            <a:blip r:embed="rId3" cstate="print">
+              <a:extLst>
+                <a:ext uri="{28A0092B-C50C-407E-A947-70E740481C1C}">
+                  <a14:useLocalDpi xmlns:a14="http://schemas.microsoft.com/office/drawing/2010/main" val="0"/>
+                </a:ext>
+              </a:extLst>
+            </a:blip>
+            <a:srcRect l="3268" t="31999" b="7488"/>
+            <a:stretch/>
+          </p:blipFill>
+          <p:spPr>
+            <a:xfrm>
+              <a:off x="2641042" y="1766398"/>
+              <a:ext cx="2243033" cy="1052084"/>
+            </a:xfrm>
+            <a:prstGeom prst="rect">
+              <a:avLst/>
+            </a:prstGeom>
+          </p:spPr>
+        </p:pic>
+        <p:sp>
+          <p:nvSpPr>
+            <p:cNvPr id="18" name="TextBox 17"/>
+            <p:cNvSpPr txBox="1"/>
+            <p:nvPr/>
+          </p:nvSpPr>
+          <p:spPr>
+            <a:xfrm>
+              <a:off x="3292870" y="2318046"/>
+              <a:ext cx="939380" cy="507831"/>
+            </a:xfrm>
+            <a:prstGeom prst="rect">
+              <a:avLst/>
+            </a:prstGeom>
+            <a:noFill/>
+          </p:spPr>
+          <p:txBody>
+            <a:bodyPr wrap="square" rtlCol="0">
+              <a:spAutoFit/>
+            </a:bodyPr>
+            <a:lstStyle/>
+            <a:p>
+              <a:pPr algn="ctr"/>
+              <a:r>
+                <a:rPr lang="en-US" sz="900" dirty="0"/>
+                <a:t>Geophone Sensors</a:t>
+              </a:r>
+            </a:p>
+            <a:p>
+              <a:pPr algn="ctr"/>
+              <a:r>
+                <a:rPr lang="en-US" sz="900" dirty="0"/>
+                <a:t>with spikes</a:t>
+              </a:r>
+            </a:p>
+          </p:txBody>
+        </p:sp>
+        <p:sp>
+          <p:nvSpPr>
+            <p:cNvPr id="24" name="TextBox 23"/>
+            <p:cNvSpPr txBox="1"/>
+            <p:nvPr/>
+          </p:nvSpPr>
+          <p:spPr>
+            <a:xfrm>
+              <a:off x="3131063" y="0"/>
+              <a:ext cx="1118679" cy="400110"/>
+            </a:xfrm>
+            <a:prstGeom prst="rect">
+              <a:avLst/>
+            </a:prstGeom>
+            <a:noFill/>
+          </p:spPr>
+          <p:txBody>
+            <a:bodyPr wrap="square" rtlCol="0">
+              <a:spAutoFit/>
+            </a:bodyPr>
+            <a:lstStyle/>
+            <a:p>
+              <a:pPr algn="ctr"/>
+              <a:r>
+                <a:rPr lang="en-US" sz="1000" dirty="0"/>
+                <a:t>Seismic recorder (micro-controller)</a:t>
+              </a:r>
+            </a:p>
+          </p:txBody>
+        </p:sp>
+        <p:sp>
+          <p:nvSpPr>
+            <p:cNvPr id="25" name="TextBox 24"/>
+            <p:cNvSpPr txBox="1"/>
+            <p:nvPr/>
+          </p:nvSpPr>
+          <p:spPr>
+            <a:xfrm>
+              <a:off x="3351555" y="1445720"/>
+              <a:ext cx="922588" cy="246221"/>
+            </a:xfrm>
+            <a:prstGeom prst="rect">
+              <a:avLst/>
+            </a:prstGeom>
+            <a:noFill/>
+          </p:spPr>
+          <p:txBody>
+            <a:bodyPr wrap="square" rtlCol="0">
+              <a:spAutoFit/>
+            </a:bodyPr>
+            <a:lstStyle/>
+            <a:p>
+              <a:pPr algn="ctr"/>
+              <a:r>
+                <a:rPr lang="en-US" sz="1000" dirty="0"/>
+                <a:t>Battery</a:t>
+              </a:r>
+            </a:p>
+          </p:txBody>
+        </p:sp>
+        <p:cxnSp>
+          <p:nvCxnSpPr>
+            <p:cNvPr id="21" name="Straight Arrow Connector 20"/>
+            <p:cNvCxnSpPr/>
+            <p:nvPr/>
+          </p:nvCxnSpPr>
+          <p:spPr>
+            <a:xfrm flipH="1" flipV="1">
+              <a:off x="3077605" y="2162880"/>
+              <a:ext cx="394979" cy="304742"/>
+            </a:xfrm>
+            <a:prstGeom prst="straightConnector1">
+              <a:avLst/>
+            </a:prstGeom>
+            <a:ln w="28575" cmpd="sng">
+              <a:solidFill>
+                <a:schemeClr val="accent4">
+                  <a:lumMod val="60000"/>
+                  <a:lumOff val="40000"/>
+                </a:schemeClr>
+              </a:solidFill>
+              <a:tailEnd type="stealth" w="med" len="lg"/>
+            </a:ln>
+          </p:spPr>
+          <p:style>
+            <a:lnRef idx="1">
+              <a:schemeClr val="dk1"/>
+            </a:lnRef>
+            <a:fillRef idx="0">
+              <a:schemeClr val="dk1"/>
+            </a:fillRef>
+            <a:effectRef idx="0">
+              <a:schemeClr val="dk1"/>
+            </a:effectRef>
+            <a:fontRef idx="minor">
+              <a:schemeClr val="tx1"/>
+            </a:fontRef>
+          </p:style>
+        </p:cxnSp>
+        <p:cxnSp>
+          <p:nvCxnSpPr>
+            <p:cNvPr id="29" name="Straight Arrow Connector 28"/>
+            <p:cNvCxnSpPr/>
+            <p:nvPr/>
+          </p:nvCxnSpPr>
+          <p:spPr>
+            <a:xfrm flipV="1">
+              <a:off x="4062032" y="2467622"/>
+              <a:ext cx="481461" cy="98299"/>
+            </a:xfrm>
+            <a:prstGeom prst="straightConnector1">
+              <a:avLst/>
+            </a:prstGeom>
+            <a:ln w="28575" cmpd="sng">
+              <a:solidFill>
+                <a:schemeClr val="accent4">
+                  <a:lumMod val="60000"/>
+                  <a:lumOff val="40000"/>
+                </a:schemeClr>
+              </a:solidFill>
+              <a:tailEnd type="stealth" w="med" len="lg"/>
+            </a:ln>
+          </p:spPr>
+          <p:style>
+            <a:lnRef idx="1">
+              <a:schemeClr val="dk1"/>
+            </a:lnRef>
+            <a:fillRef idx="0">
+              <a:schemeClr val="dk1"/>
+            </a:fillRef>
+            <a:effectRef idx="0">
+              <a:schemeClr val="dk1"/>
+            </a:effectRef>
+            <a:fontRef idx="minor">
+              <a:schemeClr val="tx1"/>
+            </a:fontRef>
+          </p:style>
+        </p:cxnSp>
+        <p:cxnSp>
+          <p:nvCxnSpPr>
+            <p:cNvPr id="34" name="Straight Arrow Connector 33"/>
+            <p:cNvCxnSpPr/>
+            <p:nvPr/>
+          </p:nvCxnSpPr>
+          <p:spPr>
+            <a:xfrm flipV="1">
+              <a:off x="3812849" y="1105311"/>
+              <a:ext cx="19810" cy="375456"/>
+            </a:xfrm>
+            <a:prstGeom prst="straightConnector1">
+              <a:avLst/>
+            </a:prstGeom>
+            <a:ln w="28575" cmpd="sng">
+              <a:solidFill>
+                <a:schemeClr val="accent4">
+                  <a:lumMod val="60000"/>
+                  <a:lumOff val="40000"/>
+                </a:schemeClr>
+              </a:solidFill>
+              <a:tailEnd type="stealth" w="med" len="lg"/>
+            </a:ln>
+          </p:spPr>
+          <p:style>
+            <a:lnRef idx="1">
+              <a:schemeClr val="dk1"/>
+            </a:lnRef>
+            <a:fillRef idx="0">
+              <a:schemeClr val="dk1"/>
+            </a:fillRef>
+            <a:effectRef idx="0">
+              <a:schemeClr val="dk1"/>
+            </a:effectRef>
+            <a:fontRef idx="minor">
+              <a:schemeClr val="tx1"/>
+            </a:fontRef>
+          </p:style>
+        </p:cxnSp>
+        <p:cxnSp>
+          <p:nvCxnSpPr>
+            <p:cNvPr id="32" name="Straight Arrow Connector 31"/>
+            <p:cNvCxnSpPr/>
+            <p:nvPr/>
+          </p:nvCxnSpPr>
+          <p:spPr>
+            <a:xfrm flipH="1">
+              <a:off x="3651208" y="368688"/>
+              <a:ext cx="78391" cy="236455"/>
+            </a:xfrm>
+            <a:prstGeom prst="straightConnector1">
+              <a:avLst/>
+            </a:prstGeom>
+            <a:ln w="28575" cmpd="sng">
+              <a:solidFill>
+                <a:schemeClr val="accent4">
+                  <a:lumMod val="60000"/>
+                  <a:lumOff val="40000"/>
+                </a:schemeClr>
+              </a:solidFill>
+              <a:tailEnd type="stealth" w="med" len="lg"/>
+            </a:ln>
+          </p:spPr>
+          <p:style>
+            <a:lnRef idx="1">
+              <a:schemeClr val="accent1"/>
+            </a:lnRef>
+            <a:fillRef idx="0">
+              <a:schemeClr val="accent1"/>
+            </a:fillRef>
+            <a:effectRef idx="0">
+              <a:schemeClr val="accent1"/>
+            </a:effectRef>
+            <a:fontRef idx="minor">
+              <a:schemeClr val="tx1"/>
+            </a:fontRef>
+          </p:style>
+        </p:cxnSp>
+        <p:pic>
+          <p:nvPicPr>
+            <p:cNvPr id="11" name="Picture 10"/>
+            <p:cNvPicPr>
+              <a:picLocks noChangeAspect="1"/>
+            </p:cNvPicPr>
+            <p:nvPr/>
+          </p:nvPicPr>
+          <p:blipFill rotWithShape="1">
+            <a:blip r:embed="rId4" cstate="print">
+              <a:extLst>
+                <a:ext uri="{28A0092B-C50C-407E-A947-70E740481C1C}">
+                  <a14:useLocalDpi xmlns:a14="http://schemas.microsoft.com/office/drawing/2010/main" val="0"/>
+                </a:ext>
+              </a:extLst>
+            </a:blip>
+            <a:srcRect t="16153" b="13536"/>
+            <a:stretch/>
+          </p:blipFill>
+          <p:spPr>
+            <a:xfrm rot="5400000">
+              <a:off x="445932" y="-362342"/>
+              <a:ext cx="1708481" cy="2483581"/>
+            </a:xfrm>
+            <a:prstGeom prst="rect">
+              <a:avLst/>
+            </a:prstGeom>
+          </p:spPr>
+        </p:pic>
+        <p:pic>
+          <p:nvPicPr>
+            <p:cNvPr id="12" name="Picture 11"/>
+            <p:cNvPicPr>
+              <a:picLocks noChangeAspect="1"/>
+            </p:cNvPicPr>
+            <p:nvPr/>
+          </p:nvPicPr>
+          <p:blipFill rotWithShape="1">
+            <a:blip r:embed="rId5" cstate="print">
+              <a:extLst>
+                <a:ext uri="{28A0092B-C50C-407E-A947-70E740481C1C}">
+                  <a14:useLocalDpi xmlns:a14="http://schemas.microsoft.com/office/drawing/2010/main" val="0"/>
+                </a:ext>
+              </a:extLst>
+            </a:blip>
+            <a:srcRect l="1224" t="10506" r="3568" b="20819"/>
+            <a:stretch/>
+          </p:blipFill>
+          <p:spPr>
+            <a:xfrm>
+              <a:off x="58382" y="1783079"/>
+              <a:ext cx="2483581" cy="1029637"/>
+            </a:xfrm>
+            <a:prstGeom prst="rect">
+              <a:avLst/>
+            </a:prstGeom>
+          </p:spPr>
+        </p:pic>
+        <p:sp>
+          <p:nvSpPr>
+            <p:cNvPr id="20" name="TextBox 19"/>
+            <p:cNvSpPr txBox="1"/>
+            <p:nvPr/>
+          </p:nvSpPr>
+          <p:spPr>
+            <a:xfrm>
+              <a:off x="1124016" y="20166"/>
+              <a:ext cx="1118679" cy="246221"/>
+            </a:xfrm>
+            <a:prstGeom prst="rect">
+              <a:avLst/>
+            </a:prstGeom>
+            <a:noFill/>
+          </p:spPr>
+          <p:txBody>
+            <a:bodyPr wrap="square" rtlCol="0">
+              <a:spAutoFit/>
+            </a:bodyPr>
+            <a:lstStyle/>
+            <a:p>
+              <a:pPr algn="ctr"/>
+              <a:r>
+                <a:rPr lang="en-US" sz="1000" dirty="0"/>
+                <a:t>Micro-controller</a:t>
+              </a:r>
+            </a:p>
+          </p:txBody>
+        </p:sp>
+        <p:sp>
+          <p:nvSpPr>
+            <p:cNvPr id="22" name="TextBox 21"/>
+            <p:cNvSpPr txBox="1"/>
+            <p:nvPr/>
+          </p:nvSpPr>
+          <p:spPr>
+            <a:xfrm>
+              <a:off x="181493" y="5274"/>
+              <a:ext cx="1118679" cy="246221"/>
+            </a:xfrm>
+            <a:prstGeom prst="rect">
+              <a:avLst/>
+            </a:prstGeom>
+            <a:noFill/>
+          </p:spPr>
+          <p:txBody>
+            <a:bodyPr wrap="square" rtlCol="0">
+              <a:spAutoFit/>
+            </a:bodyPr>
+            <a:lstStyle/>
+            <a:p>
+              <a:pPr algn="ctr"/>
+              <a:r>
+                <a:rPr lang="en-US" sz="1000" dirty="0"/>
+                <a:t>Amplifier</a:t>
+              </a:r>
+            </a:p>
+          </p:txBody>
+        </p:sp>
+        <p:sp>
+          <p:nvSpPr>
+            <p:cNvPr id="23" name="TextBox 22"/>
+            <p:cNvSpPr txBox="1"/>
+            <p:nvPr/>
+          </p:nvSpPr>
+          <p:spPr>
+            <a:xfrm>
+              <a:off x="564676" y="1399195"/>
+              <a:ext cx="1118679" cy="246221"/>
+            </a:xfrm>
+            <a:prstGeom prst="rect">
+              <a:avLst/>
+            </a:prstGeom>
+            <a:noFill/>
+          </p:spPr>
+          <p:txBody>
+            <a:bodyPr wrap="square" rtlCol="0">
+              <a:spAutoFit/>
+            </a:bodyPr>
+            <a:lstStyle/>
+            <a:p>
+              <a:pPr algn="ctr"/>
+              <a:r>
+                <a:rPr lang="en-US" sz="1000" dirty="0"/>
+                <a:t>Battery</a:t>
+              </a:r>
+            </a:p>
+          </p:txBody>
+        </p:sp>
+        <p:cxnSp>
+          <p:nvCxnSpPr>
+            <p:cNvPr id="26" name="Straight Arrow Connector 25"/>
+            <p:cNvCxnSpPr/>
+            <p:nvPr/>
+          </p:nvCxnSpPr>
+          <p:spPr>
+            <a:xfrm flipH="1">
+              <a:off x="1732238" y="200055"/>
+              <a:ext cx="1" cy="514508"/>
+            </a:xfrm>
+            <a:prstGeom prst="straightConnector1">
+              <a:avLst/>
+            </a:prstGeom>
+            <a:ln w="28575" cmpd="sng">
+              <a:solidFill>
+                <a:schemeClr val="accent4">
+                  <a:lumMod val="60000"/>
+                  <a:lumOff val="40000"/>
+                </a:schemeClr>
+              </a:solidFill>
+              <a:tailEnd type="stealth" w="med" len="lg"/>
+            </a:ln>
+          </p:spPr>
+          <p:style>
+            <a:lnRef idx="1">
+              <a:schemeClr val="accent1"/>
+            </a:lnRef>
+            <a:fillRef idx="0">
+              <a:schemeClr val="accent1"/>
+            </a:fillRef>
+            <a:effectRef idx="0">
+              <a:schemeClr val="accent1"/>
+            </a:effectRef>
+            <a:fontRef idx="minor">
+              <a:schemeClr val="tx1"/>
+            </a:fontRef>
+          </p:style>
+        </p:cxnSp>
+        <p:cxnSp>
+          <p:nvCxnSpPr>
+            <p:cNvPr id="27" name="Straight Arrow Connector 26"/>
+            <p:cNvCxnSpPr/>
+            <p:nvPr/>
+          </p:nvCxnSpPr>
+          <p:spPr>
+            <a:xfrm>
+              <a:off x="789247" y="198193"/>
+              <a:ext cx="1158" cy="377344"/>
+            </a:xfrm>
+            <a:prstGeom prst="straightConnector1">
+              <a:avLst/>
+            </a:prstGeom>
+            <a:ln w="28575" cmpd="sng">
+              <a:solidFill>
+                <a:schemeClr val="accent4">
+                  <a:lumMod val="60000"/>
+                  <a:lumOff val="40000"/>
+                </a:schemeClr>
+              </a:solidFill>
+              <a:tailEnd type="stealth" w="med" len="lg"/>
+            </a:ln>
+          </p:spPr>
+          <p:style>
+            <a:lnRef idx="1">
+              <a:schemeClr val="accent1"/>
+            </a:lnRef>
+            <a:fillRef idx="0">
+              <a:schemeClr val="accent1"/>
+            </a:fillRef>
+            <a:effectRef idx="0">
+              <a:schemeClr val="accent1"/>
+            </a:effectRef>
+            <a:fontRef idx="minor">
+              <a:schemeClr val="tx1"/>
+            </a:fontRef>
+          </p:style>
+        </p:cxnSp>
+        <p:cxnSp>
+          <p:nvCxnSpPr>
+            <p:cNvPr id="28" name="Straight Arrow Connector 27"/>
+            <p:cNvCxnSpPr>
+              <a:stCxn id="23" idx="0"/>
+            </p:cNvCxnSpPr>
+            <p:nvPr/>
+          </p:nvCxnSpPr>
+          <p:spPr>
+            <a:xfrm flipH="1" flipV="1">
+              <a:off x="740833" y="1075153"/>
+              <a:ext cx="383183" cy="324042"/>
+            </a:xfrm>
+            <a:prstGeom prst="straightConnector1">
+              <a:avLst/>
+            </a:prstGeom>
+            <a:ln w="28575" cmpd="sng">
+              <a:solidFill>
+                <a:schemeClr val="accent4">
+                  <a:lumMod val="60000"/>
+                  <a:lumOff val="40000"/>
+                </a:schemeClr>
+              </a:solidFill>
+              <a:tailEnd type="stealth" w="med" len="lg"/>
+            </a:ln>
+          </p:spPr>
+          <p:style>
+            <a:lnRef idx="1">
+              <a:schemeClr val="accent1"/>
+            </a:lnRef>
+            <a:fillRef idx="0">
+              <a:schemeClr val="accent1"/>
+            </a:fillRef>
+            <a:effectRef idx="0">
+              <a:schemeClr val="accent1"/>
+            </a:effectRef>
+            <a:fontRef idx="minor">
+              <a:schemeClr val="tx1"/>
+            </a:fontRef>
+          </p:style>
+        </p:cxnSp>
+        <p:sp>
+          <p:nvSpPr>
+            <p:cNvPr id="31" name="TextBox 30"/>
+            <p:cNvSpPr txBox="1"/>
+            <p:nvPr/>
+          </p:nvSpPr>
+          <p:spPr>
+            <a:xfrm>
+              <a:off x="-91418" y="1733689"/>
+              <a:ext cx="939380" cy="507831"/>
+            </a:xfrm>
+            <a:prstGeom prst="rect">
+              <a:avLst/>
+            </a:prstGeom>
+            <a:noFill/>
+          </p:spPr>
+          <p:txBody>
+            <a:bodyPr wrap="square" rtlCol="0">
+              <a:spAutoFit/>
+            </a:bodyPr>
+            <a:lstStyle/>
+            <a:p>
+              <a:pPr algn="ctr"/>
+              <a:r>
+                <a:rPr lang="en-US" sz="900" dirty="0"/>
+                <a:t>Geophone Sensors</a:t>
+              </a:r>
+            </a:p>
+            <a:p>
+              <a:pPr algn="ctr"/>
+              <a:r>
+                <a:rPr lang="en-US" sz="900" dirty="0"/>
+                <a:t>with spikes</a:t>
+              </a:r>
+            </a:p>
+          </p:txBody>
+        </p:sp>
+        <p:cxnSp>
+          <p:nvCxnSpPr>
+            <p:cNvPr id="33" name="Straight Arrow Connector 32"/>
+            <p:cNvCxnSpPr/>
+            <p:nvPr/>
+          </p:nvCxnSpPr>
+          <p:spPr>
+            <a:xfrm>
+              <a:off x="564676" y="2207961"/>
+              <a:ext cx="559339" cy="308810"/>
+            </a:xfrm>
+            <a:prstGeom prst="straightConnector1">
+              <a:avLst/>
+            </a:prstGeom>
+            <a:ln w="28575" cmpd="sng">
+              <a:solidFill>
+                <a:schemeClr val="accent4">
+                  <a:lumMod val="60000"/>
+                  <a:lumOff val="40000"/>
+                </a:schemeClr>
+              </a:solidFill>
+              <a:tailEnd type="stealth" w="med" len="lg"/>
+            </a:ln>
+          </p:spPr>
+          <p:style>
+            <a:lnRef idx="1">
+              <a:schemeClr val="accent1"/>
+            </a:lnRef>
+            <a:fillRef idx="0">
+              <a:schemeClr val="accent1"/>
+            </a:fillRef>
+            <a:effectRef idx="0">
+              <a:schemeClr val="accent1"/>
+            </a:effectRef>
+            <a:fontRef idx="minor">
+              <a:schemeClr val="tx1"/>
+            </a:fontRef>
+          </p:style>
+        </p:cxnSp>
+        <p:sp>
+          <p:nvSpPr>
+            <p:cNvPr id="39" name="Rectangle 38"/>
+            <p:cNvSpPr/>
+            <p:nvPr/>
+          </p:nvSpPr>
+          <p:spPr>
+            <a:xfrm>
+              <a:off x="69922" y="52423"/>
+              <a:ext cx="219480" cy="244775"/>
+            </a:xfrm>
+            <a:prstGeom prst="rect">
+              <a:avLst/>
+            </a:prstGeom>
+            <a:solidFill>
+              <a:schemeClr val="accent1">
+                <a:alpha val="60000"/>
+              </a:schemeClr>
+            </a:solidFill>
+          </p:spPr>
+          <p:style>
+            <a:lnRef idx="2">
+              <a:schemeClr val="accent1">
+                <a:shade val="50000"/>
+              </a:schemeClr>
+            </a:lnRef>
+            <a:fillRef idx="1">
+              <a:schemeClr val="accent1"/>
+            </a:fillRef>
+            <a:effectRef idx="0">
+              <a:schemeClr val="accent1"/>
+            </a:effectRef>
+            <a:fontRef idx="minor">
+              <a:schemeClr val="lt1"/>
+            </a:fontRef>
+          </p:style>
+          <p:txBody>
+            <a:bodyPr rtlCol="0" anchor="ctr"/>
+            <a:lstStyle/>
+            <a:p>
+              <a:pPr algn="ctr"/>
+              <a:endParaRPr lang="en-US"/>
+            </a:p>
+          </p:txBody>
+        </p:sp>
+        <p:sp>
+          <p:nvSpPr>
+            <p:cNvPr id="40" name="TextBox 39"/>
+            <p:cNvSpPr txBox="1"/>
+            <p:nvPr/>
+          </p:nvSpPr>
+          <p:spPr>
+            <a:xfrm>
+              <a:off x="34333" y="37480"/>
+              <a:ext cx="284032" cy="253916"/>
+            </a:xfrm>
+            <a:prstGeom prst="rect">
+              <a:avLst/>
+            </a:prstGeom>
+            <a:noFill/>
+          </p:spPr>
+          <p:txBody>
+            <a:bodyPr wrap="square" rtlCol="0">
+              <a:spAutoFit/>
+            </a:bodyPr>
+            <a:lstStyle/>
+            <a:p>
+              <a:r>
+                <a:rPr lang="en-US" sz="1000" dirty="0">
+                  <a:solidFill>
+                    <a:schemeClr val="bg1"/>
+                  </a:solidFill>
+                </a:rPr>
+                <a:t>a.</a:t>
+              </a:r>
+            </a:p>
+          </p:txBody>
+        </p:sp>
+        <p:sp>
+          <p:nvSpPr>
+            <p:cNvPr id="42" name="Rectangle 41"/>
+            <p:cNvSpPr/>
+            <p:nvPr/>
+          </p:nvSpPr>
+          <p:spPr>
+            <a:xfrm>
+              <a:off x="2660176" y="65037"/>
+              <a:ext cx="219480" cy="244775"/>
+            </a:xfrm>
+            <a:prstGeom prst="rect">
+              <a:avLst/>
+            </a:prstGeom>
+            <a:solidFill>
+              <a:schemeClr val="accent1">
+                <a:alpha val="60000"/>
+              </a:schemeClr>
+            </a:solidFill>
+          </p:spPr>
+          <p:style>
+            <a:lnRef idx="2">
+              <a:schemeClr val="accent1">
+                <a:shade val="50000"/>
+              </a:schemeClr>
+            </a:lnRef>
+            <a:fillRef idx="1">
+              <a:schemeClr val="accent1"/>
+            </a:fillRef>
+            <a:effectRef idx="0">
+              <a:schemeClr val="accent1"/>
+            </a:effectRef>
+            <a:fontRef idx="minor">
+              <a:schemeClr val="lt1"/>
+            </a:fontRef>
+          </p:style>
+          <p:txBody>
+            <a:bodyPr rtlCol="0" anchor="ctr"/>
+            <a:lstStyle/>
+            <a:p>
+              <a:pPr algn="ctr"/>
+              <a:endParaRPr lang="en-US"/>
+            </a:p>
+          </p:txBody>
+        </p:sp>
+        <p:sp>
+          <p:nvSpPr>
+            <p:cNvPr id="43" name="TextBox 42"/>
+            <p:cNvSpPr txBox="1"/>
+            <p:nvPr/>
+          </p:nvSpPr>
+          <p:spPr>
+            <a:xfrm>
+              <a:off x="2627900" y="52423"/>
+              <a:ext cx="284032" cy="253916"/>
+            </a:xfrm>
+            <a:prstGeom prst="rect">
+              <a:avLst/>
+            </a:prstGeom>
+            <a:noFill/>
+          </p:spPr>
+          <p:txBody>
+            <a:bodyPr wrap="square" rtlCol="0">
+              <a:spAutoFit/>
+            </a:bodyPr>
+            <a:lstStyle/>
+            <a:p>
+              <a:r>
+                <a:rPr lang="en-US" sz="1000" dirty="0">
+                  <a:solidFill>
+                    <a:schemeClr val="bg1"/>
+                  </a:solidFill>
+                </a:rPr>
+                <a:t>b.</a:t>
+              </a:r>
+            </a:p>
+          </p:txBody>
+        </p:sp>
         <p:grpSp>
           <p:nvGrpSpPr>
-            <p:cNvPr id="37" name="Group 36"/>
+            <p:cNvPr id="50" name="Group 49"/>
             <p:cNvGrpSpPr/>
             <p:nvPr/>
           </p:nvGrpSpPr>
           <p:grpSpPr>
             <a:xfrm>
-              <a:off x="-104460" y="12049"/>
-              <a:ext cx="4982401" cy="2825877"/>
-              <a:chOff x="-104460" y="12049"/>
-              <a:chExt cx="4982401" cy="2825877"/>
+              <a:off x="1181100" y="1950720"/>
+              <a:ext cx="304800" cy="869660"/>
+              <a:chOff x="1181100" y="1950720"/>
+              <a:chExt cx="304800" cy="754380"/>
             </a:xfrm>
           </p:grpSpPr>
-          <p:grpSp>
-            <p:nvGrpSpPr>
-              <p:cNvPr id="5" name="Group 4"/>
-              <p:cNvGrpSpPr>
-                <a:grpSpLocks noChangeAspect="1"/>
-              </p:cNvGrpSpPr>
-              <p:nvPr/>
-            </p:nvGrpSpPr>
-            <p:grpSpPr>
-              <a:xfrm>
-                <a:off x="2559149" y="12049"/>
-                <a:ext cx="2318792" cy="2825877"/>
-                <a:chOff x="142469" y="600880"/>
-                <a:chExt cx="4637588" cy="5651754"/>
-              </a:xfrm>
-            </p:grpSpPr>
-            <p:pic>
-              <p:nvPicPr>
-                <p:cNvPr id="3" name="Picture 2"/>
-                <p:cNvPicPr>
-                  <a:picLocks noChangeAspect="1"/>
-                </p:cNvPicPr>
-                <p:nvPr/>
-              </p:nvPicPr>
-              <p:blipFill rotWithShape="1">
-                <a:blip r:embed="rId2" cstate="print">
-                  <a:extLst>
-                    <a:ext uri="{28A0092B-C50C-407E-A947-70E740481C1C}">
-                      <a14:useLocalDpi xmlns:a14="http://schemas.microsoft.com/office/drawing/2010/main" val="0"/>
-                    </a:ext>
-                  </a:extLst>
-                </a:blip>
-                <a:srcRect l="7342" t="4635" r="14737" b="18389"/>
-                <a:stretch/>
-              </p:blipFill>
-              <p:spPr>
-                <a:xfrm>
-                  <a:off x="150699" y="663724"/>
-                  <a:ext cx="4613177" cy="3416962"/>
-                </a:xfrm>
-                <a:prstGeom prst="rect">
-                  <a:avLst/>
-                </a:prstGeom>
-              </p:spPr>
-            </p:pic>
-            <p:pic>
-              <p:nvPicPr>
-                <p:cNvPr id="2" name="Picture 1"/>
-                <p:cNvPicPr>
-                  <a:picLocks noChangeAspect="1"/>
-                </p:cNvPicPr>
-                <p:nvPr/>
-              </p:nvPicPr>
-              <p:blipFill rotWithShape="1">
-                <a:blip r:embed="rId3" cstate="print">
-                  <a:extLst>
-                    <a:ext uri="{28A0092B-C50C-407E-A947-70E740481C1C}">
-                      <a14:useLocalDpi xmlns:a14="http://schemas.microsoft.com/office/drawing/2010/main" val="0"/>
-                    </a:ext>
-                  </a:extLst>
-                </a:blip>
-                <a:srcRect t="31999" b="7488"/>
-                <a:stretch/>
-              </p:blipFill>
-              <p:spPr>
-                <a:xfrm>
-                  <a:off x="142469" y="4134573"/>
-                  <a:ext cx="4637588" cy="2104167"/>
-                </a:xfrm>
-                <a:prstGeom prst="rect">
-                  <a:avLst/>
-                </a:prstGeom>
-              </p:spPr>
-            </p:pic>
-            <p:sp>
-              <p:nvSpPr>
-                <p:cNvPr id="18" name="TextBox 17"/>
-                <p:cNvSpPr txBox="1"/>
-                <p:nvPr/>
-              </p:nvSpPr>
-              <p:spPr>
-                <a:xfrm>
-                  <a:off x="1583828" y="5236972"/>
-                  <a:ext cx="1878762" cy="1015662"/>
-                </a:xfrm>
-                <a:prstGeom prst="rect">
-                  <a:avLst/>
-                </a:prstGeom>
-                <a:noFill/>
-              </p:spPr>
-              <p:txBody>
-                <a:bodyPr wrap="square" rtlCol="0">
-                  <a:spAutoFit/>
-                </a:bodyPr>
-                <a:lstStyle/>
-                <a:p>
-                  <a:pPr algn="ctr"/>
-                  <a:r>
-                    <a:rPr lang="en-US" sz="900" dirty="0"/>
-                    <a:t>Geophone Sensors</a:t>
-                  </a:r>
-                </a:p>
-                <a:p>
-                  <a:pPr algn="ctr"/>
-                  <a:r>
-                    <a:rPr lang="en-US" sz="900" dirty="0"/>
-                    <a:t>with spikes</a:t>
-                  </a:r>
-                </a:p>
-              </p:txBody>
-            </p:sp>
-            <p:sp>
-              <p:nvSpPr>
-                <p:cNvPr id="24" name="TextBox 23"/>
-                <p:cNvSpPr txBox="1"/>
-                <p:nvPr/>
-              </p:nvSpPr>
-              <p:spPr>
-                <a:xfrm>
-                  <a:off x="1260214" y="600880"/>
-                  <a:ext cx="2237360" cy="800220"/>
-                </a:xfrm>
-                <a:prstGeom prst="rect">
-                  <a:avLst/>
-                </a:prstGeom>
-                <a:noFill/>
-              </p:spPr>
-              <p:txBody>
-                <a:bodyPr wrap="square" rtlCol="0">
-                  <a:spAutoFit/>
-                </a:bodyPr>
-                <a:lstStyle/>
-                <a:p>
-                  <a:pPr algn="ctr"/>
-                  <a:r>
-                    <a:rPr lang="en-US" sz="1000" dirty="0"/>
-                    <a:t>Seismic recorder (micro-controller)</a:t>
-                  </a:r>
-                </a:p>
-              </p:txBody>
-            </p:sp>
-            <p:sp>
-              <p:nvSpPr>
-                <p:cNvPr id="25" name="TextBox 24"/>
-                <p:cNvSpPr txBox="1"/>
-                <p:nvPr/>
-              </p:nvSpPr>
-              <p:spPr>
-                <a:xfrm>
-                  <a:off x="1701198" y="3492320"/>
-                  <a:ext cx="1845178" cy="492442"/>
-                </a:xfrm>
-                <a:prstGeom prst="rect">
-                  <a:avLst/>
-                </a:prstGeom>
-                <a:noFill/>
-              </p:spPr>
-              <p:txBody>
-                <a:bodyPr wrap="square" rtlCol="0">
-                  <a:spAutoFit/>
-                </a:bodyPr>
-                <a:lstStyle/>
-                <a:p>
-                  <a:pPr algn="ctr"/>
-                  <a:r>
-                    <a:rPr lang="en-US" sz="1000" dirty="0"/>
-                    <a:t>Battery</a:t>
-                  </a:r>
-                </a:p>
-              </p:txBody>
-            </p:sp>
-            <p:cxnSp>
-              <p:nvCxnSpPr>
-                <p:cNvPr id="21" name="Straight Arrow Connector 20"/>
-                <p:cNvCxnSpPr/>
-                <p:nvPr/>
-              </p:nvCxnSpPr>
-              <p:spPr>
-                <a:xfrm flipH="1" flipV="1">
-                  <a:off x="1153298" y="4926640"/>
-                  <a:ext cx="789959" cy="609484"/>
-                </a:xfrm>
-                <a:prstGeom prst="straightConnector1">
-                  <a:avLst/>
-                </a:prstGeom>
-                <a:ln w="28575" cmpd="sng">
-                  <a:solidFill>
-                    <a:schemeClr val="accent4">
-                      <a:lumMod val="60000"/>
-                      <a:lumOff val="40000"/>
-                    </a:schemeClr>
-                  </a:solidFill>
-                  <a:tailEnd type="stealth" w="med" len="lg"/>
-                </a:ln>
-              </p:spPr>
-              <p:style>
-                <a:lnRef idx="1">
-                  <a:schemeClr val="dk1"/>
-                </a:lnRef>
-                <a:fillRef idx="0">
-                  <a:schemeClr val="dk1"/>
-                </a:fillRef>
-                <a:effectRef idx="0">
-                  <a:schemeClr val="dk1"/>
-                </a:effectRef>
-                <a:fontRef idx="minor">
-                  <a:schemeClr val="tx1"/>
-                </a:fontRef>
-              </p:style>
-            </p:cxnSp>
-            <p:cxnSp>
-              <p:nvCxnSpPr>
-                <p:cNvPr id="29" name="Straight Arrow Connector 28"/>
-                <p:cNvCxnSpPr/>
-                <p:nvPr/>
-              </p:nvCxnSpPr>
-              <p:spPr>
-                <a:xfrm flipV="1">
-                  <a:off x="3122154" y="5536124"/>
-                  <a:ext cx="962923" cy="196598"/>
-                </a:xfrm>
-                <a:prstGeom prst="straightConnector1">
-                  <a:avLst/>
-                </a:prstGeom>
-                <a:ln w="28575" cmpd="sng">
-                  <a:solidFill>
-                    <a:schemeClr val="accent4">
-                      <a:lumMod val="60000"/>
-                      <a:lumOff val="40000"/>
-                    </a:schemeClr>
-                  </a:solidFill>
-                  <a:tailEnd type="stealth" w="med" len="lg"/>
-                </a:ln>
-              </p:spPr>
-              <p:style>
-                <a:lnRef idx="1">
-                  <a:schemeClr val="dk1"/>
-                </a:lnRef>
-                <a:fillRef idx="0">
-                  <a:schemeClr val="dk1"/>
-                </a:fillRef>
-                <a:effectRef idx="0">
-                  <a:schemeClr val="dk1"/>
-                </a:effectRef>
-                <a:fontRef idx="minor">
-                  <a:schemeClr val="tx1"/>
-                </a:fontRef>
-              </p:style>
-            </p:cxnSp>
-            <p:cxnSp>
-              <p:nvCxnSpPr>
-                <p:cNvPr id="34" name="Straight Arrow Connector 33"/>
-                <p:cNvCxnSpPr/>
-                <p:nvPr/>
-              </p:nvCxnSpPr>
-              <p:spPr>
-                <a:xfrm flipV="1">
-                  <a:off x="2623787" y="2811502"/>
-                  <a:ext cx="39620" cy="750912"/>
-                </a:xfrm>
-                <a:prstGeom prst="straightConnector1">
-                  <a:avLst/>
-                </a:prstGeom>
-                <a:ln w="28575" cmpd="sng">
-                  <a:solidFill>
-                    <a:schemeClr val="accent4">
-                      <a:lumMod val="60000"/>
-                      <a:lumOff val="40000"/>
-                    </a:schemeClr>
-                  </a:solidFill>
-                  <a:tailEnd type="stealth" w="med" len="lg"/>
-                </a:ln>
-              </p:spPr>
-              <p:style>
-                <a:lnRef idx="1">
-                  <a:schemeClr val="dk1"/>
-                </a:lnRef>
-                <a:fillRef idx="0">
-                  <a:schemeClr val="dk1"/>
-                </a:fillRef>
-                <a:effectRef idx="0">
-                  <a:schemeClr val="dk1"/>
-                </a:effectRef>
-                <a:fontRef idx="minor">
-                  <a:schemeClr val="tx1"/>
-                </a:fontRef>
-              </p:style>
-            </p:cxnSp>
-            <p:cxnSp>
-              <p:nvCxnSpPr>
-                <p:cNvPr id="32" name="Straight Arrow Connector 31"/>
-                <p:cNvCxnSpPr/>
-                <p:nvPr/>
-              </p:nvCxnSpPr>
-              <p:spPr>
-                <a:xfrm flipH="1">
-                  <a:off x="2300505" y="1338255"/>
-                  <a:ext cx="156782" cy="472910"/>
-                </a:xfrm>
-                <a:prstGeom prst="straightConnector1">
-                  <a:avLst/>
-                </a:prstGeom>
-                <a:ln w="28575" cmpd="sng">
-                  <a:solidFill>
-                    <a:schemeClr val="accent4">
-                      <a:lumMod val="60000"/>
-                      <a:lumOff val="40000"/>
-                    </a:schemeClr>
-                  </a:solidFill>
-                  <a:tailEnd type="stealth" w="med" len="lg"/>
-                </a:ln>
-              </p:spPr>
-              <p:style>
-                <a:lnRef idx="1">
-                  <a:schemeClr val="accent1"/>
-                </a:lnRef>
-                <a:fillRef idx="0">
-                  <a:schemeClr val="accent1"/>
-                </a:fillRef>
-                <a:effectRef idx="0">
-                  <a:schemeClr val="accent1"/>
-                </a:effectRef>
-                <a:fontRef idx="minor">
-                  <a:schemeClr val="tx1"/>
-                </a:fontRef>
-              </p:style>
-            </p:cxnSp>
-          </p:grpSp>
-          <p:pic>
-            <p:nvPicPr>
-              <p:cNvPr id="11" name="Picture 10"/>
-              <p:cNvPicPr>
-                <a:picLocks noChangeAspect="1"/>
-              </p:cNvPicPr>
-              <p:nvPr/>
-            </p:nvPicPr>
-            <p:blipFill rotWithShape="1">
-              <a:blip r:embed="rId4" cstate="print">
-                <a:extLst>
-                  <a:ext uri="{28A0092B-C50C-407E-A947-70E740481C1C}">
-                    <a14:useLocalDpi xmlns:a14="http://schemas.microsoft.com/office/drawing/2010/main" val="0"/>
-                  </a:ext>
-                </a:extLst>
-              </a:blip>
-              <a:srcRect t="16153" b="13536"/>
-              <a:stretch/>
-            </p:blipFill>
-            <p:spPr>
-              <a:xfrm rot="5400000">
-                <a:off x="432890" y="-350293"/>
-                <a:ext cx="1708481" cy="2483581"/>
-              </a:xfrm>
-              <a:prstGeom prst="rect">
-                <a:avLst/>
-              </a:prstGeom>
-            </p:spPr>
-          </p:pic>
-          <p:pic>
-            <p:nvPicPr>
-              <p:cNvPr id="12" name="Picture 11"/>
-              <p:cNvPicPr>
-                <a:picLocks noChangeAspect="1"/>
-              </p:cNvPicPr>
-              <p:nvPr/>
-            </p:nvPicPr>
-            <p:blipFill rotWithShape="1">
-              <a:blip r:embed="rId5" cstate="print">
-                <a:extLst>
-                  <a:ext uri="{28A0092B-C50C-407E-A947-70E740481C1C}">
-                    <a14:useLocalDpi xmlns:a14="http://schemas.microsoft.com/office/drawing/2010/main" val="0"/>
-                  </a:ext>
-                </a:extLst>
-              </a:blip>
-              <a:srcRect l="1224" t="8485" r="3568" b="20819"/>
-              <a:stretch/>
-            </p:blipFill>
-            <p:spPr>
-              <a:xfrm>
-                <a:off x="45340" y="1764832"/>
-                <a:ext cx="2483581" cy="1059934"/>
-              </a:xfrm>
-              <a:prstGeom prst="rect">
-                <a:avLst/>
-              </a:prstGeom>
-            </p:spPr>
-          </p:pic>
-          <p:sp>
-            <p:nvSpPr>
-              <p:cNvPr id="20" name="TextBox 19"/>
-              <p:cNvSpPr txBox="1"/>
-              <p:nvPr/>
-            </p:nvSpPr>
-            <p:spPr>
-              <a:xfrm>
-                <a:off x="1110974" y="32215"/>
-                <a:ext cx="1118679" cy="246221"/>
-              </a:xfrm>
-              <a:prstGeom prst="rect">
-                <a:avLst/>
-              </a:prstGeom>
-              <a:noFill/>
-            </p:spPr>
-            <p:txBody>
-              <a:bodyPr wrap="square" rtlCol="0">
-                <a:spAutoFit/>
-              </a:bodyPr>
-              <a:lstStyle/>
-              <a:p>
-                <a:pPr algn="ctr"/>
-                <a:r>
-                  <a:rPr lang="en-US" sz="1000" dirty="0"/>
-                  <a:t>Micro-controller</a:t>
-                </a:r>
-              </a:p>
-            </p:txBody>
-          </p:sp>
-          <p:sp>
-            <p:nvSpPr>
-              <p:cNvPr id="22" name="TextBox 21"/>
-              <p:cNvSpPr txBox="1"/>
-              <p:nvPr/>
-            </p:nvSpPr>
-            <p:spPr>
-              <a:xfrm>
-                <a:off x="168451" y="17323"/>
-                <a:ext cx="1118679" cy="246221"/>
-              </a:xfrm>
-              <a:prstGeom prst="rect">
-                <a:avLst/>
-              </a:prstGeom>
-              <a:noFill/>
-            </p:spPr>
-            <p:txBody>
-              <a:bodyPr wrap="square" rtlCol="0">
-                <a:spAutoFit/>
-              </a:bodyPr>
-              <a:lstStyle/>
-              <a:p>
-                <a:pPr algn="ctr"/>
-                <a:r>
-                  <a:rPr lang="en-US" sz="1000" dirty="0"/>
-                  <a:t>Amplifier</a:t>
-                </a:r>
-              </a:p>
-            </p:txBody>
-          </p:sp>
-          <p:sp>
-            <p:nvSpPr>
-              <p:cNvPr id="23" name="TextBox 22"/>
-              <p:cNvSpPr txBox="1"/>
-              <p:nvPr/>
-            </p:nvSpPr>
-            <p:spPr>
-              <a:xfrm>
-                <a:off x="551634" y="1411244"/>
-                <a:ext cx="1118679" cy="246221"/>
-              </a:xfrm>
-              <a:prstGeom prst="rect">
-                <a:avLst/>
-              </a:prstGeom>
-              <a:noFill/>
-            </p:spPr>
-            <p:txBody>
-              <a:bodyPr wrap="square" rtlCol="0">
-                <a:spAutoFit/>
-              </a:bodyPr>
-              <a:lstStyle/>
-              <a:p>
-                <a:pPr algn="ctr"/>
-                <a:r>
-                  <a:rPr lang="en-US" sz="1000" dirty="0"/>
-                  <a:t>Battery</a:t>
-                </a:r>
-              </a:p>
-            </p:txBody>
-          </p:sp>
           <p:cxnSp>
             <p:nvCxnSpPr>
-              <p:cNvPr id="26" name="Straight Arrow Connector 25"/>
-              <p:cNvCxnSpPr/>
-              <p:nvPr/>
-            </p:nvCxnSpPr>
-            <p:spPr>
-              <a:xfrm flipH="1">
-                <a:off x="1719196" y="212104"/>
-                <a:ext cx="1" cy="514508"/>
-              </a:xfrm>
-              <a:prstGeom prst="straightConnector1">
-                <a:avLst/>
-              </a:prstGeom>
-              <a:ln w="28575" cmpd="sng">
-                <a:solidFill>
-                  <a:schemeClr val="accent4">
-                    <a:lumMod val="60000"/>
-                    <a:lumOff val="40000"/>
-                  </a:schemeClr>
-                </a:solidFill>
-                <a:tailEnd type="stealth" w="med" len="lg"/>
-              </a:ln>
-            </p:spPr>
-            <p:style>
-              <a:lnRef idx="1">
-                <a:schemeClr val="accent1"/>
-              </a:lnRef>
-              <a:fillRef idx="0">
-                <a:schemeClr val="accent1"/>
-              </a:fillRef>
-              <a:effectRef idx="0">
-                <a:schemeClr val="accent1"/>
-              </a:effectRef>
-              <a:fontRef idx="minor">
-                <a:schemeClr val="tx1"/>
-              </a:fontRef>
-            </p:style>
-          </p:cxnSp>
-          <p:cxnSp>
-            <p:nvCxnSpPr>
-              <p:cNvPr id="27" name="Straight Arrow Connector 26"/>
+              <p:cNvPr id="7" name="Straight Connector 6"/>
               <p:cNvCxnSpPr/>
               <p:nvPr/>
             </p:nvCxnSpPr>
             <p:spPr>
               <a:xfrm>
-                <a:off x="776205" y="210242"/>
-                <a:ext cx="1158" cy="377344"/>
+                <a:off x="1181100" y="1950720"/>
+                <a:ext cx="300990" cy="3810"/>
               </a:xfrm>
-              <a:prstGeom prst="straightConnector1">
+              <a:prstGeom prst="line">
                 <a:avLst/>
               </a:prstGeom>
-              <a:ln w="28575" cmpd="sng">
-                <a:solidFill>
-                  <a:schemeClr val="accent4">
-                    <a:lumMod val="60000"/>
-                    <a:lumOff val="40000"/>
-                  </a:schemeClr>
-                </a:solidFill>
-                <a:tailEnd type="stealth" w="med" len="lg"/>
-              </a:ln>
-            </p:spPr>
-            <p:style>
-              <a:lnRef idx="1">
-                <a:schemeClr val="accent1"/>
-              </a:lnRef>
-              <a:fillRef idx="0">
-                <a:schemeClr val="accent1"/>
-              </a:fillRef>
-              <a:effectRef idx="0">
-                <a:schemeClr val="accent1"/>
-              </a:effectRef>
-              <a:fontRef idx="minor">
-                <a:schemeClr val="tx1"/>
-              </a:fontRef>
-            </p:style>
-          </p:cxnSp>
-          <p:cxnSp>
-            <p:nvCxnSpPr>
-              <p:cNvPr id="28" name="Straight Arrow Connector 27"/>
-              <p:cNvCxnSpPr>
-                <a:stCxn id="23" idx="0"/>
-              </p:cNvCxnSpPr>
-              <p:nvPr/>
-            </p:nvCxnSpPr>
-            <p:spPr>
-              <a:xfrm flipH="1" flipV="1">
-                <a:off x="727791" y="1087202"/>
-                <a:ext cx="383183" cy="324042"/>
-              </a:xfrm>
-              <a:prstGeom prst="straightConnector1">
-                <a:avLst/>
-              </a:prstGeom>
-              <a:ln w="28575" cmpd="sng">
-                <a:solidFill>
-                  <a:schemeClr val="accent4">
-                    <a:lumMod val="60000"/>
-                    <a:lumOff val="40000"/>
-                  </a:schemeClr>
-                </a:solidFill>
-                <a:tailEnd type="stealth" w="med" len="lg"/>
-              </a:ln>
-            </p:spPr>
-            <p:style>
-              <a:lnRef idx="1">
-                <a:schemeClr val="accent1"/>
-              </a:lnRef>
-              <a:fillRef idx="0">
-                <a:schemeClr val="accent1"/>
-              </a:fillRef>
-              <a:effectRef idx="0">
-                <a:schemeClr val="accent1"/>
-              </a:effectRef>
-              <a:fontRef idx="minor">
-                <a:schemeClr val="tx1"/>
-              </a:fontRef>
-            </p:style>
-          </p:cxnSp>
-          <p:sp>
-            <p:nvSpPr>
-              <p:cNvPr id="31" name="TextBox 30"/>
-              <p:cNvSpPr txBox="1"/>
-              <p:nvPr/>
-            </p:nvSpPr>
-            <p:spPr>
-              <a:xfrm>
-                <a:off x="-104460" y="1745738"/>
-                <a:ext cx="939380" cy="507831"/>
-              </a:xfrm>
-              <a:prstGeom prst="rect">
-                <a:avLst/>
-              </a:prstGeom>
-              <a:noFill/>
-            </p:spPr>
-            <p:txBody>
-              <a:bodyPr wrap="square" rtlCol="0">
-                <a:spAutoFit/>
-              </a:bodyPr>
-              <a:lstStyle/>
-              <a:p>
-                <a:pPr algn="ctr"/>
-                <a:r>
-                  <a:rPr lang="en-US" sz="900" dirty="0"/>
-                  <a:t>Geophone Sensors</a:t>
-                </a:r>
-              </a:p>
-              <a:p>
-                <a:pPr algn="ctr"/>
-                <a:r>
-                  <a:rPr lang="en-US" sz="900" dirty="0"/>
-                  <a:t>with spikes</a:t>
-                </a:r>
-              </a:p>
-            </p:txBody>
-          </p:sp>
-          <p:cxnSp>
-            <p:nvCxnSpPr>
-              <p:cNvPr id="33" name="Straight Arrow Connector 32"/>
-              <p:cNvCxnSpPr/>
-              <p:nvPr/>
-            </p:nvCxnSpPr>
-            <p:spPr>
-              <a:xfrm>
-                <a:off x="551634" y="2220010"/>
-                <a:ext cx="559339" cy="308810"/>
-              </a:xfrm>
-              <a:prstGeom prst="straightConnector1">
-                <a:avLst/>
-              </a:prstGeom>
-              <a:ln w="28575" cmpd="sng">
-                <a:solidFill>
-                  <a:schemeClr val="accent4">
-                    <a:lumMod val="60000"/>
-                    <a:lumOff val="40000"/>
-                  </a:schemeClr>
-                </a:solidFill>
-                <a:tailEnd type="stealth" w="med" len="lg"/>
-              </a:ln>
-            </p:spPr>
-            <p:style>
-              <a:lnRef idx="1">
-                <a:schemeClr val="accent1"/>
-              </a:lnRef>
-              <a:fillRef idx="0">
-                <a:schemeClr val="accent1"/>
-              </a:fillRef>
-              <a:effectRef idx="0">
-                <a:schemeClr val="accent1"/>
-              </a:effectRef>
-              <a:fontRef idx="minor">
-                <a:schemeClr val="tx1"/>
-              </a:fontRef>
-            </p:style>
-          </p:cxnSp>
-          <p:sp>
-            <p:nvSpPr>
-              <p:cNvPr id="36" name="Oval 35"/>
-              <p:cNvSpPr/>
-              <p:nvPr/>
-            </p:nvSpPr>
-            <p:spPr>
-              <a:xfrm>
-                <a:off x="1140750" y="1919485"/>
-                <a:ext cx="355541" cy="905282"/>
-              </a:xfrm>
-              <a:prstGeom prst="ellipse">
-                <a:avLst/>
-              </a:prstGeom>
-              <a:noFill/>
-              <a:ln w="28575">
+              <a:ln w="19050">
                 <a:solidFill>
                   <a:schemeClr val="accent4">
                     <a:lumMod val="60000"/>
@@ -3708,328 +3846,812 @@
               </a:ln>
             </p:spPr>
             <p:style>
-              <a:lnRef idx="2">
-                <a:schemeClr val="accent1">
-                  <a:shade val="50000"/>
-                </a:schemeClr>
+              <a:lnRef idx="1">
+                <a:schemeClr val="accent1"/>
               </a:lnRef>
-              <a:fillRef idx="1">
+              <a:fillRef idx="0">
                 <a:schemeClr val="accent1"/>
               </a:fillRef>
               <a:effectRef idx="0">
                 <a:schemeClr val="accent1"/>
               </a:effectRef>
               <a:fontRef idx="minor">
-                <a:schemeClr val="lt1"/>
+                <a:schemeClr val="tx1"/>
               </a:fontRef>
             </p:style>
-            <p:txBody>
-              <a:bodyPr rot="0" spcFirstLastPara="0" vertOverflow="overflow" horzOverflow="overflow" vert="horz" wrap="square" lIns="91440" tIns="45720" rIns="91440" bIns="45720" numCol="1" spcCol="0" rtlCol="0" fromWordArt="0" anchor="ctr" anchorCtr="0" forceAA="0" compatLnSpc="1">
-                <a:prstTxWarp prst="textNoShape">
-                  <a:avLst/>
-                </a:prstTxWarp>
-                <a:noAutofit/>
-              </a:bodyPr>
-              <a:lstStyle/>
-              <a:p>
-                <a:pPr algn="ctr"/>
-                <a:endParaRPr lang="en-US"/>
-              </a:p>
-            </p:txBody>
-          </p:sp>
+          </p:cxnSp>
+          <p:cxnSp>
+            <p:nvCxnSpPr>
+              <p:cNvPr id="13" name="Straight Connector 12"/>
+              <p:cNvCxnSpPr/>
+              <p:nvPr/>
+            </p:nvCxnSpPr>
+            <p:spPr>
+              <a:xfrm>
+                <a:off x="1485900" y="1950720"/>
+                <a:ext cx="0" cy="290800"/>
+              </a:xfrm>
+              <a:prstGeom prst="line">
+                <a:avLst/>
+              </a:prstGeom>
+              <a:ln w="19050">
+                <a:solidFill>
+                  <a:schemeClr val="accent4">
+                    <a:lumMod val="60000"/>
+                    <a:lumOff val="40000"/>
+                  </a:schemeClr>
+                </a:solidFill>
+              </a:ln>
+            </p:spPr>
+            <p:style>
+              <a:lnRef idx="1">
+                <a:schemeClr val="accent1"/>
+              </a:lnRef>
+              <a:fillRef idx="0">
+                <a:schemeClr val="accent1"/>
+              </a:fillRef>
+              <a:effectRef idx="0">
+                <a:schemeClr val="accent1"/>
+              </a:effectRef>
+              <a:fontRef idx="minor">
+                <a:schemeClr val="tx1"/>
+              </a:fontRef>
+            </p:style>
+          </p:cxnSp>
+          <p:cxnSp>
+            <p:nvCxnSpPr>
+              <p:cNvPr id="15" name="Straight Connector 14"/>
+              <p:cNvCxnSpPr/>
+              <p:nvPr/>
+            </p:nvCxnSpPr>
+            <p:spPr>
+              <a:xfrm>
+                <a:off x="1181100" y="1950720"/>
+                <a:ext cx="0" cy="290800"/>
+              </a:xfrm>
+              <a:prstGeom prst="line">
+                <a:avLst/>
+              </a:prstGeom>
+              <a:ln w="19050">
+                <a:solidFill>
+                  <a:schemeClr val="accent4">
+                    <a:lumMod val="60000"/>
+                    <a:lumOff val="40000"/>
+                  </a:schemeClr>
+                </a:solidFill>
+              </a:ln>
+            </p:spPr>
+            <p:style>
+              <a:lnRef idx="1">
+                <a:schemeClr val="accent1"/>
+              </a:lnRef>
+              <a:fillRef idx="0">
+                <a:schemeClr val="accent1"/>
+              </a:fillRef>
+              <a:effectRef idx="0">
+                <a:schemeClr val="accent1"/>
+              </a:effectRef>
+              <a:fontRef idx="minor">
+                <a:schemeClr val="tx1"/>
+              </a:fontRef>
+            </p:style>
+          </p:cxnSp>
+          <p:cxnSp>
+            <p:nvCxnSpPr>
+              <p:cNvPr id="17" name="Straight Connector 16"/>
+              <p:cNvCxnSpPr/>
+              <p:nvPr/>
+            </p:nvCxnSpPr>
+            <p:spPr>
+              <a:xfrm>
+                <a:off x="1181100" y="2241520"/>
+                <a:ext cx="119072" cy="0"/>
+              </a:xfrm>
+              <a:prstGeom prst="line">
+                <a:avLst/>
+              </a:prstGeom>
+              <a:ln w="19050">
+                <a:solidFill>
+                  <a:schemeClr val="accent4">
+                    <a:lumMod val="60000"/>
+                    <a:lumOff val="40000"/>
+                  </a:schemeClr>
+                </a:solidFill>
+              </a:ln>
+            </p:spPr>
+            <p:style>
+              <a:lnRef idx="1">
+                <a:schemeClr val="accent1"/>
+              </a:lnRef>
+              <a:fillRef idx="0">
+                <a:schemeClr val="accent1"/>
+              </a:fillRef>
+              <a:effectRef idx="0">
+                <a:schemeClr val="accent1"/>
+              </a:effectRef>
+              <a:fontRef idx="minor">
+                <a:schemeClr val="tx1"/>
+              </a:fontRef>
+            </p:style>
+          </p:cxnSp>
+          <p:cxnSp>
+            <p:nvCxnSpPr>
+              <p:cNvPr id="30" name="Straight Connector 29"/>
+              <p:cNvCxnSpPr/>
+              <p:nvPr/>
+            </p:nvCxnSpPr>
+            <p:spPr>
+              <a:xfrm flipH="1">
+                <a:off x="1398270" y="2241520"/>
+                <a:ext cx="83820" cy="0"/>
+              </a:xfrm>
+              <a:prstGeom prst="line">
+                <a:avLst/>
+              </a:prstGeom>
+              <a:ln w="19050">
+                <a:solidFill>
+                  <a:schemeClr val="accent4">
+                    <a:lumMod val="60000"/>
+                    <a:lumOff val="40000"/>
+                  </a:schemeClr>
+                </a:solidFill>
+              </a:ln>
+            </p:spPr>
+            <p:style>
+              <a:lnRef idx="1">
+                <a:schemeClr val="accent1"/>
+              </a:lnRef>
+              <a:fillRef idx="0">
+                <a:schemeClr val="accent1"/>
+              </a:fillRef>
+              <a:effectRef idx="0">
+                <a:schemeClr val="accent1"/>
+              </a:effectRef>
+              <a:fontRef idx="minor">
+                <a:schemeClr val="tx1"/>
+              </a:fontRef>
+            </p:style>
+          </p:cxnSp>
+          <p:cxnSp>
+            <p:nvCxnSpPr>
+              <p:cNvPr id="47" name="Straight Connector 46"/>
+              <p:cNvCxnSpPr/>
+              <p:nvPr/>
+            </p:nvCxnSpPr>
+            <p:spPr>
+              <a:xfrm>
+                <a:off x="1300172" y="2241520"/>
+                <a:ext cx="44758" cy="455960"/>
+              </a:xfrm>
+              <a:prstGeom prst="line">
+                <a:avLst/>
+              </a:prstGeom>
+              <a:ln w="19050">
+                <a:solidFill>
+                  <a:schemeClr val="accent4">
+                    <a:lumMod val="60000"/>
+                    <a:lumOff val="40000"/>
+                  </a:schemeClr>
+                </a:solidFill>
+              </a:ln>
+            </p:spPr>
+            <p:style>
+              <a:lnRef idx="1">
+                <a:schemeClr val="accent1"/>
+              </a:lnRef>
+              <a:fillRef idx="0">
+                <a:schemeClr val="accent1"/>
+              </a:fillRef>
+              <a:effectRef idx="0">
+                <a:schemeClr val="accent1"/>
+              </a:effectRef>
+              <a:fontRef idx="minor">
+                <a:schemeClr val="tx1"/>
+              </a:fontRef>
+            </p:style>
+          </p:cxnSp>
+          <p:cxnSp>
+            <p:nvCxnSpPr>
+              <p:cNvPr id="49" name="Straight Connector 48"/>
+              <p:cNvCxnSpPr/>
+              <p:nvPr/>
+            </p:nvCxnSpPr>
+            <p:spPr>
+              <a:xfrm flipH="1">
+                <a:off x="1348740" y="2241520"/>
+                <a:ext cx="49530" cy="463580"/>
+              </a:xfrm>
+              <a:prstGeom prst="line">
+                <a:avLst/>
+              </a:prstGeom>
+              <a:ln w="19050">
+                <a:solidFill>
+                  <a:schemeClr val="accent4">
+                    <a:lumMod val="60000"/>
+                    <a:lumOff val="40000"/>
+                  </a:schemeClr>
+                </a:solidFill>
+              </a:ln>
+            </p:spPr>
+            <p:style>
+              <a:lnRef idx="1">
+                <a:schemeClr val="accent1"/>
+              </a:lnRef>
+              <a:fillRef idx="0">
+                <a:schemeClr val="accent1"/>
+              </a:fillRef>
+              <a:effectRef idx="0">
+                <a:schemeClr val="accent1"/>
+              </a:effectRef>
+              <a:fontRef idx="minor">
+                <a:schemeClr val="tx1"/>
+              </a:fontRef>
+            </p:style>
+          </p:cxnSp>
         </p:grpSp>
         <p:grpSp>
           <p:nvGrpSpPr>
-            <p:cNvPr id="38" name="Group 37"/>
+            <p:cNvPr id="51" name="Group 50"/>
             <p:cNvGrpSpPr/>
             <p:nvPr/>
           </p:nvGrpSpPr>
           <p:grpSpPr>
             <a:xfrm>
-              <a:off x="21291" y="49529"/>
-              <a:ext cx="284032" cy="259718"/>
-              <a:chOff x="-493295" y="291775"/>
-              <a:chExt cx="788893" cy="751101"/>
+              <a:off x="4425773" y="2118339"/>
+              <a:ext cx="194310" cy="617220"/>
+              <a:chOff x="1181100" y="1950720"/>
+              <a:chExt cx="304800" cy="754380"/>
             </a:xfrm>
           </p:grpSpPr>
-          <p:sp>
-            <p:nvSpPr>
-              <p:cNvPr id="39" name="Rectangle 38"/>
-              <p:cNvSpPr/>
+          <p:cxnSp>
+            <p:nvCxnSpPr>
+              <p:cNvPr id="52" name="Straight Connector 51"/>
+              <p:cNvCxnSpPr/>
               <p:nvPr/>
-            </p:nvSpPr>
+            </p:nvCxnSpPr>
             <p:spPr>
               <a:xfrm>
-                <a:off x="-394447" y="334990"/>
-                <a:ext cx="609600" cy="707886"/>
+                <a:off x="1181100" y="1950720"/>
+                <a:ext cx="300990" cy="3810"/>
               </a:xfrm>
-              <a:prstGeom prst="rect">
+              <a:prstGeom prst="line">
                 <a:avLst/>
               </a:prstGeom>
-              <a:solidFill>
-                <a:schemeClr val="accent1">
-                  <a:alpha val="60000"/>
-                </a:schemeClr>
-              </a:solidFill>
+              <a:ln w="19050">
+                <a:solidFill>
+                  <a:schemeClr val="accent4">
+                    <a:lumMod val="60000"/>
+                    <a:lumOff val="40000"/>
+                  </a:schemeClr>
+                </a:solidFill>
+              </a:ln>
             </p:spPr>
             <p:style>
-              <a:lnRef idx="2">
-                <a:schemeClr val="accent1">
-                  <a:shade val="50000"/>
-                </a:schemeClr>
+              <a:lnRef idx="1">
+                <a:schemeClr val="accent1"/>
               </a:lnRef>
-              <a:fillRef idx="1">
+              <a:fillRef idx="0">
                 <a:schemeClr val="accent1"/>
               </a:fillRef>
               <a:effectRef idx="0">
                 <a:schemeClr val="accent1"/>
               </a:effectRef>
               <a:fontRef idx="minor">
-                <a:schemeClr val="lt1"/>
+                <a:schemeClr val="tx1"/>
               </a:fontRef>
             </p:style>
-            <p:txBody>
-              <a:bodyPr rtlCol="0" anchor="ctr"/>
-              <a:lstStyle/>
-              <a:p>
-                <a:pPr algn="ctr"/>
-                <a:endParaRPr lang="en-US"/>
-              </a:p>
-            </p:txBody>
-          </p:sp>
-          <p:sp>
-            <p:nvSpPr>
-              <p:cNvPr id="40" name="TextBox 39"/>
-              <p:cNvSpPr txBox="1"/>
+          </p:cxnSp>
+          <p:cxnSp>
+            <p:nvCxnSpPr>
+              <p:cNvPr id="53" name="Straight Connector 52"/>
+              <p:cNvCxnSpPr/>
               <p:nvPr/>
-            </p:nvSpPr>
+            </p:nvCxnSpPr>
             <p:spPr>
               <a:xfrm>
-                <a:off x="-493295" y="291775"/>
-                <a:ext cx="788893" cy="734321"/>
+                <a:off x="1485900" y="1950720"/>
+                <a:ext cx="0" cy="290800"/>
               </a:xfrm>
-              <a:prstGeom prst="rect">
+              <a:prstGeom prst="line">
                 <a:avLst/>
               </a:prstGeom>
-              <a:noFill/>
+              <a:ln w="19050">
+                <a:solidFill>
+                  <a:schemeClr val="accent4">
+                    <a:lumMod val="60000"/>
+                    <a:lumOff val="40000"/>
+                  </a:schemeClr>
+                </a:solidFill>
+              </a:ln>
             </p:spPr>
-            <p:txBody>
-              <a:bodyPr wrap="square" rtlCol="0">
-                <a:spAutoFit/>
-              </a:bodyPr>
-              <a:lstStyle/>
-              <a:p>
-                <a:r>
-                  <a:rPr lang="en-US" sz="1000" dirty="0">
-                    <a:solidFill>
-                      <a:schemeClr val="bg1"/>
-                    </a:solidFill>
-                  </a:rPr>
-                  <a:t>a.</a:t>
-                </a:r>
-              </a:p>
-            </p:txBody>
-          </p:sp>
+            <p:style>
+              <a:lnRef idx="1">
+                <a:schemeClr val="accent1"/>
+              </a:lnRef>
+              <a:fillRef idx="0">
+                <a:schemeClr val="accent1"/>
+              </a:fillRef>
+              <a:effectRef idx="0">
+                <a:schemeClr val="accent1"/>
+              </a:effectRef>
+              <a:fontRef idx="minor">
+                <a:schemeClr val="tx1"/>
+              </a:fontRef>
+            </p:style>
+          </p:cxnSp>
+          <p:cxnSp>
+            <p:nvCxnSpPr>
+              <p:cNvPr id="54" name="Straight Connector 53"/>
+              <p:cNvCxnSpPr/>
+              <p:nvPr/>
+            </p:nvCxnSpPr>
+            <p:spPr>
+              <a:xfrm>
+                <a:off x="1181100" y="1950720"/>
+                <a:ext cx="0" cy="290800"/>
+              </a:xfrm>
+              <a:prstGeom prst="line">
+                <a:avLst/>
+              </a:prstGeom>
+              <a:ln w="19050">
+                <a:solidFill>
+                  <a:schemeClr val="accent4">
+                    <a:lumMod val="60000"/>
+                    <a:lumOff val="40000"/>
+                  </a:schemeClr>
+                </a:solidFill>
+              </a:ln>
+            </p:spPr>
+            <p:style>
+              <a:lnRef idx="1">
+                <a:schemeClr val="accent1"/>
+              </a:lnRef>
+              <a:fillRef idx="0">
+                <a:schemeClr val="accent1"/>
+              </a:fillRef>
+              <a:effectRef idx="0">
+                <a:schemeClr val="accent1"/>
+              </a:effectRef>
+              <a:fontRef idx="minor">
+                <a:schemeClr val="tx1"/>
+              </a:fontRef>
+            </p:style>
+          </p:cxnSp>
+          <p:cxnSp>
+            <p:nvCxnSpPr>
+              <p:cNvPr id="55" name="Straight Connector 54"/>
+              <p:cNvCxnSpPr/>
+              <p:nvPr/>
+            </p:nvCxnSpPr>
+            <p:spPr>
+              <a:xfrm>
+                <a:off x="1181100" y="2241520"/>
+                <a:ext cx="119072" cy="0"/>
+              </a:xfrm>
+              <a:prstGeom prst="line">
+                <a:avLst/>
+              </a:prstGeom>
+              <a:ln w="19050">
+                <a:solidFill>
+                  <a:schemeClr val="accent4">
+                    <a:lumMod val="60000"/>
+                    <a:lumOff val="40000"/>
+                  </a:schemeClr>
+                </a:solidFill>
+              </a:ln>
+            </p:spPr>
+            <p:style>
+              <a:lnRef idx="1">
+                <a:schemeClr val="accent1"/>
+              </a:lnRef>
+              <a:fillRef idx="0">
+                <a:schemeClr val="accent1"/>
+              </a:fillRef>
+              <a:effectRef idx="0">
+                <a:schemeClr val="accent1"/>
+              </a:effectRef>
+              <a:fontRef idx="minor">
+                <a:schemeClr val="tx1"/>
+              </a:fontRef>
+            </p:style>
+          </p:cxnSp>
+          <p:cxnSp>
+            <p:nvCxnSpPr>
+              <p:cNvPr id="56" name="Straight Connector 55"/>
+              <p:cNvCxnSpPr/>
+              <p:nvPr/>
+            </p:nvCxnSpPr>
+            <p:spPr>
+              <a:xfrm flipH="1">
+                <a:off x="1398270" y="2241520"/>
+                <a:ext cx="83820" cy="0"/>
+              </a:xfrm>
+              <a:prstGeom prst="line">
+                <a:avLst/>
+              </a:prstGeom>
+              <a:ln w="19050">
+                <a:solidFill>
+                  <a:schemeClr val="accent4">
+                    <a:lumMod val="60000"/>
+                    <a:lumOff val="40000"/>
+                  </a:schemeClr>
+                </a:solidFill>
+              </a:ln>
+            </p:spPr>
+            <p:style>
+              <a:lnRef idx="1">
+                <a:schemeClr val="accent1"/>
+              </a:lnRef>
+              <a:fillRef idx="0">
+                <a:schemeClr val="accent1"/>
+              </a:fillRef>
+              <a:effectRef idx="0">
+                <a:schemeClr val="accent1"/>
+              </a:effectRef>
+              <a:fontRef idx="minor">
+                <a:schemeClr val="tx1"/>
+              </a:fontRef>
+            </p:style>
+          </p:cxnSp>
+          <p:cxnSp>
+            <p:nvCxnSpPr>
+              <p:cNvPr id="57" name="Straight Connector 56"/>
+              <p:cNvCxnSpPr/>
+              <p:nvPr/>
+            </p:nvCxnSpPr>
+            <p:spPr>
+              <a:xfrm>
+                <a:off x="1300172" y="2241520"/>
+                <a:ext cx="44758" cy="455960"/>
+              </a:xfrm>
+              <a:prstGeom prst="line">
+                <a:avLst/>
+              </a:prstGeom>
+              <a:ln w="19050">
+                <a:solidFill>
+                  <a:schemeClr val="accent4">
+                    <a:lumMod val="60000"/>
+                    <a:lumOff val="40000"/>
+                  </a:schemeClr>
+                </a:solidFill>
+              </a:ln>
+            </p:spPr>
+            <p:style>
+              <a:lnRef idx="1">
+                <a:schemeClr val="accent1"/>
+              </a:lnRef>
+              <a:fillRef idx="0">
+                <a:schemeClr val="accent1"/>
+              </a:fillRef>
+              <a:effectRef idx="0">
+                <a:schemeClr val="accent1"/>
+              </a:effectRef>
+              <a:fontRef idx="minor">
+                <a:schemeClr val="tx1"/>
+              </a:fontRef>
+            </p:style>
+          </p:cxnSp>
+          <p:cxnSp>
+            <p:nvCxnSpPr>
+              <p:cNvPr id="58" name="Straight Connector 57"/>
+              <p:cNvCxnSpPr/>
+              <p:nvPr/>
+            </p:nvCxnSpPr>
+            <p:spPr>
+              <a:xfrm flipH="1">
+                <a:off x="1348740" y="2241520"/>
+                <a:ext cx="49530" cy="463580"/>
+              </a:xfrm>
+              <a:prstGeom prst="line">
+                <a:avLst/>
+              </a:prstGeom>
+              <a:ln w="19050">
+                <a:solidFill>
+                  <a:schemeClr val="accent4">
+                    <a:lumMod val="60000"/>
+                    <a:lumOff val="40000"/>
+                  </a:schemeClr>
+                </a:solidFill>
+              </a:ln>
+            </p:spPr>
+            <p:style>
+              <a:lnRef idx="1">
+                <a:schemeClr val="accent1"/>
+              </a:lnRef>
+              <a:fillRef idx="0">
+                <a:schemeClr val="accent1"/>
+              </a:fillRef>
+              <a:effectRef idx="0">
+                <a:schemeClr val="accent1"/>
+              </a:effectRef>
+              <a:fontRef idx="minor">
+                <a:schemeClr val="tx1"/>
+              </a:fontRef>
+            </p:style>
+          </p:cxnSp>
         </p:grpSp>
         <p:grpSp>
           <p:nvGrpSpPr>
-            <p:cNvPr id="41" name="Group 40"/>
+            <p:cNvPr id="59" name="Group 58"/>
             <p:cNvGrpSpPr/>
             <p:nvPr/>
           </p:nvGrpSpPr>
           <p:grpSpPr>
             <a:xfrm>
-              <a:off x="2547057" y="64472"/>
-              <a:ext cx="284032" cy="259718"/>
-              <a:chOff x="-493295" y="291775"/>
-              <a:chExt cx="788893" cy="751101"/>
+              <a:off x="2948363" y="2084049"/>
+              <a:ext cx="194310" cy="617220"/>
+              <a:chOff x="1181100" y="1950720"/>
+              <a:chExt cx="304800" cy="754380"/>
             </a:xfrm>
           </p:grpSpPr>
-          <p:sp>
-            <p:nvSpPr>
-              <p:cNvPr id="42" name="Rectangle 41"/>
-              <p:cNvSpPr/>
+          <p:cxnSp>
+            <p:nvCxnSpPr>
+              <p:cNvPr id="60" name="Straight Connector 59"/>
+              <p:cNvCxnSpPr/>
               <p:nvPr/>
-            </p:nvSpPr>
+            </p:nvCxnSpPr>
             <p:spPr>
               <a:xfrm>
-                <a:off x="-394447" y="334990"/>
-                <a:ext cx="609600" cy="707886"/>
+                <a:off x="1181100" y="1950720"/>
+                <a:ext cx="300990" cy="3810"/>
               </a:xfrm>
-              <a:prstGeom prst="rect">
+              <a:prstGeom prst="line">
                 <a:avLst/>
               </a:prstGeom>
-              <a:solidFill>
-                <a:schemeClr val="accent1">
-                  <a:alpha val="60000"/>
-                </a:schemeClr>
-              </a:solidFill>
+              <a:ln w="19050">
+                <a:solidFill>
+                  <a:schemeClr val="accent4">
+                    <a:lumMod val="60000"/>
+                    <a:lumOff val="40000"/>
+                  </a:schemeClr>
+                </a:solidFill>
+              </a:ln>
             </p:spPr>
             <p:style>
-              <a:lnRef idx="2">
-                <a:schemeClr val="accent1">
-                  <a:shade val="50000"/>
-                </a:schemeClr>
+              <a:lnRef idx="1">
+                <a:schemeClr val="accent1"/>
               </a:lnRef>
-              <a:fillRef idx="1">
+              <a:fillRef idx="0">
                 <a:schemeClr val="accent1"/>
               </a:fillRef>
               <a:effectRef idx="0">
                 <a:schemeClr val="accent1"/>
               </a:effectRef>
               <a:fontRef idx="minor">
-                <a:schemeClr val="lt1"/>
+                <a:schemeClr val="tx1"/>
               </a:fontRef>
             </p:style>
-            <p:txBody>
-              <a:bodyPr rtlCol="0" anchor="ctr"/>
-              <a:lstStyle/>
-              <a:p>
-                <a:pPr algn="ctr"/>
-                <a:endParaRPr lang="en-US"/>
-              </a:p>
-            </p:txBody>
-          </p:sp>
-          <p:sp>
-            <p:nvSpPr>
-              <p:cNvPr id="43" name="TextBox 42"/>
-              <p:cNvSpPr txBox="1"/>
+          </p:cxnSp>
+          <p:cxnSp>
+            <p:nvCxnSpPr>
+              <p:cNvPr id="61" name="Straight Connector 60"/>
+              <p:cNvCxnSpPr/>
               <p:nvPr/>
-            </p:nvSpPr>
+            </p:nvCxnSpPr>
             <p:spPr>
               <a:xfrm>
-                <a:off x="-493295" y="291775"/>
-                <a:ext cx="788893" cy="734321"/>
+                <a:off x="1485900" y="1950720"/>
+                <a:ext cx="0" cy="290800"/>
               </a:xfrm>
-              <a:prstGeom prst="rect">
+              <a:prstGeom prst="line">
                 <a:avLst/>
               </a:prstGeom>
-              <a:noFill/>
+              <a:ln w="19050">
+                <a:solidFill>
+                  <a:schemeClr val="accent4">
+                    <a:lumMod val="60000"/>
+                    <a:lumOff val="40000"/>
+                  </a:schemeClr>
+                </a:solidFill>
+              </a:ln>
             </p:spPr>
-            <p:txBody>
-              <a:bodyPr wrap="square" rtlCol="0">
-                <a:spAutoFit/>
-              </a:bodyPr>
-              <a:lstStyle/>
-              <a:p>
-                <a:r>
-                  <a:rPr lang="en-US" sz="1000" dirty="0">
-                    <a:solidFill>
-                      <a:schemeClr val="bg1"/>
-                    </a:solidFill>
-                  </a:rPr>
-                  <a:t>b.</a:t>
-                </a:r>
-              </a:p>
-            </p:txBody>
-          </p:sp>
+            <p:style>
+              <a:lnRef idx="1">
+                <a:schemeClr val="accent1"/>
+              </a:lnRef>
+              <a:fillRef idx="0">
+                <a:schemeClr val="accent1"/>
+              </a:fillRef>
+              <a:effectRef idx="0">
+                <a:schemeClr val="accent1"/>
+              </a:effectRef>
+              <a:fontRef idx="minor">
+                <a:schemeClr val="tx1"/>
+              </a:fontRef>
+            </p:style>
+          </p:cxnSp>
+          <p:cxnSp>
+            <p:nvCxnSpPr>
+              <p:cNvPr id="62" name="Straight Connector 61"/>
+              <p:cNvCxnSpPr/>
+              <p:nvPr/>
+            </p:nvCxnSpPr>
+            <p:spPr>
+              <a:xfrm>
+                <a:off x="1181100" y="1950720"/>
+                <a:ext cx="0" cy="290800"/>
+              </a:xfrm>
+              <a:prstGeom prst="line">
+                <a:avLst/>
+              </a:prstGeom>
+              <a:ln w="19050">
+                <a:solidFill>
+                  <a:schemeClr val="accent4">
+                    <a:lumMod val="60000"/>
+                    <a:lumOff val="40000"/>
+                  </a:schemeClr>
+                </a:solidFill>
+              </a:ln>
+            </p:spPr>
+            <p:style>
+              <a:lnRef idx="1">
+                <a:schemeClr val="accent1"/>
+              </a:lnRef>
+              <a:fillRef idx="0">
+                <a:schemeClr val="accent1"/>
+              </a:fillRef>
+              <a:effectRef idx="0">
+                <a:schemeClr val="accent1"/>
+              </a:effectRef>
+              <a:fontRef idx="minor">
+                <a:schemeClr val="tx1"/>
+              </a:fontRef>
+            </p:style>
+          </p:cxnSp>
+          <p:cxnSp>
+            <p:nvCxnSpPr>
+              <p:cNvPr id="63" name="Straight Connector 62"/>
+              <p:cNvCxnSpPr/>
+              <p:nvPr/>
+            </p:nvCxnSpPr>
+            <p:spPr>
+              <a:xfrm>
+                <a:off x="1181100" y="2241520"/>
+                <a:ext cx="119072" cy="0"/>
+              </a:xfrm>
+              <a:prstGeom prst="line">
+                <a:avLst/>
+              </a:prstGeom>
+              <a:ln w="19050">
+                <a:solidFill>
+                  <a:schemeClr val="accent4">
+                    <a:lumMod val="60000"/>
+                    <a:lumOff val="40000"/>
+                  </a:schemeClr>
+                </a:solidFill>
+              </a:ln>
+            </p:spPr>
+            <p:style>
+              <a:lnRef idx="1">
+                <a:schemeClr val="accent1"/>
+              </a:lnRef>
+              <a:fillRef idx="0">
+                <a:schemeClr val="accent1"/>
+              </a:fillRef>
+              <a:effectRef idx="0">
+                <a:schemeClr val="accent1"/>
+              </a:effectRef>
+              <a:fontRef idx="minor">
+                <a:schemeClr val="tx1"/>
+              </a:fontRef>
+            </p:style>
+          </p:cxnSp>
+          <p:cxnSp>
+            <p:nvCxnSpPr>
+              <p:cNvPr id="64" name="Straight Connector 63"/>
+              <p:cNvCxnSpPr/>
+              <p:nvPr/>
+            </p:nvCxnSpPr>
+            <p:spPr>
+              <a:xfrm flipH="1">
+                <a:off x="1398270" y="2241520"/>
+                <a:ext cx="83820" cy="0"/>
+              </a:xfrm>
+              <a:prstGeom prst="line">
+                <a:avLst/>
+              </a:prstGeom>
+              <a:ln w="19050">
+                <a:solidFill>
+                  <a:schemeClr val="accent4">
+                    <a:lumMod val="60000"/>
+                    <a:lumOff val="40000"/>
+                  </a:schemeClr>
+                </a:solidFill>
+              </a:ln>
+            </p:spPr>
+            <p:style>
+              <a:lnRef idx="1">
+                <a:schemeClr val="accent1"/>
+              </a:lnRef>
+              <a:fillRef idx="0">
+                <a:schemeClr val="accent1"/>
+              </a:fillRef>
+              <a:effectRef idx="0">
+                <a:schemeClr val="accent1"/>
+              </a:effectRef>
+              <a:fontRef idx="minor">
+                <a:schemeClr val="tx1"/>
+              </a:fontRef>
+            </p:style>
+          </p:cxnSp>
+          <p:cxnSp>
+            <p:nvCxnSpPr>
+              <p:cNvPr id="65" name="Straight Connector 64"/>
+              <p:cNvCxnSpPr/>
+              <p:nvPr/>
+            </p:nvCxnSpPr>
+            <p:spPr>
+              <a:xfrm>
+                <a:off x="1300172" y="2241520"/>
+                <a:ext cx="44758" cy="455960"/>
+              </a:xfrm>
+              <a:prstGeom prst="line">
+                <a:avLst/>
+              </a:prstGeom>
+              <a:ln w="19050">
+                <a:solidFill>
+                  <a:schemeClr val="accent4">
+                    <a:lumMod val="60000"/>
+                    <a:lumOff val="40000"/>
+                  </a:schemeClr>
+                </a:solidFill>
+              </a:ln>
+            </p:spPr>
+            <p:style>
+              <a:lnRef idx="1">
+                <a:schemeClr val="accent1"/>
+              </a:lnRef>
+              <a:fillRef idx="0">
+                <a:schemeClr val="accent1"/>
+              </a:fillRef>
+              <a:effectRef idx="0">
+                <a:schemeClr val="accent1"/>
+              </a:effectRef>
+              <a:fontRef idx="minor">
+                <a:schemeClr val="tx1"/>
+              </a:fontRef>
+            </p:style>
+          </p:cxnSp>
+          <p:cxnSp>
+            <p:nvCxnSpPr>
+              <p:cNvPr id="66" name="Straight Connector 65"/>
+              <p:cNvCxnSpPr/>
+              <p:nvPr/>
+            </p:nvCxnSpPr>
+            <p:spPr>
+              <a:xfrm flipH="1">
+                <a:off x="1348740" y="2241520"/>
+                <a:ext cx="49530" cy="463580"/>
+              </a:xfrm>
+              <a:prstGeom prst="line">
+                <a:avLst/>
+              </a:prstGeom>
+              <a:ln w="19050">
+                <a:solidFill>
+                  <a:schemeClr val="accent4">
+                    <a:lumMod val="60000"/>
+                    <a:lumOff val="40000"/>
+                  </a:schemeClr>
+                </a:solidFill>
+              </a:ln>
+            </p:spPr>
+            <p:style>
+              <a:lnRef idx="1">
+                <a:schemeClr val="accent1"/>
+              </a:lnRef>
+              <a:fillRef idx="0">
+                <a:schemeClr val="accent1"/>
+              </a:fillRef>
+              <a:effectRef idx="0">
+                <a:schemeClr val="accent1"/>
+              </a:effectRef>
+              <a:fontRef idx="minor">
+                <a:schemeClr val="tx1"/>
+              </a:fontRef>
+            </p:style>
+          </p:cxnSp>
         </p:grpSp>
       </p:grpSp>
-      <p:cxnSp>
-        <p:nvCxnSpPr>
-          <p:cNvPr id="6" name="Straight Connector 5"/>
-          <p:cNvCxnSpPr/>
-          <p:nvPr/>
-        </p:nvCxnSpPr>
-        <p:spPr>
-          <a:xfrm>
-            <a:off x="2556510" y="0"/>
-            <a:ext cx="0" cy="2835275"/>
-          </a:xfrm>
-          <a:prstGeom prst="line">
-            <a:avLst/>
-          </a:prstGeom>
-          <a:ln>
-            <a:solidFill>
-              <a:schemeClr val="tx1"/>
-            </a:solidFill>
-          </a:ln>
-        </p:spPr>
-        <p:style>
-          <a:lnRef idx="1">
-            <a:schemeClr val="accent1"/>
-          </a:lnRef>
-          <a:fillRef idx="0">
-            <a:schemeClr val="accent1"/>
-          </a:fillRef>
-          <a:effectRef idx="0">
-            <a:schemeClr val="accent1"/>
-          </a:effectRef>
-          <a:fontRef idx="minor">
-            <a:schemeClr val="tx1"/>
-          </a:fontRef>
-        </p:style>
-      </p:cxnSp>
-      <p:cxnSp>
-        <p:nvCxnSpPr>
-          <p:cNvPr id="8" name="Straight Connector 7"/>
-          <p:cNvCxnSpPr/>
-          <p:nvPr/>
-        </p:nvCxnSpPr>
-        <p:spPr>
-          <a:xfrm>
-            <a:off x="0" y="1745119"/>
-            <a:ext cx="2560099" cy="0"/>
-          </a:xfrm>
-          <a:prstGeom prst="line">
-            <a:avLst/>
-          </a:prstGeom>
-          <a:ln>
-            <a:solidFill>
-              <a:schemeClr val="tx1"/>
-            </a:solidFill>
-          </a:ln>
-        </p:spPr>
-        <p:style>
-          <a:lnRef idx="1">
-            <a:schemeClr val="accent1"/>
-          </a:lnRef>
-          <a:fillRef idx="0">
-            <a:schemeClr val="accent1"/>
-          </a:fillRef>
-          <a:effectRef idx="0">
-            <a:schemeClr val="accent1"/>
-          </a:effectRef>
-          <a:fontRef idx="minor">
-            <a:schemeClr val="tx1"/>
-          </a:fontRef>
-        </p:style>
-      </p:cxnSp>
-      <p:cxnSp>
-        <p:nvCxnSpPr>
-          <p:cNvPr id="10" name="Straight Connector 9"/>
-          <p:cNvCxnSpPr/>
-          <p:nvPr/>
-        </p:nvCxnSpPr>
-        <p:spPr>
-          <a:xfrm flipH="1">
-            <a:off x="2556510" y="1752783"/>
-            <a:ext cx="2380615" cy="0"/>
-          </a:xfrm>
-          <a:prstGeom prst="line">
-            <a:avLst/>
-          </a:prstGeom>
-          <a:ln>
-            <a:solidFill>
-              <a:schemeClr val="tx1"/>
-            </a:solidFill>
-          </a:ln>
-        </p:spPr>
-        <p:style>
-          <a:lnRef idx="1">
-            <a:schemeClr val="accent1"/>
-          </a:lnRef>
-          <a:fillRef idx="0">
-            <a:schemeClr val="accent1"/>
-          </a:fillRef>
-          <a:effectRef idx="0">
-            <a:schemeClr val="accent1"/>
-          </a:effectRef>
-          <a:fontRef idx="minor">
-            <a:schemeClr val="tx1"/>
-          </a:fontRef>
-        </p:style>
-      </p:cxnSp>
     </p:spTree>
     <p:extLst>
       <p:ext uri="{BB962C8B-B14F-4D97-AF65-F5344CB8AC3E}">

</xml_diff>